<commit_message>
Inserido e modificado ac3 Takai
</commit_message>
<xml_diff>
--- a/cenario_de_negocio.pptx
+++ b/cenario_de_negocio.pptx
@@ -256,7 +256,7 @@
           <a:p>
             <a:fld id="{F0E51C7C-CEA3-4CAA-BE4B-344879E7C377}" type="datetimeFigureOut">
               <a:rPr lang="de-DE" smtClean="0"/>
-              <a:t>13.03.2019</a:t>
+              <a:t>08.04.2019</a:t>
             </a:fld>
             <a:endParaRPr lang="de-DE"/>
           </a:p>
@@ -426,7 +426,7 @@
           <a:p>
             <a:fld id="{F0E51C7C-CEA3-4CAA-BE4B-344879E7C377}" type="datetimeFigureOut">
               <a:rPr lang="de-DE" smtClean="0"/>
-              <a:t>13.03.2019</a:t>
+              <a:t>08.04.2019</a:t>
             </a:fld>
             <a:endParaRPr lang="de-DE"/>
           </a:p>
@@ -606,7 +606,7 @@
           <a:p>
             <a:fld id="{F0E51C7C-CEA3-4CAA-BE4B-344879E7C377}" type="datetimeFigureOut">
               <a:rPr lang="de-DE" smtClean="0"/>
-              <a:t>13.03.2019</a:t>
+              <a:t>08.04.2019</a:t>
             </a:fld>
             <a:endParaRPr lang="de-DE"/>
           </a:p>
@@ -776,7 +776,7 @@
           <a:p>
             <a:fld id="{F0E51C7C-CEA3-4CAA-BE4B-344879E7C377}" type="datetimeFigureOut">
               <a:rPr lang="de-DE" smtClean="0"/>
-              <a:t>13.03.2019</a:t>
+              <a:t>08.04.2019</a:t>
             </a:fld>
             <a:endParaRPr lang="de-DE"/>
           </a:p>
@@ -1022,7 +1022,7 @@
           <a:p>
             <a:fld id="{F0E51C7C-CEA3-4CAA-BE4B-344879E7C377}" type="datetimeFigureOut">
               <a:rPr lang="de-DE" smtClean="0"/>
-              <a:t>13.03.2019</a:t>
+              <a:t>08.04.2019</a:t>
             </a:fld>
             <a:endParaRPr lang="de-DE"/>
           </a:p>
@@ -1254,7 +1254,7 @@
           <a:p>
             <a:fld id="{F0E51C7C-CEA3-4CAA-BE4B-344879E7C377}" type="datetimeFigureOut">
               <a:rPr lang="de-DE" smtClean="0"/>
-              <a:t>13.03.2019</a:t>
+              <a:t>08.04.2019</a:t>
             </a:fld>
             <a:endParaRPr lang="de-DE"/>
           </a:p>
@@ -1621,7 +1621,7 @@
           <a:p>
             <a:fld id="{F0E51C7C-CEA3-4CAA-BE4B-344879E7C377}" type="datetimeFigureOut">
               <a:rPr lang="de-DE" smtClean="0"/>
-              <a:t>13.03.2019</a:t>
+              <a:t>08.04.2019</a:t>
             </a:fld>
             <a:endParaRPr lang="de-DE"/>
           </a:p>
@@ -1739,7 +1739,7 @@
           <a:p>
             <a:fld id="{F0E51C7C-CEA3-4CAA-BE4B-344879E7C377}" type="datetimeFigureOut">
               <a:rPr lang="de-DE" smtClean="0"/>
-              <a:t>13.03.2019</a:t>
+              <a:t>08.04.2019</a:t>
             </a:fld>
             <a:endParaRPr lang="de-DE"/>
           </a:p>
@@ -1834,7 +1834,7 @@
           <a:p>
             <a:fld id="{F0E51C7C-CEA3-4CAA-BE4B-344879E7C377}" type="datetimeFigureOut">
               <a:rPr lang="de-DE" smtClean="0"/>
-              <a:t>13.03.2019</a:t>
+              <a:t>08.04.2019</a:t>
             </a:fld>
             <a:endParaRPr lang="de-DE"/>
           </a:p>
@@ -2111,7 +2111,7 @@
           <a:p>
             <a:fld id="{F0E51C7C-CEA3-4CAA-BE4B-344879E7C377}" type="datetimeFigureOut">
               <a:rPr lang="de-DE" smtClean="0"/>
-              <a:t>13.03.2019</a:t>
+              <a:t>08.04.2019</a:t>
             </a:fld>
             <a:endParaRPr lang="de-DE"/>
           </a:p>
@@ -2364,7 +2364,7 @@
           <a:p>
             <a:fld id="{F0E51C7C-CEA3-4CAA-BE4B-344879E7C377}" type="datetimeFigureOut">
               <a:rPr lang="de-DE" smtClean="0"/>
-              <a:t>13.03.2019</a:t>
+              <a:t>08.04.2019</a:t>
             </a:fld>
             <a:endParaRPr lang="de-DE"/>
           </a:p>
@@ -2577,7 +2577,7 @@
           <a:p>
             <a:fld id="{F0E51C7C-CEA3-4CAA-BE4B-344879E7C377}" type="datetimeFigureOut">
               <a:rPr lang="de-DE" smtClean="0"/>
-              <a:t>13.03.2019</a:t>
+              <a:t>08.04.2019</a:t>
             </a:fld>
             <a:endParaRPr lang="de-DE"/>
           </a:p>
@@ -2987,7 +2987,7 @@
           <p:cNvPr id="4" name="Retângulo 3">
             <a:extLst>
               <a:ext uri="{FF2B5EF4-FFF2-40B4-BE49-F238E27FC236}">
-                <a16:creationId xmlns:a16="http://schemas.microsoft.com/office/drawing/2014/main" id="{88C6BF1B-8B81-4A42-B266-9DF3168EF8CB}"/>
+                <a16:creationId xmlns:a16="http://schemas.microsoft.com/office/drawing/2014/main" xmlns="" id="{88C6BF1B-8B81-4A42-B266-9DF3168EF8CB}"/>
               </a:ext>
             </a:extLst>
           </p:cNvPr>
@@ -3049,7 +3049,7 @@
           <p:cNvPr id="6" name="CaixaDeTexto 5">
             <a:extLst>
               <a:ext uri="{FF2B5EF4-FFF2-40B4-BE49-F238E27FC236}">
-                <a16:creationId xmlns:a16="http://schemas.microsoft.com/office/drawing/2014/main" id="{1270056D-C445-482D-9C8C-EC4698A09D63}"/>
+                <a16:creationId xmlns:a16="http://schemas.microsoft.com/office/drawing/2014/main" xmlns="" id="{1270056D-C445-482D-9C8C-EC4698A09D63}"/>
               </a:ext>
             </a:extLst>
           </p:cNvPr>
@@ -3090,7 +3090,7 @@
           <p:cNvPr id="5" name="Retângulo 4">
             <a:extLst>
               <a:ext uri="{FF2B5EF4-FFF2-40B4-BE49-F238E27FC236}">
-                <a16:creationId xmlns:a16="http://schemas.microsoft.com/office/drawing/2014/main" id="{BBA1E2F4-BBFF-4EB2-B8C3-D9ECB7B26A24}"/>
+                <a16:creationId xmlns:a16="http://schemas.microsoft.com/office/drawing/2014/main" xmlns="" id="{BBA1E2F4-BBFF-4EB2-B8C3-D9ECB7B26A24}"/>
               </a:ext>
             </a:extLst>
           </p:cNvPr>
@@ -3139,7 +3139,7 @@
           <p:cNvPr id="3" name="Imagem 6" descr="Uma imagem contendo objeto&#10;&#10;Descrição gerada com muito alta confiança">
             <a:extLst>
               <a:ext uri="{FF2B5EF4-FFF2-40B4-BE49-F238E27FC236}">
-                <a16:creationId xmlns:a16="http://schemas.microsoft.com/office/drawing/2014/main" id="{92E329D9-4E40-4305-B89E-0B0FAF525C3C}"/>
+                <a16:creationId xmlns:a16="http://schemas.microsoft.com/office/drawing/2014/main" xmlns="" id="{92E329D9-4E40-4305-B89E-0B0FAF525C3C}"/>
               </a:ext>
             </a:extLst>
           </p:cNvPr>
@@ -3169,7 +3169,7 @@
           <p:cNvPr id="8" name="Conector de Seta Reta 7">
             <a:extLst>
               <a:ext uri="{FF2B5EF4-FFF2-40B4-BE49-F238E27FC236}">
-                <a16:creationId xmlns:a16="http://schemas.microsoft.com/office/drawing/2014/main" id="{FDC2BAF2-F507-44C8-BC1B-784D4C14FB57}"/>
+                <a16:creationId xmlns:a16="http://schemas.microsoft.com/office/drawing/2014/main" xmlns="" id="{FDC2BAF2-F507-44C8-BC1B-784D4C14FB57}"/>
               </a:ext>
             </a:extLst>
           </p:cNvPr>
@@ -3211,7 +3211,7 @@
           <p:cNvPr id="11" name="Imagem 6" descr="Uma imagem contendo objeto&#10;&#10;Descrição gerada com muito alta confiança">
             <a:extLst>
               <a:ext uri="{FF2B5EF4-FFF2-40B4-BE49-F238E27FC236}">
-                <a16:creationId xmlns:a16="http://schemas.microsoft.com/office/drawing/2014/main" id="{014B8D47-4BA0-4DA7-9AA1-4ED584384696}"/>
+                <a16:creationId xmlns:a16="http://schemas.microsoft.com/office/drawing/2014/main" xmlns="" id="{014B8D47-4BA0-4DA7-9AA1-4ED584384696}"/>
               </a:ext>
             </a:extLst>
           </p:cNvPr>
@@ -3241,7 +3241,7 @@
           <p:cNvPr id="12" name="Conector de Seta Reta 11">
             <a:extLst>
               <a:ext uri="{FF2B5EF4-FFF2-40B4-BE49-F238E27FC236}">
-                <a16:creationId xmlns:a16="http://schemas.microsoft.com/office/drawing/2014/main" id="{D6BF6348-7521-4FCC-8C02-2373BA40D8BE}"/>
+                <a16:creationId xmlns:a16="http://schemas.microsoft.com/office/drawing/2014/main" xmlns="" id="{D6BF6348-7521-4FCC-8C02-2373BA40D8BE}"/>
               </a:ext>
             </a:extLst>
           </p:cNvPr>
@@ -3285,7 +3285,7 @@
           <p:cNvPr id="13" name="Imagem 6" descr="Uma imagem contendo objeto&#10;&#10;Descrição gerada com muito alta confiança">
             <a:extLst>
               <a:ext uri="{FF2B5EF4-FFF2-40B4-BE49-F238E27FC236}">
-                <a16:creationId xmlns:a16="http://schemas.microsoft.com/office/drawing/2014/main" id="{C2683C72-D2AC-4582-9167-11414D7556C0}"/>
+                <a16:creationId xmlns:a16="http://schemas.microsoft.com/office/drawing/2014/main" xmlns="" id="{C2683C72-D2AC-4582-9167-11414D7556C0}"/>
               </a:ext>
             </a:extLst>
           </p:cNvPr>
@@ -3315,7 +3315,7 @@
           <p:cNvPr id="14" name="Imagem 6" descr="Uma imagem contendo objeto&#10;&#10;Descrição gerada com muito alta confiança">
             <a:extLst>
               <a:ext uri="{FF2B5EF4-FFF2-40B4-BE49-F238E27FC236}">
-                <a16:creationId xmlns:a16="http://schemas.microsoft.com/office/drawing/2014/main" id="{7BD7278E-63C9-4A7B-A177-39455309996E}"/>
+                <a16:creationId xmlns:a16="http://schemas.microsoft.com/office/drawing/2014/main" xmlns="" id="{7BD7278E-63C9-4A7B-A177-39455309996E}"/>
               </a:ext>
             </a:extLst>
           </p:cNvPr>
@@ -3345,7 +3345,7 @@
           <p:cNvPr id="17" name="Conector de Seta Reta 16">
             <a:extLst>
               <a:ext uri="{FF2B5EF4-FFF2-40B4-BE49-F238E27FC236}">
-                <a16:creationId xmlns:a16="http://schemas.microsoft.com/office/drawing/2014/main" id="{44979CC5-335D-4E0A-9F5D-53DF157520B5}"/>
+                <a16:creationId xmlns:a16="http://schemas.microsoft.com/office/drawing/2014/main" xmlns="" id="{44979CC5-335D-4E0A-9F5D-53DF157520B5}"/>
               </a:ext>
             </a:extLst>
           </p:cNvPr>
@@ -3389,7 +3389,7 @@
           <p:cNvPr id="18" name="Conector de Seta Reta 17">
             <a:extLst>
               <a:ext uri="{FF2B5EF4-FFF2-40B4-BE49-F238E27FC236}">
-                <a16:creationId xmlns:a16="http://schemas.microsoft.com/office/drawing/2014/main" id="{CBEB5DF7-DD78-458C-BEF2-5EE6B2EDCE1E}"/>
+                <a16:creationId xmlns:a16="http://schemas.microsoft.com/office/drawing/2014/main" xmlns="" id="{CBEB5DF7-DD78-458C-BEF2-5EE6B2EDCE1E}"/>
               </a:ext>
             </a:extLst>
           </p:cNvPr>
@@ -3433,7 +3433,7 @@
           <p:cNvPr id="19" name="CaixaDeTexto 18">
             <a:extLst>
               <a:ext uri="{FF2B5EF4-FFF2-40B4-BE49-F238E27FC236}">
-                <a16:creationId xmlns:a16="http://schemas.microsoft.com/office/drawing/2014/main" id="{AAD7B907-6CE7-47A0-995C-3DFC3EE8E0B4}"/>
+                <a16:creationId xmlns:a16="http://schemas.microsoft.com/office/drawing/2014/main" xmlns="" id="{AAD7B907-6CE7-47A0-995C-3DFC3EE8E0B4}"/>
               </a:ext>
             </a:extLst>
           </p:cNvPr>
@@ -3473,7 +3473,7 @@
           <p:cNvPr id="7" name="Agrupar 6">
             <a:extLst>
               <a:ext uri="{FF2B5EF4-FFF2-40B4-BE49-F238E27FC236}">
-                <a16:creationId xmlns:a16="http://schemas.microsoft.com/office/drawing/2014/main" id="{C4DEB443-9069-4E32-8358-8CB0FDAF9992}"/>
+                <a16:creationId xmlns:a16="http://schemas.microsoft.com/office/drawing/2014/main" xmlns="" id="{C4DEB443-9069-4E32-8358-8CB0FDAF9992}"/>
               </a:ext>
             </a:extLst>
           </p:cNvPr>
@@ -3493,7 +3493,7 @@
             <p:cNvPr id="24" name="CaixaDeTexto 23">
               <a:extLst>
                 <a:ext uri="{FF2B5EF4-FFF2-40B4-BE49-F238E27FC236}">
-                  <a16:creationId xmlns:a16="http://schemas.microsoft.com/office/drawing/2014/main" id="{3AB6A1BD-1D4F-4398-A8B0-B8E29B8BF1A1}"/>
+                  <a16:creationId xmlns:a16="http://schemas.microsoft.com/office/drawing/2014/main" xmlns="" id="{3AB6A1BD-1D4F-4398-A8B0-B8E29B8BF1A1}"/>
                 </a:ext>
               </a:extLst>
             </p:cNvPr>
@@ -3530,7 +3530,7 @@
             <p:cNvPr id="25" name="CaixaDeTexto 24">
               <a:extLst>
                 <a:ext uri="{FF2B5EF4-FFF2-40B4-BE49-F238E27FC236}">
-                  <a16:creationId xmlns:a16="http://schemas.microsoft.com/office/drawing/2014/main" id="{95B7716E-4A32-4257-96AE-C6ED30D31811}"/>
+                  <a16:creationId xmlns:a16="http://schemas.microsoft.com/office/drawing/2014/main" xmlns="" id="{95B7716E-4A32-4257-96AE-C6ED30D31811}"/>
                 </a:ext>
               </a:extLst>
             </p:cNvPr>
@@ -3570,7 +3570,7 @@
             <p:cNvPr id="26" name="CaixaDeTexto 25">
               <a:extLst>
                 <a:ext uri="{FF2B5EF4-FFF2-40B4-BE49-F238E27FC236}">
-                  <a16:creationId xmlns:a16="http://schemas.microsoft.com/office/drawing/2014/main" id="{01B87135-66BB-4424-98D4-30D87F39682B}"/>
+                  <a16:creationId xmlns:a16="http://schemas.microsoft.com/office/drawing/2014/main" xmlns="" id="{01B87135-66BB-4424-98D4-30D87F39682B}"/>
                 </a:ext>
               </a:extLst>
             </p:cNvPr>
@@ -3608,7 +3608,7 @@
           <p:cNvPr id="27" name="CaixaDeTexto 26">
             <a:extLst>
               <a:ext uri="{FF2B5EF4-FFF2-40B4-BE49-F238E27FC236}">
-                <a16:creationId xmlns:a16="http://schemas.microsoft.com/office/drawing/2014/main" id="{1238592B-29D7-4452-8312-F618C2509B80}"/>
+                <a16:creationId xmlns:a16="http://schemas.microsoft.com/office/drawing/2014/main" xmlns="" id="{1238592B-29D7-4452-8312-F618C2509B80}"/>
               </a:ext>
             </a:extLst>
           </p:cNvPr>
@@ -3646,7 +3646,7 @@
           <p:cNvPr id="28" name="CaixaDeTexto 27">
             <a:extLst>
               <a:ext uri="{FF2B5EF4-FFF2-40B4-BE49-F238E27FC236}">
-                <a16:creationId xmlns:a16="http://schemas.microsoft.com/office/drawing/2014/main" id="{BA57D8EF-4557-428E-AE17-0CB898192D8C}"/>
+                <a16:creationId xmlns:a16="http://schemas.microsoft.com/office/drawing/2014/main" xmlns="" id="{BA57D8EF-4557-428E-AE17-0CB898192D8C}"/>
               </a:ext>
             </a:extLst>
           </p:cNvPr>
@@ -3683,7 +3683,7 @@
           <p:cNvPr id="29" name="CaixaDeTexto 28">
             <a:extLst>
               <a:ext uri="{FF2B5EF4-FFF2-40B4-BE49-F238E27FC236}">
-                <a16:creationId xmlns:a16="http://schemas.microsoft.com/office/drawing/2014/main" id="{DA4508C1-D3E7-4097-886E-155CE2EACFC8}"/>
+                <a16:creationId xmlns:a16="http://schemas.microsoft.com/office/drawing/2014/main" xmlns="" id="{DA4508C1-D3E7-4097-886E-155CE2EACFC8}"/>
               </a:ext>
             </a:extLst>
           </p:cNvPr>
@@ -3709,8 +3709,8 @@
           <a:lstStyle/>
           <a:p>
             <a:r>
-              <a:rPr lang="pt-BR" sz="2400" b="1" i="1" dirty="0"/>
-              <a:t>Colaboradores</a:t>
+              <a:rPr lang="pt-BR" sz="2400" b="1" i="1" u="sng" dirty="0" smtClean="0"/>
+              <a:t>Voluntario</a:t>
             </a:r>
             <a:endParaRPr lang="pt-BR" sz="2400" b="1" i="1" u="sng" dirty="0"/>
           </a:p>
@@ -3721,7 +3721,7 @@
           <p:cNvPr id="30" name="CaixaDeTexto 29">
             <a:extLst>
               <a:ext uri="{FF2B5EF4-FFF2-40B4-BE49-F238E27FC236}">
-                <a16:creationId xmlns:a16="http://schemas.microsoft.com/office/drawing/2014/main" id="{41CB29A6-C155-4EA6-9C70-CF13A4EEC4D8}"/>
+                <a16:creationId xmlns:a16="http://schemas.microsoft.com/office/drawing/2014/main" xmlns="" id="{41CB29A6-C155-4EA6-9C70-CF13A4EEC4D8}"/>
               </a:ext>
             </a:extLst>
           </p:cNvPr>
@@ -3764,7 +3764,7 @@
           <p:cNvPr id="31" name="CaixaDeTexto 30">
             <a:extLst>
               <a:ext uri="{FF2B5EF4-FFF2-40B4-BE49-F238E27FC236}">
-                <a16:creationId xmlns:a16="http://schemas.microsoft.com/office/drawing/2014/main" id="{2751E0A1-1592-48F1-B9EA-2B586EEB78F6}"/>
+                <a16:creationId xmlns:a16="http://schemas.microsoft.com/office/drawing/2014/main" xmlns="" id="{2751E0A1-1592-48F1-B9EA-2B586EEB78F6}"/>
               </a:ext>
             </a:extLst>
           </p:cNvPr>
@@ -3801,7 +3801,7 @@
           <p:cNvPr id="9" name="Agrupar 8">
             <a:extLst>
               <a:ext uri="{FF2B5EF4-FFF2-40B4-BE49-F238E27FC236}">
-                <a16:creationId xmlns:a16="http://schemas.microsoft.com/office/drawing/2014/main" id="{13ED3DFB-902B-43CF-ADE3-B1439C04EB68}"/>
+                <a16:creationId xmlns:a16="http://schemas.microsoft.com/office/drawing/2014/main" xmlns="" id="{13ED3DFB-902B-43CF-ADE3-B1439C04EB68}"/>
               </a:ext>
             </a:extLst>
           </p:cNvPr>
@@ -3821,7 +3821,7 @@
             <p:cNvPr id="32" name="CaixaDeTexto 31">
               <a:extLst>
                 <a:ext uri="{FF2B5EF4-FFF2-40B4-BE49-F238E27FC236}">
-                  <a16:creationId xmlns:a16="http://schemas.microsoft.com/office/drawing/2014/main" id="{83044308-7C7B-4ECB-B5BD-5663F8E50452}"/>
+                  <a16:creationId xmlns:a16="http://schemas.microsoft.com/office/drawing/2014/main" xmlns="" id="{83044308-7C7B-4ECB-B5BD-5663F8E50452}"/>
                 </a:ext>
               </a:extLst>
             </p:cNvPr>
@@ -3848,7 +3848,15 @@
             <a:p>
               <a:r>
                 <a:rPr lang="pt-BR" b="1" i="1" dirty="0"/>
-                <a:t>Tornar-se professor </a:t>
+                <a:t>Tornar-se </a:t>
+              </a:r>
+              <a:r>
+                <a:rPr lang="pt-BR" b="1" i="1" dirty="0" smtClean="0"/>
+                <a:t>Colaborador</a:t>
+              </a:r>
+              <a:r>
+                <a:rPr lang="pt-BR" b="1" i="1" dirty="0"/>
+                <a:t> </a:t>
               </a:r>
             </a:p>
           </p:txBody>
@@ -3858,7 +3866,7 @@
             <p:cNvPr id="33" name="CaixaDeTexto 32">
               <a:extLst>
                 <a:ext uri="{FF2B5EF4-FFF2-40B4-BE49-F238E27FC236}">
-                  <a16:creationId xmlns:a16="http://schemas.microsoft.com/office/drawing/2014/main" id="{1CEDF328-811F-4F5C-9F28-668FB5C77838}"/>
+                  <a16:creationId xmlns:a16="http://schemas.microsoft.com/office/drawing/2014/main" xmlns="" id="{1CEDF328-811F-4F5C-9F28-668FB5C77838}"/>
                 </a:ext>
               </a:extLst>
             </p:cNvPr>
@@ -3927,7 +3935,7 @@
           <p:cNvPr id="4" name="Retângulo 3">
             <a:extLst>
               <a:ext uri="{FF2B5EF4-FFF2-40B4-BE49-F238E27FC236}">
-                <a16:creationId xmlns:a16="http://schemas.microsoft.com/office/drawing/2014/main" id="{88C6BF1B-8B81-4A42-B266-9DF3168EF8CB}"/>
+                <a16:creationId xmlns:a16="http://schemas.microsoft.com/office/drawing/2014/main" xmlns="" id="{88C6BF1B-8B81-4A42-B266-9DF3168EF8CB}"/>
               </a:ext>
             </a:extLst>
           </p:cNvPr>
@@ -3936,7 +3944,7 @@
         </p:nvSpPr>
         <p:spPr>
           <a:xfrm>
-            <a:off x="146650" y="110706"/>
+            <a:off x="163005" y="68113"/>
             <a:ext cx="11904450" cy="6570451"/>
           </a:xfrm>
           <a:prstGeom prst="rect">
@@ -3981,7 +3989,7 @@
           <p:cNvPr id="6" name="CaixaDeTexto 5">
             <a:extLst>
               <a:ext uri="{FF2B5EF4-FFF2-40B4-BE49-F238E27FC236}">
-                <a16:creationId xmlns:a16="http://schemas.microsoft.com/office/drawing/2014/main" id="{1270056D-C445-482D-9C8C-EC4698A09D63}"/>
+                <a16:creationId xmlns:a16="http://schemas.microsoft.com/office/drawing/2014/main" xmlns="" id="{1270056D-C445-482D-9C8C-EC4698A09D63}"/>
               </a:ext>
             </a:extLst>
           </p:cNvPr>
@@ -4022,7 +4030,7 @@
           <p:cNvPr id="2" name="Retângulo 1">
             <a:extLst>
               <a:ext uri="{FF2B5EF4-FFF2-40B4-BE49-F238E27FC236}">
-                <a16:creationId xmlns:a16="http://schemas.microsoft.com/office/drawing/2014/main" id="{12043949-80F2-4BA4-ACCA-8E1E73200266}"/>
+                <a16:creationId xmlns:a16="http://schemas.microsoft.com/office/drawing/2014/main" xmlns="" id="{12043949-80F2-4BA4-ACCA-8E1E73200266}"/>
               </a:ext>
             </a:extLst>
           </p:cNvPr>
@@ -4071,7 +4079,7 @@
           <p:cNvPr id="9" name="Conector de Seta Reta 8">
             <a:extLst>
               <a:ext uri="{FF2B5EF4-FFF2-40B4-BE49-F238E27FC236}">
-                <a16:creationId xmlns:a16="http://schemas.microsoft.com/office/drawing/2014/main" id="{BA601A5E-E9FD-4E49-A21A-E1D9795909C3}"/>
+                <a16:creationId xmlns:a16="http://schemas.microsoft.com/office/drawing/2014/main" xmlns="" id="{BA601A5E-E9FD-4E49-A21A-E1D9795909C3}"/>
               </a:ext>
             </a:extLst>
           </p:cNvPr>
@@ -4113,7 +4121,7 @@
           <p:cNvPr id="5" name="Agrupar 4">
             <a:extLst>
               <a:ext uri="{FF2B5EF4-FFF2-40B4-BE49-F238E27FC236}">
-                <a16:creationId xmlns:a16="http://schemas.microsoft.com/office/drawing/2014/main" id="{E6673161-0C4F-48B5-8E89-7B48BFDA7916}"/>
+                <a16:creationId xmlns:a16="http://schemas.microsoft.com/office/drawing/2014/main" xmlns="" id="{E6673161-0C4F-48B5-8E89-7B48BFDA7916}"/>
               </a:ext>
             </a:extLst>
           </p:cNvPr>
@@ -4133,7 +4141,7 @@
             <p:cNvPr id="3" name="Imagem 6" descr="Uma imagem contendo objeto&#10;&#10;Descrição gerada com muito alta confiança">
               <a:extLst>
                 <a:ext uri="{FF2B5EF4-FFF2-40B4-BE49-F238E27FC236}">
-                  <a16:creationId xmlns:a16="http://schemas.microsoft.com/office/drawing/2014/main" id="{BBEA9159-6E91-4172-99DF-56517BBFE5AC}"/>
+                  <a16:creationId xmlns:a16="http://schemas.microsoft.com/office/drawing/2014/main" xmlns="" id="{BBEA9159-6E91-4172-99DF-56517BBFE5AC}"/>
                 </a:ext>
               </a:extLst>
             </p:cNvPr>
@@ -4163,7 +4171,7 @@
             <p:cNvPr id="11" name="CaixaDeTexto 10">
               <a:extLst>
                 <a:ext uri="{FF2B5EF4-FFF2-40B4-BE49-F238E27FC236}">
-                  <a16:creationId xmlns:a16="http://schemas.microsoft.com/office/drawing/2014/main" id="{2B365FA8-96A9-46EF-82C1-1F0ACEB6382C}"/>
+                  <a16:creationId xmlns:a16="http://schemas.microsoft.com/office/drawing/2014/main" xmlns="" id="{2B365FA8-96A9-46EF-82C1-1F0ACEB6382C}"/>
                 </a:ext>
               </a:extLst>
             </p:cNvPr>
@@ -4189,8 +4197,12 @@
             <a:lstStyle/>
             <a:p>
               <a:r>
+                <a:rPr lang="pt-BR" sz="2400" b="1" i="1" dirty="0" smtClean="0"/>
+                <a:t>Voluntario</a:t>
+              </a:r>
+              <a:r>
                 <a:rPr lang="pt-BR" sz="2400" b="1" i="1" dirty="0"/>
-                <a:t>colaborador </a:t>
+                <a:t> </a:t>
               </a:r>
             </a:p>
           </p:txBody>
@@ -4201,7 +4213,7 @@
           <p:cNvPr id="15" name="CaixaDeTexto 14">
             <a:extLst>
               <a:ext uri="{FF2B5EF4-FFF2-40B4-BE49-F238E27FC236}">
-                <a16:creationId xmlns:a16="http://schemas.microsoft.com/office/drawing/2014/main" id="{589ED39B-DB76-4792-9198-978C3E9B327E}"/>
+                <a16:creationId xmlns:a16="http://schemas.microsoft.com/office/drawing/2014/main" xmlns="" id="{589ED39B-DB76-4792-9198-978C3E9B327E}"/>
               </a:ext>
             </a:extLst>
           </p:cNvPr>
@@ -4241,7 +4253,7 @@
           <p:cNvPr id="17" name="Retângulo 16">
             <a:extLst>
               <a:ext uri="{FF2B5EF4-FFF2-40B4-BE49-F238E27FC236}">
-                <a16:creationId xmlns:a16="http://schemas.microsoft.com/office/drawing/2014/main" id="{AAE3C69C-201D-4C86-AAF7-B3DC70259B1F}"/>
+                <a16:creationId xmlns:a16="http://schemas.microsoft.com/office/drawing/2014/main" xmlns="" id="{AAE3C69C-201D-4C86-AAF7-B3DC70259B1F}"/>
               </a:ext>
             </a:extLst>
           </p:cNvPr>
@@ -4290,7 +4302,7 @@
           <p:cNvPr id="20" name="CaixaDeTexto 19">
             <a:extLst>
               <a:ext uri="{FF2B5EF4-FFF2-40B4-BE49-F238E27FC236}">
-                <a16:creationId xmlns:a16="http://schemas.microsoft.com/office/drawing/2014/main" id="{9EF114C1-C8CF-409C-847E-943F96FE0F0F}"/>
+                <a16:creationId xmlns:a16="http://schemas.microsoft.com/office/drawing/2014/main" xmlns="" id="{9EF114C1-C8CF-409C-847E-943F96FE0F0F}"/>
               </a:ext>
             </a:extLst>
           </p:cNvPr>
@@ -4299,8 +4311,8 @@
         </p:nvSpPr>
         <p:spPr>
           <a:xfrm>
-            <a:off x="4735183" y="2607334"/>
-            <a:ext cx="1650521" cy="461665"/>
+            <a:off x="4367065" y="2574728"/>
+            <a:ext cx="2190986" cy="461665"/>
           </a:xfrm>
           <a:prstGeom prst="rect">
             <a:avLst/>
@@ -4316,11 +4328,14 @@
           <a:lstStyle/>
           <a:p>
             <a:r>
-              <a:rPr lang="pt-BR" sz="2400" b="1" i="1" dirty="0">
+              <a:rPr lang="pt-BR" sz="2400" b="1" i="1" dirty="0" smtClean="0">
                 <a:cs typeface="Calibri"/>
               </a:rPr>
-              <a:t>Função </a:t>
+              <a:t>Administração </a:t>
             </a:r>
+            <a:endParaRPr lang="pt-BR" sz="2400" b="1" i="1" dirty="0">
+              <a:cs typeface="Calibri"/>
+            </a:endParaRPr>
           </a:p>
         </p:txBody>
       </p:sp>
@@ -4329,7 +4344,7 @@
           <p:cNvPr id="22" name="Conector de Seta Reta 21">
             <a:extLst>
               <a:ext uri="{FF2B5EF4-FFF2-40B4-BE49-F238E27FC236}">
-                <a16:creationId xmlns:a16="http://schemas.microsoft.com/office/drawing/2014/main" id="{6005A5E0-EFE8-4E81-9A9B-EC939F301038}"/>
+                <a16:creationId xmlns:a16="http://schemas.microsoft.com/office/drawing/2014/main" xmlns="" id="{6005A5E0-EFE8-4E81-9A9B-EC939F301038}"/>
               </a:ext>
             </a:extLst>
           </p:cNvPr>
@@ -4403,7 +4418,7 @@
           <p:cNvPr id="4" name="Retângulo 3">
             <a:extLst>
               <a:ext uri="{FF2B5EF4-FFF2-40B4-BE49-F238E27FC236}">
-                <a16:creationId xmlns:a16="http://schemas.microsoft.com/office/drawing/2014/main" id="{88C6BF1B-8B81-4A42-B266-9DF3168EF8CB}"/>
+                <a16:creationId xmlns:a16="http://schemas.microsoft.com/office/drawing/2014/main" xmlns="" id="{88C6BF1B-8B81-4A42-B266-9DF3168EF8CB}"/>
               </a:ext>
             </a:extLst>
           </p:cNvPr>
@@ -4457,7 +4472,7 @@
           <p:cNvPr id="2" name="CaixaDeTexto 1">
             <a:extLst>
               <a:ext uri="{FF2B5EF4-FFF2-40B4-BE49-F238E27FC236}">
-                <a16:creationId xmlns:a16="http://schemas.microsoft.com/office/drawing/2014/main" id="{80F5CD5A-1914-4EF1-BE32-34B089486C2F}"/>
+                <a16:creationId xmlns:a16="http://schemas.microsoft.com/office/drawing/2014/main" xmlns="" id="{80F5CD5A-1914-4EF1-BE32-34B089486C2F}"/>
               </a:ext>
             </a:extLst>
           </p:cNvPr>
@@ -4498,7 +4513,7 @@
           <p:cNvPr id="5" name="Conector de Seta Reta 4">
             <a:extLst>
               <a:ext uri="{FF2B5EF4-FFF2-40B4-BE49-F238E27FC236}">
-                <a16:creationId xmlns:a16="http://schemas.microsoft.com/office/drawing/2014/main" id="{85E6B2C7-D043-4C92-898F-4F2DEE8A2690}"/>
+                <a16:creationId xmlns:a16="http://schemas.microsoft.com/office/drawing/2014/main" xmlns="" id="{85E6B2C7-D043-4C92-898F-4F2DEE8A2690}"/>
               </a:ext>
             </a:extLst>
           </p:cNvPr>
@@ -4541,7 +4556,7 @@
           <p:cNvPr id="6" name="Conector de Seta Reta 5">
             <a:extLst>
               <a:ext uri="{FF2B5EF4-FFF2-40B4-BE49-F238E27FC236}">
-                <a16:creationId xmlns:a16="http://schemas.microsoft.com/office/drawing/2014/main" id="{9BACC1B6-2F2A-4248-B083-17CB87D6E5BE}"/>
+                <a16:creationId xmlns:a16="http://schemas.microsoft.com/office/drawing/2014/main" xmlns="" id="{9BACC1B6-2F2A-4248-B083-17CB87D6E5BE}"/>
               </a:ext>
             </a:extLst>
           </p:cNvPr>
@@ -4584,7 +4599,7 @@
           <p:cNvPr id="8" name="Retângulo 7">
             <a:extLst>
               <a:ext uri="{FF2B5EF4-FFF2-40B4-BE49-F238E27FC236}">
-                <a16:creationId xmlns:a16="http://schemas.microsoft.com/office/drawing/2014/main" id="{5941647A-72D6-4138-BD44-C48D31273AB1}"/>
+                <a16:creationId xmlns:a16="http://schemas.microsoft.com/office/drawing/2014/main" xmlns="" id="{5941647A-72D6-4138-BD44-C48D31273AB1}"/>
               </a:ext>
             </a:extLst>
           </p:cNvPr>
@@ -4593,8 +4608,8 @@
         </p:nvSpPr>
         <p:spPr>
           <a:xfrm>
-            <a:off x="7506059" y="1474757"/>
-            <a:ext cx="2041583" cy="1207696"/>
+            <a:off x="7068809" y="1474757"/>
+            <a:ext cx="2478834" cy="1207696"/>
           </a:xfrm>
           <a:prstGeom prst="rect">
             <a:avLst/>
@@ -4638,7 +4653,7 @@
           <p:cNvPr id="9" name="CaixaDeTexto 1">
             <a:extLst>
               <a:ext uri="{FF2B5EF4-FFF2-40B4-BE49-F238E27FC236}">
-                <a16:creationId xmlns:a16="http://schemas.microsoft.com/office/drawing/2014/main" id="{7994EBAF-0D7D-41FB-B228-383D0E67FB6C}"/>
+                <a16:creationId xmlns:a16="http://schemas.microsoft.com/office/drawing/2014/main" xmlns="" id="{7994EBAF-0D7D-41FB-B228-383D0E67FB6C}"/>
               </a:ext>
             </a:extLst>
           </p:cNvPr>
@@ -4647,8 +4662,8 @@
         </p:nvSpPr>
         <p:spPr>
           <a:xfrm>
-            <a:off x="7915274" y="1792367"/>
-            <a:ext cx="1664899" cy="523220"/>
+            <a:off x="7134044" y="1816995"/>
+            <a:ext cx="2446129" cy="523220"/>
           </a:xfrm>
           <a:prstGeom prst="rect">
             <a:avLst/>
@@ -4758,10 +4773,16 @@
           </a:lstStyle>
           <a:p>
             <a:r>
+              <a:rPr lang="pt-BR" sz="2800" b="1" i="1" dirty="0" smtClean="0">
+                <a:cs typeface="Calibri"/>
+              </a:rPr>
+              <a:t>Administração</a:t>
+            </a:r>
+            <a:r>
               <a:rPr lang="pt-BR" sz="2800" b="1" i="1" dirty="0">
                 <a:cs typeface="Calibri"/>
               </a:rPr>
-              <a:t>Função </a:t>
+              <a:t> </a:t>
             </a:r>
           </a:p>
         </p:txBody>
@@ -4771,7 +4792,7 @@
           <p:cNvPr id="10" name="Agrupar 9">
             <a:extLst>
               <a:ext uri="{FF2B5EF4-FFF2-40B4-BE49-F238E27FC236}">
-                <a16:creationId xmlns:a16="http://schemas.microsoft.com/office/drawing/2014/main" id="{824586A1-E2A3-4B25-8F44-2AB0D73E8B07}"/>
+                <a16:creationId xmlns:a16="http://schemas.microsoft.com/office/drawing/2014/main" xmlns="" id="{824586A1-E2A3-4B25-8F44-2AB0D73E8B07}"/>
               </a:ext>
             </a:extLst>
           </p:cNvPr>
@@ -4791,7 +4812,7 @@
             <p:cNvPr id="13" name="Imagem 6" descr="Uma imagem contendo objeto&#10;&#10;Descrição gerada com muito alta confiança">
               <a:extLst>
                 <a:ext uri="{FF2B5EF4-FFF2-40B4-BE49-F238E27FC236}">
-                  <a16:creationId xmlns:a16="http://schemas.microsoft.com/office/drawing/2014/main" id="{63824687-0B05-4413-8D3C-5E29C9702638}"/>
+                  <a16:creationId xmlns:a16="http://schemas.microsoft.com/office/drawing/2014/main" xmlns="" id="{63824687-0B05-4413-8D3C-5E29C9702638}"/>
                 </a:ext>
               </a:extLst>
             </p:cNvPr>
@@ -4821,7 +4842,7 @@
             <p:cNvPr id="16" name="CaixaDeTexto 15">
               <a:extLst>
                 <a:ext uri="{FF2B5EF4-FFF2-40B4-BE49-F238E27FC236}">
-                  <a16:creationId xmlns:a16="http://schemas.microsoft.com/office/drawing/2014/main" id="{FDA29973-2090-478C-8CFB-2DD1F5F78F5A}"/>
+                  <a16:creationId xmlns:a16="http://schemas.microsoft.com/office/drawing/2014/main" xmlns="" id="{FDA29973-2090-478C-8CFB-2DD1F5F78F5A}"/>
                 </a:ext>
               </a:extLst>
             </p:cNvPr>
@@ -4847,10 +4868,16 @@
             <a:lstStyle/>
             <a:p>
               <a:r>
+                <a:rPr lang="pt-BR" sz="2400" b="1" i="1" dirty="0" smtClean="0">
+                  <a:cs typeface="Calibri"/>
+                </a:rPr>
+                <a:t>Voluntario</a:t>
+              </a:r>
+              <a:r>
                 <a:rPr lang="pt-BR" sz="2400" b="1" i="1" dirty="0">
                   <a:cs typeface="Calibri"/>
                 </a:rPr>
-                <a:t>Colaborador </a:t>
+                <a:t> </a:t>
               </a:r>
               <a:endParaRPr lang="pt-BR" sz="2400" b="1" i="1" dirty="0"/>
             </a:p>
@@ -4862,7 +4889,7 @@
           <p:cNvPr id="19" name="Conector de Seta Reta 18">
             <a:extLst>
               <a:ext uri="{FF2B5EF4-FFF2-40B4-BE49-F238E27FC236}">
-                <a16:creationId xmlns:a16="http://schemas.microsoft.com/office/drawing/2014/main" id="{7053101E-BA41-4AFA-90EB-5F30E05D5C2A}"/>
+                <a16:creationId xmlns:a16="http://schemas.microsoft.com/office/drawing/2014/main" xmlns="" id="{7053101E-BA41-4AFA-90EB-5F30E05D5C2A}"/>
               </a:ext>
             </a:extLst>
           </p:cNvPr>
@@ -4904,7 +4931,7 @@
           <p:cNvPr id="20" name="Conector de Seta Reta 19">
             <a:extLst>
               <a:ext uri="{FF2B5EF4-FFF2-40B4-BE49-F238E27FC236}">
-                <a16:creationId xmlns:a16="http://schemas.microsoft.com/office/drawing/2014/main" id="{972CCC72-617F-4D78-B3FE-1B11C03D20E1}"/>
+                <a16:creationId xmlns:a16="http://schemas.microsoft.com/office/drawing/2014/main" xmlns="" id="{972CCC72-617F-4D78-B3FE-1B11C03D20E1}"/>
               </a:ext>
             </a:extLst>
           </p:cNvPr>
@@ -4948,7 +4975,7 @@
           <p:cNvPr id="23" name="Conector de Seta Reta 22">
             <a:extLst>
               <a:ext uri="{FF2B5EF4-FFF2-40B4-BE49-F238E27FC236}">
-                <a16:creationId xmlns:a16="http://schemas.microsoft.com/office/drawing/2014/main" id="{6F2A4F03-C5E4-40D7-AA81-EDDBC7B02437}"/>
+                <a16:creationId xmlns:a16="http://schemas.microsoft.com/office/drawing/2014/main" xmlns="" id="{6F2A4F03-C5E4-40D7-AA81-EDDBC7B02437}"/>
               </a:ext>
             </a:extLst>
           </p:cNvPr>
@@ -4987,56 +5014,12 @@
           </a:fontRef>
         </p:style>
       </p:cxnSp>
-      <p:cxnSp>
-        <p:nvCxnSpPr>
-          <p:cNvPr id="24" name="Conector de Seta Reta 23">
-            <a:extLst>
-              <a:ext uri="{FF2B5EF4-FFF2-40B4-BE49-F238E27FC236}">
-                <a16:creationId xmlns:a16="http://schemas.microsoft.com/office/drawing/2014/main" id="{906C5ED3-A468-446B-91A1-50EACFAF704A}"/>
-              </a:ext>
-            </a:extLst>
-          </p:cNvPr>
-          <p:cNvCxnSpPr>
-            <a:cxnSpLocks/>
-          </p:cNvCxnSpPr>
-          <p:nvPr/>
-        </p:nvCxnSpPr>
-        <p:spPr>
-          <a:xfrm flipH="1">
-            <a:off x="3188898" y="3129951"/>
-            <a:ext cx="250165" cy="626852"/>
-          </a:xfrm>
-          <a:prstGeom prst="straightConnector1">
-            <a:avLst/>
-          </a:prstGeom>
-          <a:ln>
-            <a:solidFill>
-              <a:schemeClr val="tx1"/>
-            </a:solidFill>
-            <a:tailEnd type="triangle"/>
-          </a:ln>
-        </p:spPr>
-        <p:style>
-          <a:lnRef idx="1">
-            <a:schemeClr val="accent1"/>
-          </a:lnRef>
-          <a:fillRef idx="0">
-            <a:schemeClr val="accent1"/>
-          </a:fillRef>
-          <a:effectRef idx="0">
-            <a:schemeClr val="accent1"/>
-          </a:effectRef>
-          <a:fontRef idx="minor">
-            <a:schemeClr val="tx1"/>
-          </a:fontRef>
-        </p:style>
-      </p:cxnSp>
       <p:sp>
         <p:nvSpPr>
           <p:cNvPr id="3" name="CaixaDeTexto 2">
             <a:extLst>
               <a:ext uri="{FF2B5EF4-FFF2-40B4-BE49-F238E27FC236}">
-                <a16:creationId xmlns:a16="http://schemas.microsoft.com/office/drawing/2014/main" id="{7FCA1908-EC09-46BB-B633-12D671CD2244}"/>
+                <a16:creationId xmlns:a16="http://schemas.microsoft.com/office/drawing/2014/main" xmlns="" id="{7FCA1908-EC09-46BB-B633-12D671CD2244}"/>
               </a:ext>
             </a:extLst>
           </p:cNvPr>
@@ -5077,7 +5060,7 @@
           <p:cNvPr id="7" name="CaixaDeTexto 6">
             <a:extLst>
               <a:ext uri="{FF2B5EF4-FFF2-40B4-BE49-F238E27FC236}">
-                <a16:creationId xmlns:a16="http://schemas.microsoft.com/office/drawing/2014/main" id="{BF0B844E-C924-4EC3-B27F-D0C0220E391A}"/>
+                <a16:creationId xmlns:a16="http://schemas.microsoft.com/office/drawing/2014/main" xmlns="" id="{BF0B844E-C924-4EC3-B27F-D0C0220E391A}"/>
               </a:ext>
             </a:extLst>
           </p:cNvPr>
@@ -5113,138 +5096,10 @@
       </p:sp>
       <p:grpSp>
         <p:nvGrpSpPr>
-          <p:cNvPr id="11" name="Agrupar 10">
-            <a:extLst>
-              <a:ext uri="{FF2B5EF4-FFF2-40B4-BE49-F238E27FC236}">
-                <a16:creationId xmlns:a16="http://schemas.microsoft.com/office/drawing/2014/main" id="{3203C5F3-8D03-4FC9-88D2-41B3ED0C877D}"/>
-              </a:ext>
-            </a:extLst>
-          </p:cNvPr>
-          <p:cNvGrpSpPr/>
-          <p:nvPr/>
-        </p:nvGrpSpPr>
-        <p:grpSpPr>
-          <a:xfrm>
-            <a:off x="2317630" y="4035725"/>
-            <a:ext cx="2590801" cy="1273834"/>
-            <a:chOff x="2317630" y="4035725"/>
-            <a:chExt cx="2590801" cy="1273834"/>
-          </a:xfrm>
-        </p:grpSpPr>
-        <p:sp>
-          <p:nvSpPr>
-            <p:cNvPr id="25" name="CaixaDeTexto 24">
-              <a:extLst>
-                <a:ext uri="{FF2B5EF4-FFF2-40B4-BE49-F238E27FC236}">
-                  <a16:creationId xmlns:a16="http://schemas.microsoft.com/office/drawing/2014/main" id="{E53E8429-486C-49E3-A88D-600F0719554F}"/>
-                </a:ext>
-              </a:extLst>
-            </p:cNvPr>
-            <p:cNvSpPr txBox="1"/>
-            <p:nvPr/>
-          </p:nvSpPr>
-          <p:spPr>
-            <a:xfrm>
-              <a:off x="2323381" y="4247729"/>
-              <a:ext cx="2585050" cy="923330"/>
-            </a:xfrm>
-            <a:prstGeom prst="rect">
-              <a:avLst/>
-            </a:prstGeom>
-          </p:spPr>
-          <p:txBody>
-            <a:bodyPr rot="0" spcFirstLastPara="0" vertOverflow="overflow" horzOverflow="overflow" vert="horz" wrap="square" lIns="91440" tIns="45720" rIns="91440" bIns="45720" numCol="1" spcCol="0" rtlCol="0" fromWordArt="0" anchor="t" anchorCtr="0" forceAA="0" compatLnSpc="1">
-              <a:prstTxWarp prst="textNoShape">
-                <a:avLst/>
-              </a:prstTxWarp>
-              <a:spAutoFit/>
-            </a:bodyPr>
-            <a:lstStyle/>
-            <a:p>
-              <a:pPr marL="285750" indent="-285750">
-                <a:buFont typeface="Arial"/>
-                <a:buChar char="•"/>
-              </a:pPr>
-              <a:r>
-                <a:rPr lang="pt-BR" b="1" i="1" dirty="0">
-                  <a:cs typeface="Calibri"/>
-                </a:rPr>
-                <a:t>Cumprir regras </a:t>
-              </a:r>
-            </a:p>
-            <a:p>
-              <a:pPr marL="285750" indent="-285750">
-                <a:buFont typeface="Arial"/>
-                <a:buChar char="•"/>
-              </a:pPr>
-              <a:r>
-                <a:rPr lang="pt-BR" b="1" i="1" dirty="0">
-                  <a:cs typeface="Calibri"/>
-                </a:rPr>
-                <a:t>Executar atividades para função </a:t>
-              </a:r>
-            </a:p>
-          </p:txBody>
-        </p:sp>
-        <p:sp>
-          <p:nvSpPr>
-            <p:cNvPr id="12" name="Retângulo 11">
-              <a:extLst>
-                <a:ext uri="{FF2B5EF4-FFF2-40B4-BE49-F238E27FC236}">
-                  <a16:creationId xmlns:a16="http://schemas.microsoft.com/office/drawing/2014/main" id="{E9117F55-F054-4FBD-92C8-EA6D071EE605}"/>
-                </a:ext>
-              </a:extLst>
-            </p:cNvPr>
-            <p:cNvSpPr/>
-            <p:nvPr/>
-          </p:nvSpPr>
-          <p:spPr>
-            <a:xfrm>
-              <a:off x="2317630" y="4035725"/>
-              <a:ext cx="2424022" cy="1273834"/>
-            </a:xfrm>
-            <a:prstGeom prst="rect">
-              <a:avLst/>
-            </a:prstGeom>
-            <a:noFill/>
-            <a:ln>
-              <a:solidFill>
-                <a:schemeClr val="tx1"/>
-              </a:solidFill>
-            </a:ln>
-          </p:spPr>
-          <p:style>
-            <a:lnRef idx="2">
-              <a:schemeClr val="accent1">
-                <a:shade val="50000"/>
-              </a:schemeClr>
-            </a:lnRef>
-            <a:fillRef idx="1">
-              <a:schemeClr val="accent1"/>
-            </a:fillRef>
-            <a:effectRef idx="0">
-              <a:schemeClr val="accent1"/>
-            </a:effectRef>
-            <a:fontRef idx="minor">
-              <a:schemeClr val="lt1"/>
-            </a:fontRef>
-          </p:style>
-          <p:txBody>
-            <a:bodyPr rtlCol="0" anchor="ctr"/>
-            <a:lstStyle/>
-            <a:p>
-              <a:pPr algn="ctr"/>
-              <a:endParaRPr lang="pt-BR" u="sng" dirty="0"/>
-            </a:p>
-          </p:txBody>
-        </p:sp>
-      </p:grpSp>
-      <p:grpSp>
-        <p:nvGrpSpPr>
           <p:cNvPr id="14" name="Agrupar 13">
             <a:extLst>
               <a:ext uri="{FF2B5EF4-FFF2-40B4-BE49-F238E27FC236}">
-                <a16:creationId xmlns:a16="http://schemas.microsoft.com/office/drawing/2014/main" id="{52E15621-7F03-4345-B836-9C7FBBF4EDE5}"/>
+                <a16:creationId xmlns:a16="http://schemas.microsoft.com/office/drawing/2014/main" xmlns="" id="{52E15621-7F03-4345-B836-9C7FBBF4EDE5}"/>
               </a:ext>
             </a:extLst>
           </p:cNvPr>
@@ -5264,7 +5119,7 @@
             <p:cNvPr id="28" name="CaixaDeTexto 27">
               <a:extLst>
                 <a:ext uri="{FF2B5EF4-FFF2-40B4-BE49-F238E27FC236}">
-                  <a16:creationId xmlns:a16="http://schemas.microsoft.com/office/drawing/2014/main" id="{06F24E56-56C0-48DE-B993-B1CF84033F10}"/>
+                  <a16:creationId xmlns:a16="http://schemas.microsoft.com/office/drawing/2014/main" xmlns="" id="{06F24E56-56C0-48DE-B993-B1CF84033F10}"/>
                 </a:ext>
               </a:extLst>
             </p:cNvPr>
@@ -5325,7 +5180,7 @@
             <p:cNvPr id="33" name="Retângulo 32">
               <a:extLst>
                 <a:ext uri="{FF2B5EF4-FFF2-40B4-BE49-F238E27FC236}">
-                  <a16:creationId xmlns:a16="http://schemas.microsoft.com/office/drawing/2014/main" id="{F00C5CCF-AC25-4099-8DD3-8B36FCAF56E7}"/>
+                  <a16:creationId xmlns:a16="http://schemas.microsoft.com/office/drawing/2014/main" xmlns="" id="{F00C5CCF-AC25-4099-8DD3-8B36FCAF56E7}"/>
                 </a:ext>
               </a:extLst>
             </p:cNvPr>
@@ -5408,7 +5263,7 @@
           <p:cNvPr id="4" name="Retângulo 3">
             <a:extLst>
               <a:ext uri="{FF2B5EF4-FFF2-40B4-BE49-F238E27FC236}">
-                <a16:creationId xmlns:a16="http://schemas.microsoft.com/office/drawing/2014/main" id="{CEF9C6BA-8DDB-476C-86AF-98DA05BAF666}"/>
+                <a16:creationId xmlns:a16="http://schemas.microsoft.com/office/drawing/2014/main" xmlns="" id="{CEF9C6BA-8DDB-476C-86AF-98DA05BAF666}"/>
               </a:ext>
             </a:extLst>
           </p:cNvPr>
@@ -5462,7 +5317,7 @@
           <p:cNvPr id="5" name="CaixaDeTexto 4">
             <a:extLst>
               <a:ext uri="{FF2B5EF4-FFF2-40B4-BE49-F238E27FC236}">
-                <a16:creationId xmlns:a16="http://schemas.microsoft.com/office/drawing/2014/main" id="{0DB7A970-3CC1-4626-9F9D-866AD68C58EA}"/>
+                <a16:creationId xmlns:a16="http://schemas.microsoft.com/office/drawing/2014/main" xmlns="" id="{0DB7A970-3CC1-4626-9F9D-866AD68C58EA}"/>
               </a:ext>
             </a:extLst>
           </p:cNvPr>
@@ -5503,7 +5358,7 @@
           <p:cNvPr id="6" name="Imagem 6" descr="Uma imagem contendo objeto&#10;&#10;Descrição gerada com muito alta confiança">
             <a:extLst>
               <a:ext uri="{FF2B5EF4-FFF2-40B4-BE49-F238E27FC236}">
-                <a16:creationId xmlns:a16="http://schemas.microsoft.com/office/drawing/2014/main" id="{AE41C0EB-3270-451D-B583-48485D46168E}"/>
+                <a16:creationId xmlns:a16="http://schemas.microsoft.com/office/drawing/2014/main" xmlns="" id="{AE41C0EB-3270-451D-B583-48485D46168E}"/>
               </a:ext>
             </a:extLst>
           </p:cNvPr>
@@ -5533,7 +5388,7 @@
           <p:cNvPr id="7" name="Retângulo 6">
             <a:extLst>
               <a:ext uri="{FF2B5EF4-FFF2-40B4-BE49-F238E27FC236}">
-                <a16:creationId xmlns:a16="http://schemas.microsoft.com/office/drawing/2014/main" id="{14F074DC-6DCC-4E08-9917-5BE79B7E65BA}"/>
+                <a16:creationId xmlns:a16="http://schemas.microsoft.com/office/drawing/2014/main" xmlns="" id="{14F074DC-6DCC-4E08-9917-5BE79B7E65BA}"/>
               </a:ext>
             </a:extLst>
           </p:cNvPr>
@@ -5582,7 +5437,7 @@
           <p:cNvPr id="11" name="Conector de Seta Reta 10">
             <a:extLst>
               <a:ext uri="{FF2B5EF4-FFF2-40B4-BE49-F238E27FC236}">
-                <a16:creationId xmlns:a16="http://schemas.microsoft.com/office/drawing/2014/main" id="{AF990622-0DAD-4CF8-B897-C60879C5B414}"/>
+                <a16:creationId xmlns:a16="http://schemas.microsoft.com/office/drawing/2014/main" xmlns="" id="{AF990622-0DAD-4CF8-B897-C60879C5B414}"/>
               </a:ext>
             </a:extLst>
           </p:cNvPr>
@@ -5626,7 +5481,7 @@
           <p:cNvPr id="13" name="CaixaDeTexto 12">
             <a:extLst>
               <a:ext uri="{FF2B5EF4-FFF2-40B4-BE49-F238E27FC236}">
-                <a16:creationId xmlns:a16="http://schemas.microsoft.com/office/drawing/2014/main" id="{B9BDE6EE-83E2-4E9F-9DB8-ABE3AF877CCB}"/>
+                <a16:creationId xmlns:a16="http://schemas.microsoft.com/office/drawing/2014/main" xmlns="" id="{B9BDE6EE-83E2-4E9F-9DB8-ABE3AF877CCB}"/>
               </a:ext>
             </a:extLst>
           </p:cNvPr>
@@ -5663,7 +5518,7 @@
           <p:cNvPr id="29" name="CaixaDeTexto 28">
             <a:extLst>
               <a:ext uri="{FF2B5EF4-FFF2-40B4-BE49-F238E27FC236}">
-                <a16:creationId xmlns:a16="http://schemas.microsoft.com/office/drawing/2014/main" id="{A6762E50-5323-4BE0-915A-EB8EEDBCB00C}"/>
+                <a16:creationId xmlns:a16="http://schemas.microsoft.com/office/drawing/2014/main" xmlns="" id="{A6762E50-5323-4BE0-915A-EB8EEDBCB00C}"/>
               </a:ext>
             </a:extLst>
           </p:cNvPr>
@@ -5703,7 +5558,7 @@
           <p:cNvPr id="30" name="Retângulo 29">
             <a:extLst>
               <a:ext uri="{FF2B5EF4-FFF2-40B4-BE49-F238E27FC236}">
-                <a16:creationId xmlns:a16="http://schemas.microsoft.com/office/drawing/2014/main" id="{3AA62CBD-64E7-4BA1-BBCB-45C4726787D0}"/>
+                <a16:creationId xmlns:a16="http://schemas.microsoft.com/office/drawing/2014/main" xmlns="" id="{3AA62CBD-64E7-4BA1-BBCB-45C4726787D0}"/>
               </a:ext>
             </a:extLst>
           </p:cNvPr>
@@ -5755,7 +5610,7 @@
           <p:cNvPr id="31" name="CaixaDeTexto 30">
             <a:extLst>
               <a:ext uri="{FF2B5EF4-FFF2-40B4-BE49-F238E27FC236}">
-                <a16:creationId xmlns:a16="http://schemas.microsoft.com/office/drawing/2014/main" id="{2B86E22E-128E-40A7-9AA7-48626AD2DFA2}"/>
+                <a16:creationId xmlns:a16="http://schemas.microsoft.com/office/drawing/2014/main" xmlns="" id="{2B86E22E-128E-40A7-9AA7-48626AD2DFA2}"/>
               </a:ext>
             </a:extLst>
           </p:cNvPr>
@@ -5824,7 +5679,7 @@
           <p:cNvPr id="23" name="Agrupar 22">
             <a:extLst>
               <a:ext uri="{FF2B5EF4-FFF2-40B4-BE49-F238E27FC236}">
-                <a16:creationId xmlns:a16="http://schemas.microsoft.com/office/drawing/2014/main" id="{0AAE26CE-50AE-4585-8600-8F5CE0F550A2}"/>
+                <a16:creationId xmlns:a16="http://schemas.microsoft.com/office/drawing/2014/main" xmlns="" id="{0AAE26CE-50AE-4585-8600-8F5CE0F550A2}"/>
               </a:ext>
             </a:extLst>
           </p:cNvPr>
@@ -5844,7 +5699,7 @@
             <p:cNvPr id="4" name="Retângulo 3">
               <a:extLst>
                 <a:ext uri="{FF2B5EF4-FFF2-40B4-BE49-F238E27FC236}">
-                  <a16:creationId xmlns:a16="http://schemas.microsoft.com/office/drawing/2014/main" id="{88C6BF1B-8B81-4A42-B266-9DF3168EF8CB}"/>
+                  <a16:creationId xmlns:a16="http://schemas.microsoft.com/office/drawing/2014/main" xmlns="" id="{88C6BF1B-8B81-4A42-B266-9DF3168EF8CB}"/>
                 </a:ext>
               </a:extLst>
             </p:cNvPr>
@@ -5898,7 +5753,7 @@
             <p:cNvPr id="5" name="CaixaDeTexto 4">
               <a:extLst>
                 <a:ext uri="{FF2B5EF4-FFF2-40B4-BE49-F238E27FC236}">
-                  <a16:creationId xmlns:a16="http://schemas.microsoft.com/office/drawing/2014/main" id="{1AEAEC07-A165-4D26-BBD3-BB0A2EE6FDCE}"/>
+                  <a16:creationId xmlns:a16="http://schemas.microsoft.com/office/drawing/2014/main" xmlns="" id="{1AEAEC07-A165-4D26-BBD3-BB0A2EE6FDCE}"/>
                 </a:ext>
               </a:extLst>
             </p:cNvPr>
@@ -5939,7 +5794,7 @@
             <p:cNvPr id="6" name="Conector de Seta Reta 5">
               <a:extLst>
                 <a:ext uri="{FF2B5EF4-FFF2-40B4-BE49-F238E27FC236}">
-                  <a16:creationId xmlns:a16="http://schemas.microsoft.com/office/drawing/2014/main" id="{3CA215E8-6B7A-4EE8-B19D-43965C2FFF51}"/>
+                  <a16:creationId xmlns:a16="http://schemas.microsoft.com/office/drawing/2014/main" xmlns="" id="{3CA215E8-6B7A-4EE8-B19D-43965C2FFF51}"/>
                 </a:ext>
               </a:extLst>
             </p:cNvPr>
@@ -5982,7 +5837,7 @@
             <p:cNvPr id="7" name="Retângulo 6">
               <a:extLst>
                 <a:ext uri="{FF2B5EF4-FFF2-40B4-BE49-F238E27FC236}">
-                  <a16:creationId xmlns:a16="http://schemas.microsoft.com/office/drawing/2014/main" id="{B85D8224-4133-4070-A5AB-3AE9CA1C3903}"/>
+                  <a16:creationId xmlns:a16="http://schemas.microsoft.com/office/drawing/2014/main" xmlns="" id="{B85D8224-4133-4070-A5AB-3AE9CA1C3903}"/>
                 </a:ext>
               </a:extLst>
             </p:cNvPr>
@@ -6036,7 +5891,7 @@
             <p:cNvPr id="8" name="CaixaDeTexto 1">
               <a:extLst>
                 <a:ext uri="{FF2B5EF4-FFF2-40B4-BE49-F238E27FC236}">
-                  <a16:creationId xmlns:a16="http://schemas.microsoft.com/office/drawing/2014/main" id="{BF9502B6-F748-4FC4-B6F9-18A1E394C2BC}"/>
+                  <a16:creationId xmlns:a16="http://schemas.microsoft.com/office/drawing/2014/main" xmlns="" id="{BF9502B6-F748-4FC4-B6F9-18A1E394C2BC}"/>
                 </a:ext>
               </a:extLst>
             </p:cNvPr>
@@ -6170,7 +6025,7 @@
             <p:cNvPr id="9" name="Agrupar 8">
               <a:extLst>
                 <a:ext uri="{FF2B5EF4-FFF2-40B4-BE49-F238E27FC236}">
-                  <a16:creationId xmlns:a16="http://schemas.microsoft.com/office/drawing/2014/main" id="{70EC6F40-B78A-4FA6-AEC6-D87F09F8F858}"/>
+                  <a16:creationId xmlns:a16="http://schemas.microsoft.com/office/drawing/2014/main" xmlns="" id="{70EC6F40-B78A-4FA6-AEC6-D87F09F8F858}"/>
                 </a:ext>
               </a:extLst>
             </p:cNvPr>
@@ -6190,7 +6045,7 @@
               <p:cNvPr id="10" name="Imagem 6" descr="Uma imagem contendo objeto&#10;&#10;Descrição gerada com muito alta confiança">
                 <a:extLst>
                   <a:ext uri="{FF2B5EF4-FFF2-40B4-BE49-F238E27FC236}">
-                    <a16:creationId xmlns:a16="http://schemas.microsoft.com/office/drawing/2014/main" id="{2EDB6AAB-80CB-4F3F-8B37-01FF56F250D4}"/>
+                    <a16:creationId xmlns:a16="http://schemas.microsoft.com/office/drawing/2014/main" xmlns="" id="{2EDB6AAB-80CB-4F3F-8B37-01FF56F250D4}"/>
                   </a:ext>
                 </a:extLst>
               </p:cNvPr>
@@ -6220,7 +6075,7 @@
               <p:cNvPr id="11" name="CaixaDeTexto 10">
                 <a:extLst>
                   <a:ext uri="{FF2B5EF4-FFF2-40B4-BE49-F238E27FC236}">
-                    <a16:creationId xmlns:a16="http://schemas.microsoft.com/office/drawing/2014/main" id="{D2F17BB0-905F-429F-BA48-277307751C61}"/>
+                    <a16:creationId xmlns:a16="http://schemas.microsoft.com/office/drawing/2014/main" xmlns="" id="{D2F17BB0-905F-429F-BA48-277307751C61}"/>
                   </a:ext>
                 </a:extLst>
               </p:cNvPr>
@@ -6261,7 +6116,7 @@
             <p:cNvPr id="12" name="Conector de Seta Reta 11">
               <a:extLst>
                 <a:ext uri="{FF2B5EF4-FFF2-40B4-BE49-F238E27FC236}">
-                  <a16:creationId xmlns:a16="http://schemas.microsoft.com/office/drawing/2014/main" id="{AADFC01F-DE98-49E6-BCF3-4D209C12920F}"/>
+                  <a16:creationId xmlns:a16="http://schemas.microsoft.com/office/drawing/2014/main" xmlns="" id="{AADFC01F-DE98-49E6-BCF3-4D209C12920F}"/>
                 </a:ext>
               </a:extLst>
             </p:cNvPr>
@@ -6305,7 +6160,7 @@
             <p:cNvPr id="13" name="Conector de Seta Reta 12">
               <a:extLst>
                 <a:ext uri="{FF2B5EF4-FFF2-40B4-BE49-F238E27FC236}">
-                  <a16:creationId xmlns:a16="http://schemas.microsoft.com/office/drawing/2014/main" id="{38305CCA-0FC0-4C75-8071-F8E8AE25FE80}"/>
+                  <a16:creationId xmlns:a16="http://schemas.microsoft.com/office/drawing/2014/main" xmlns="" id="{38305CCA-0FC0-4C75-8071-F8E8AE25FE80}"/>
                 </a:ext>
               </a:extLst>
             </p:cNvPr>
@@ -6344,56 +6199,12 @@
             </a:fontRef>
           </p:style>
         </p:cxnSp>
-        <p:cxnSp>
-          <p:nvCxnSpPr>
-            <p:cNvPr id="14" name="Conector de Seta Reta 13">
-              <a:extLst>
-                <a:ext uri="{FF2B5EF4-FFF2-40B4-BE49-F238E27FC236}">
-                  <a16:creationId xmlns:a16="http://schemas.microsoft.com/office/drawing/2014/main" id="{1CB3E764-D4E0-43E2-8064-498B00BB42F3}"/>
-                </a:ext>
-              </a:extLst>
-            </p:cNvPr>
-            <p:cNvCxnSpPr>
-              <a:cxnSpLocks/>
-            </p:cNvCxnSpPr>
-            <p:nvPr/>
-          </p:nvCxnSpPr>
-          <p:spPr>
-            <a:xfrm>
-              <a:off x="3331233" y="2943337"/>
-              <a:ext cx="0" cy="1603263"/>
-            </a:xfrm>
-            <a:prstGeom prst="straightConnector1">
-              <a:avLst/>
-            </a:prstGeom>
-            <a:ln>
-              <a:solidFill>
-                <a:schemeClr val="tx1"/>
-              </a:solidFill>
-              <a:tailEnd type="triangle"/>
-            </a:ln>
-          </p:spPr>
-          <p:style>
-            <a:lnRef idx="1">
-              <a:schemeClr val="accent1"/>
-            </a:lnRef>
-            <a:fillRef idx="0">
-              <a:schemeClr val="accent1"/>
-            </a:fillRef>
-            <a:effectRef idx="0">
-              <a:schemeClr val="accent1"/>
-            </a:effectRef>
-            <a:fontRef idx="minor">
-              <a:schemeClr val="tx1"/>
-            </a:fontRef>
-          </p:style>
-        </p:cxnSp>
         <p:sp>
           <p:nvSpPr>
             <p:cNvPr id="15" name="CaixaDeTexto 14">
               <a:extLst>
                 <a:ext uri="{FF2B5EF4-FFF2-40B4-BE49-F238E27FC236}">
-                  <a16:creationId xmlns:a16="http://schemas.microsoft.com/office/drawing/2014/main" id="{1072E68A-2CFE-47FF-8235-BA0891062FB7}"/>
+                  <a16:creationId xmlns:a16="http://schemas.microsoft.com/office/drawing/2014/main" xmlns="" id="{1072E68A-2CFE-47FF-8235-BA0891062FB7}"/>
                 </a:ext>
               </a:extLst>
             </p:cNvPr>
@@ -6434,7 +6245,7 @@
             <p:cNvPr id="16" name="CaixaDeTexto 15">
               <a:extLst>
                 <a:ext uri="{FF2B5EF4-FFF2-40B4-BE49-F238E27FC236}">
-                  <a16:creationId xmlns:a16="http://schemas.microsoft.com/office/drawing/2014/main" id="{5FE7BE5C-46D4-4852-A65D-C8065BA82FF9}"/>
+                  <a16:creationId xmlns:a16="http://schemas.microsoft.com/office/drawing/2014/main" xmlns="" id="{5FE7BE5C-46D4-4852-A65D-C8065BA82FF9}"/>
                 </a:ext>
               </a:extLst>
             </p:cNvPr>
@@ -6470,131 +6281,10 @@
         </p:sp>
         <p:grpSp>
           <p:nvGrpSpPr>
-            <p:cNvPr id="17" name="Agrupar 16">
-              <a:extLst>
-                <a:ext uri="{FF2B5EF4-FFF2-40B4-BE49-F238E27FC236}">
-                  <a16:creationId xmlns:a16="http://schemas.microsoft.com/office/drawing/2014/main" id="{B6C9BB97-E637-4DA4-B45B-2B4703E05637}"/>
-                </a:ext>
-              </a:extLst>
-            </p:cNvPr>
-            <p:cNvGrpSpPr/>
-            <p:nvPr/>
-          </p:nvGrpSpPr>
-          <p:grpSpPr>
-            <a:xfrm>
-              <a:off x="2449361" y="4638328"/>
-              <a:ext cx="2843298" cy="974340"/>
-              <a:chOff x="2317630" y="4035725"/>
-              <a:chExt cx="2843298" cy="974340"/>
-            </a:xfrm>
-          </p:grpSpPr>
-          <p:sp>
-            <p:nvSpPr>
-              <p:cNvPr id="18" name="CaixaDeTexto 17">
-                <a:extLst>
-                  <a:ext uri="{FF2B5EF4-FFF2-40B4-BE49-F238E27FC236}">
-                    <a16:creationId xmlns:a16="http://schemas.microsoft.com/office/drawing/2014/main" id="{CB296BE0-CA60-4714-9302-1E0E1D9B66AE}"/>
-                  </a:ext>
-                </a:extLst>
-              </p:cNvPr>
-              <p:cNvSpPr txBox="1"/>
-              <p:nvPr/>
-            </p:nvSpPr>
-            <p:spPr>
-              <a:xfrm>
-                <a:off x="2575878" y="4310948"/>
-                <a:ext cx="2585050" cy="646331"/>
-              </a:xfrm>
-              <a:prstGeom prst="rect">
-                <a:avLst/>
-              </a:prstGeom>
-            </p:spPr>
-            <p:txBody>
-              <a:bodyPr rot="0" spcFirstLastPara="0" vertOverflow="overflow" horzOverflow="overflow" vert="horz" wrap="square" lIns="91440" tIns="45720" rIns="91440" bIns="45720" numCol="1" spcCol="0" rtlCol="0" fromWordArt="0" anchor="t" anchorCtr="0" forceAA="0" compatLnSpc="1">
-                <a:prstTxWarp prst="textNoShape">
-                  <a:avLst/>
-                </a:prstTxWarp>
-                <a:spAutoFit/>
-              </a:bodyPr>
-              <a:lstStyle/>
-              <a:p>
-                <a:pPr marL="285750" indent="-285750">
-                  <a:buFont typeface="Arial"/>
-                  <a:buChar char="•"/>
-                </a:pPr>
-                <a:r>
-                  <a:rPr lang="pt-BR" b="1" i="1" dirty="0">
-                    <a:cs typeface="Calibri"/>
-                  </a:rPr>
-                  <a:t>Doar </a:t>
-                </a:r>
-              </a:p>
-              <a:p>
-                <a:endParaRPr lang="pt-BR" b="1" i="1" dirty="0">
-                  <a:cs typeface="Calibri"/>
-                </a:endParaRPr>
-              </a:p>
-            </p:txBody>
-          </p:sp>
-          <p:sp>
-            <p:nvSpPr>
-              <p:cNvPr id="19" name="Retângulo 18">
-                <a:extLst>
-                  <a:ext uri="{FF2B5EF4-FFF2-40B4-BE49-F238E27FC236}">
-                    <a16:creationId xmlns:a16="http://schemas.microsoft.com/office/drawing/2014/main" id="{285C8E95-951E-4728-AA45-1EB5CD817E77}"/>
-                  </a:ext>
-                </a:extLst>
-              </p:cNvPr>
-              <p:cNvSpPr/>
-              <p:nvPr/>
-            </p:nvSpPr>
-            <p:spPr>
-              <a:xfrm>
-                <a:off x="2317630" y="4035725"/>
-                <a:ext cx="2025770" cy="974340"/>
-              </a:xfrm>
-              <a:prstGeom prst="rect">
-                <a:avLst/>
-              </a:prstGeom>
-              <a:noFill/>
-              <a:ln>
-                <a:solidFill>
-                  <a:schemeClr val="tx1"/>
-                </a:solidFill>
-              </a:ln>
-            </p:spPr>
-            <p:style>
-              <a:lnRef idx="2">
-                <a:schemeClr val="accent1">
-                  <a:shade val="50000"/>
-                </a:schemeClr>
-              </a:lnRef>
-              <a:fillRef idx="1">
-                <a:schemeClr val="accent1"/>
-              </a:fillRef>
-              <a:effectRef idx="0">
-                <a:schemeClr val="accent1"/>
-              </a:effectRef>
-              <a:fontRef idx="minor">
-                <a:schemeClr val="lt1"/>
-              </a:fontRef>
-            </p:style>
-            <p:txBody>
-              <a:bodyPr rtlCol="0" anchor="ctr"/>
-              <a:lstStyle/>
-              <a:p>
-                <a:pPr algn="ctr"/>
-                <a:endParaRPr lang="pt-BR" u="sng" dirty="0"/>
-              </a:p>
-            </p:txBody>
-          </p:sp>
-        </p:grpSp>
-        <p:grpSp>
-          <p:nvGrpSpPr>
             <p:cNvPr id="20" name="Agrupar 19">
               <a:extLst>
                 <a:ext uri="{FF2B5EF4-FFF2-40B4-BE49-F238E27FC236}">
-                  <a16:creationId xmlns:a16="http://schemas.microsoft.com/office/drawing/2014/main" id="{563ABF16-B5E2-4231-A0F2-37CCF9F052D9}"/>
+                  <a16:creationId xmlns:a16="http://schemas.microsoft.com/office/drawing/2014/main" xmlns="" id="{563ABF16-B5E2-4231-A0F2-37CCF9F052D9}"/>
                 </a:ext>
               </a:extLst>
             </p:cNvPr>
@@ -6614,7 +6304,7 @@
               <p:cNvPr id="21" name="CaixaDeTexto 20">
                 <a:extLst>
                   <a:ext uri="{FF2B5EF4-FFF2-40B4-BE49-F238E27FC236}">
-                    <a16:creationId xmlns:a16="http://schemas.microsoft.com/office/drawing/2014/main" id="{65293A4E-D1A4-4BFC-B18A-9C448A820B5D}"/>
+                    <a16:creationId xmlns:a16="http://schemas.microsoft.com/office/drawing/2014/main" xmlns="" id="{65293A4E-D1A4-4BFC-B18A-9C448A820B5D}"/>
                   </a:ext>
                 </a:extLst>
               </p:cNvPr>
@@ -6684,7 +6374,7 @@
               <p:cNvPr id="22" name="Retângulo 21">
                 <a:extLst>
                   <a:ext uri="{FF2B5EF4-FFF2-40B4-BE49-F238E27FC236}">
-                    <a16:creationId xmlns:a16="http://schemas.microsoft.com/office/drawing/2014/main" id="{03B94166-CC62-4486-B433-F9A38735B863}"/>
+                    <a16:creationId xmlns:a16="http://schemas.microsoft.com/office/drawing/2014/main" xmlns="" id="{03B94166-CC62-4486-B433-F9A38735B863}"/>
                   </a:ext>
                 </a:extLst>
               </p:cNvPr>
@@ -6737,7 +6427,7 @@
             <p:cNvPr id="24" name="Conector de Seta Reta 23">
               <a:extLst>
                 <a:ext uri="{FF2B5EF4-FFF2-40B4-BE49-F238E27FC236}">
-                  <a16:creationId xmlns:a16="http://schemas.microsoft.com/office/drawing/2014/main" id="{C7F7721A-A33C-4610-8D10-0D8225B21C1F}"/>
+                  <a16:creationId xmlns:a16="http://schemas.microsoft.com/office/drawing/2014/main" xmlns="" id="{C7F7721A-A33C-4610-8D10-0D8225B21C1F}"/>
                 </a:ext>
               </a:extLst>
             </p:cNvPr>
@@ -6781,7 +6471,7 @@
           <p:cNvPr id="25" name="Conector de Seta Reta 24">
             <a:extLst>
               <a:ext uri="{FF2B5EF4-FFF2-40B4-BE49-F238E27FC236}">
-                <a16:creationId xmlns:a16="http://schemas.microsoft.com/office/drawing/2014/main" id="{1A2793BB-33AA-4F95-8502-5B9663DA9DAF}"/>
+                <a16:creationId xmlns:a16="http://schemas.microsoft.com/office/drawing/2014/main" xmlns="" id="{1A2793BB-33AA-4F95-8502-5B9663DA9DAF}"/>
               </a:ext>
             </a:extLst>
           </p:cNvPr>
@@ -6855,7 +6545,7 @@
           <p:cNvPr id="4" name="CaixaDeTexto 3">
             <a:extLst>
               <a:ext uri="{FF2B5EF4-FFF2-40B4-BE49-F238E27FC236}">
-                <a16:creationId xmlns:a16="http://schemas.microsoft.com/office/drawing/2014/main" id="{20A94597-87AA-482D-A4BF-545EA0215DBC}"/>
+                <a16:creationId xmlns:a16="http://schemas.microsoft.com/office/drawing/2014/main" xmlns="" id="{20A94597-87AA-482D-A4BF-545EA0215DBC}"/>
               </a:ext>
             </a:extLst>
           </p:cNvPr>
@@ -6891,7 +6581,7 @@
           <p:cNvPr id="5" name="CaixaDeTexto 4">
             <a:extLst>
               <a:ext uri="{FF2B5EF4-FFF2-40B4-BE49-F238E27FC236}">
-                <a16:creationId xmlns:a16="http://schemas.microsoft.com/office/drawing/2014/main" id="{1B8765AE-70BA-4CEF-A9F7-2847A44362F3}"/>
+                <a16:creationId xmlns:a16="http://schemas.microsoft.com/office/drawing/2014/main" xmlns="" id="{1B8765AE-70BA-4CEF-A9F7-2847A44362F3}"/>
               </a:ext>
             </a:extLst>
           </p:cNvPr>
@@ -7062,7 +6752,7 @@
           <p:cNvPr id="4" name="Retângulo 3">
             <a:extLst>
               <a:ext uri="{FF2B5EF4-FFF2-40B4-BE49-F238E27FC236}">
-                <a16:creationId xmlns:a16="http://schemas.microsoft.com/office/drawing/2014/main" id="{88C6BF1B-8B81-4A42-B266-9DF3168EF8CB}"/>
+                <a16:creationId xmlns:a16="http://schemas.microsoft.com/office/drawing/2014/main" xmlns="" id="{88C6BF1B-8B81-4A42-B266-9DF3168EF8CB}"/>
               </a:ext>
             </a:extLst>
           </p:cNvPr>
@@ -7116,7 +6806,7 @@
           <p:cNvPr id="6" name="CaixaDeTexto 5">
             <a:extLst>
               <a:ext uri="{FF2B5EF4-FFF2-40B4-BE49-F238E27FC236}">
-                <a16:creationId xmlns:a16="http://schemas.microsoft.com/office/drawing/2014/main" id="{1270056D-C445-482D-9C8C-EC4698A09D63}"/>
+                <a16:creationId xmlns:a16="http://schemas.microsoft.com/office/drawing/2014/main" xmlns="" id="{1270056D-C445-482D-9C8C-EC4698A09D63}"/>
               </a:ext>
             </a:extLst>
           </p:cNvPr>
@@ -7157,7 +6847,7 @@
           <p:cNvPr id="2" name="Retângulo 1">
             <a:extLst>
               <a:ext uri="{FF2B5EF4-FFF2-40B4-BE49-F238E27FC236}">
-                <a16:creationId xmlns:a16="http://schemas.microsoft.com/office/drawing/2014/main" id="{12043949-80F2-4BA4-ACCA-8E1E73200266}"/>
+                <a16:creationId xmlns:a16="http://schemas.microsoft.com/office/drawing/2014/main" xmlns="" id="{12043949-80F2-4BA4-ACCA-8E1E73200266}"/>
               </a:ext>
             </a:extLst>
           </p:cNvPr>
@@ -7206,7 +6896,7 @@
           <p:cNvPr id="3" name="Imagem 6" descr="Uma imagem contendo objeto&#10;&#10;Descrição gerada com muito alta confiança">
             <a:extLst>
               <a:ext uri="{FF2B5EF4-FFF2-40B4-BE49-F238E27FC236}">
-                <a16:creationId xmlns:a16="http://schemas.microsoft.com/office/drawing/2014/main" id="{BBEA9159-6E91-4172-99DF-56517BBFE5AC}"/>
+                <a16:creationId xmlns:a16="http://schemas.microsoft.com/office/drawing/2014/main" xmlns="" id="{BBEA9159-6E91-4172-99DF-56517BBFE5AC}"/>
               </a:ext>
             </a:extLst>
           </p:cNvPr>
@@ -7236,7 +6926,7 @@
           <p:cNvPr id="9" name="Conector de Seta Reta 8">
             <a:extLst>
               <a:ext uri="{FF2B5EF4-FFF2-40B4-BE49-F238E27FC236}">
-                <a16:creationId xmlns:a16="http://schemas.microsoft.com/office/drawing/2014/main" id="{BA601A5E-E9FD-4E49-A21A-E1D9795909C3}"/>
+                <a16:creationId xmlns:a16="http://schemas.microsoft.com/office/drawing/2014/main" xmlns="" id="{BA601A5E-E9FD-4E49-A21A-E1D9795909C3}"/>
               </a:ext>
             </a:extLst>
           </p:cNvPr>
@@ -7278,7 +6968,7 @@
           <p:cNvPr id="11" name="CaixaDeTexto 10">
             <a:extLst>
               <a:ext uri="{FF2B5EF4-FFF2-40B4-BE49-F238E27FC236}">
-                <a16:creationId xmlns:a16="http://schemas.microsoft.com/office/drawing/2014/main" id="{2B365FA8-96A9-46EF-82C1-1F0ACEB6382C}"/>
+                <a16:creationId xmlns:a16="http://schemas.microsoft.com/office/drawing/2014/main" xmlns="" id="{2B365FA8-96A9-46EF-82C1-1F0ACEB6382C}"/>
               </a:ext>
             </a:extLst>
           </p:cNvPr>
@@ -7315,7 +7005,7 @@
           <p:cNvPr id="15" name="CaixaDeTexto 14">
             <a:extLst>
               <a:ext uri="{FF2B5EF4-FFF2-40B4-BE49-F238E27FC236}">
-                <a16:creationId xmlns:a16="http://schemas.microsoft.com/office/drawing/2014/main" id="{589ED39B-DB76-4792-9198-978C3E9B327E}"/>
+                <a16:creationId xmlns:a16="http://schemas.microsoft.com/office/drawing/2014/main" xmlns="" id="{589ED39B-DB76-4792-9198-978C3E9B327E}"/>
               </a:ext>
             </a:extLst>
           </p:cNvPr>
@@ -7355,7 +7045,7 @@
           <p:cNvPr id="17" name="Retângulo 16">
             <a:extLst>
               <a:ext uri="{FF2B5EF4-FFF2-40B4-BE49-F238E27FC236}">
-                <a16:creationId xmlns:a16="http://schemas.microsoft.com/office/drawing/2014/main" id="{AAE3C69C-201D-4C86-AAF7-B3DC70259B1F}"/>
+                <a16:creationId xmlns:a16="http://schemas.microsoft.com/office/drawing/2014/main" xmlns="" id="{AAE3C69C-201D-4C86-AAF7-B3DC70259B1F}"/>
               </a:ext>
             </a:extLst>
           </p:cNvPr>
@@ -7404,7 +7094,7 @@
           <p:cNvPr id="19" name="Retângulo 18">
             <a:extLst>
               <a:ext uri="{FF2B5EF4-FFF2-40B4-BE49-F238E27FC236}">
-                <a16:creationId xmlns:a16="http://schemas.microsoft.com/office/drawing/2014/main" id="{B1DA2E97-81CC-4053-8E24-07F96ED0FDF9}"/>
+                <a16:creationId xmlns:a16="http://schemas.microsoft.com/office/drawing/2014/main" xmlns="" id="{B1DA2E97-81CC-4053-8E24-07F96ED0FDF9}"/>
               </a:ext>
             </a:extLst>
           </p:cNvPr>
@@ -7453,7 +7143,7 @@
           <p:cNvPr id="20" name="CaixaDeTexto 19">
             <a:extLst>
               <a:ext uri="{FF2B5EF4-FFF2-40B4-BE49-F238E27FC236}">
-                <a16:creationId xmlns:a16="http://schemas.microsoft.com/office/drawing/2014/main" id="{9EF114C1-C8CF-409C-847E-943F96FE0F0F}"/>
+                <a16:creationId xmlns:a16="http://schemas.microsoft.com/office/drawing/2014/main" xmlns="" id="{9EF114C1-C8CF-409C-847E-943F96FE0F0F}"/>
               </a:ext>
             </a:extLst>
           </p:cNvPr>
@@ -7495,7 +7185,7 @@
           <p:cNvPr id="21" name="CaixaDeTexto 20">
             <a:extLst>
               <a:ext uri="{FF2B5EF4-FFF2-40B4-BE49-F238E27FC236}">
-                <a16:creationId xmlns:a16="http://schemas.microsoft.com/office/drawing/2014/main" id="{EDBD84FF-B3AA-4678-8B40-4A48A902DC6E}"/>
+                <a16:creationId xmlns:a16="http://schemas.microsoft.com/office/drawing/2014/main" xmlns="" id="{EDBD84FF-B3AA-4678-8B40-4A48A902DC6E}"/>
               </a:ext>
             </a:extLst>
           </p:cNvPr>
@@ -7533,7 +7223,7 @@
           <p:cNvPr id="22" name="Conector de Seta Reta 21">
             <a:extLst>
               <a:ext uri="{FF2B5EF4-FFF2-40B4-BE49-F238E27FC236}">
-                <a16:creationId xmlns:a16="http://schemas.microsoft.com/office/drawing/2014/main" id="{6005A5E0-EFE8-4E81-9A9B-EC939F301038}"/>
+                <a16:creationId xmlns:a16="http://schemas.microsoft.com/office/drawing/2014/main" xmlns="" id="{6005A5E0-EFE8-4E81-9A9B-EC939F301038}"/>
               </a:ext>
             </a:extLst>
           </p:cNvPr>
@@ -7607,7 +7297,7 @@
           <p:cNvPr id="37" name="Agrupar 36">
             <a:extLst>
               <a:ext uri="{FF2B5EF4-FFF2-40B4-BE49-F238E27FC236}">
-                <a16:creationId xmlns:a16="http://schemas.microsoft.com/office/drawing/2014/main" id="{AD55A375-5E96-4C62-9CC7-E8015B3E49AD}"/>
+                <a16:creationId xmlns:a16="http://schemas.microsoft.com/office/drawing/2014/main" xmlns="" id="{AD55A375-5E96-4C62-9CC7-E8015B3E49AD}"/>
               </a:ext>
             </a:extLst>
           </p:cNvPr>
@@ -7627,7 +7317,7 @@
             <p:cNvPr id="36" name="Agrupar 35">
               <a:extLst>
                 <a:ext uri="{FF2B5EF4-FFF2-40B4-BE49-F238E27FC236}">
-                  <a16:creationId xmlns:a16="http://schemas.microsoft.com/office/drawing/2014/main" id="{54346E9C-8BCE-4B2B-BE69-77638DB797FE}"/>
+                  <a16:creationId xmlns:a16="http://schemas.microsoft.com/office/drawing/2014/main" xmlns="" id="{54346E9C-8BCE-4B2B-BE69-77638DB797FE}"/>
                 </a:ext>
               </a:extLst>
             </p:cNvPr>
@@ -7647,7 +7337,7 @@
               <p:cNvPr id="4" name="Retângulo 3">
                 <a:extLst>
                   <a:ext uri="{FF2B5EF4-FFF2-40B4-BE49-F238E27FC236}">
-                    <a16:creationId xmlns:a16="http://schemas.microsoft.com/office/drawing/2014/main" id="{88C6BF1B-8B81-4A42-B266-9DF3168EF8CB}"/>
+                    <a16:creationId xmlns:a16="http://schemas.microsoft.com/office/drawing/2014/main" xmlns="" id="{88C6BF1B-8B81-4A42-B266-9DF3168EF8CB}"/>
                   </a:ext>
                 </a:extLst>
               </p:cNvPr>
@@ -7701,7 +7391,7 @@
               <p:cNvPr id="5" name="Conector de Seta Reta 4">
                 <a:extLst>
                   <a:ext uri="{FF2B5EF4-FFF2-40B4-BE49-F238E27FC236}">
-                    <a16:creationId xmlns:a16="http://schemas.microsoft.com/office/drawing/2014/main" id="{85E6B2C7-D043-4C92-898F-4F2DEE8A2690}"/>
+                    <a16:creationId xmlns:a16="http://schemas.microsoft.com/office/drawing/2014/main" xmlns="" id="{85E6B2C7-D043-4C92-898F-4F2DEE8A2690}"/>
                   </a:ext>
                 </a:extLst>
               </p:cNvPr>
@@ -7745,7 +7435,7 @@
             <p:cNvPr id="6" name="Conector de Seta Reta 5">
               <a:extLst>
                 <a:ext uri="{FF2B5EF4-FFF2-40B4-BE49-F238E27FC236}">
-                  <a16:creationId xmlns:a16="http://schemas.microsoft.com/office/drawing/2014/main" id="{9BACC1B6-2F2A-4248-B083-17CB87D6E5BE}"/>
+                  <a16:creationId xmlns:a16="http://schemas.microsoft.com/office/drawing/2014/main" xmlns="" id="{9BACC1B6-2F2A-4248-B083-17CB87D6E5BE}"/>
                 </a:ext>
               </a:extLst>
             </p:cNvPr>
@@ -7789,7 +7479,7 @@
           <p:cNvPr id="2" name="CaixaDeTexto 1">
             <a:extLst>
               <a:ext uri="{FF2B5EF4-FFF2-40B4-BE49-F238E27FC236}">
-                <a16:creationId xmlns:a16="http://schemas.microsoft.com/office/drawing/2014/main" id="{80F5CD5A-1914-4EF1-BE32-34B089486C2F}"/>
+                <a16:creationId xmlns:a16="http://schemas.microsoft.com/office/drawing/2014/main" xmlns="" id="{80F5CD5A-1914-4EF1-BE32-34B089486C2F}"/>
               </a:ext>
             </a:extLst>
           </p:cNvPr>
@@ -7830,7 +7520,7 @@
           <p:cNvPr id="44" name="Agrupar 43">
             <a:extLst>
               <a:ext uri="{FF2B5EF4-FFF2-40B4-BE49-F238E27FC236}">
-                <a16:creationId xmlns:a16="http://schemas.microsoft.com/office/drawing/2014/main" id="{BA6E27EE-CE85-4231-860A-EC8B217CE24F}"/>
+                <a16:creationId xmlns:a16="http://schemas.microsoft.com/office/drawing/2014/main" xmlns="" id="{BA6E27EE-CE85-4231-860A-EC8B217CE24F}"/>
               </a:ext>
             </a:extLst>
           </p:cNvPr>
@@ -7850,7 +7540,7 @@
             <p:cNvPr id="8" name="Retângulo 7">
               <a:extLst>
                 <a:ext uri="{FF2B5EF4-FFF2-40B4-BE49-F238E27FC236}">
-                  <a16:creationId xmlns:a16="http://schemas.microsoft.com/office/drawing/2014/main" id="{5941647A-72D6-4138-BD44-C48D31273AB1}"/>
+                  <a16:creationId xmlns:a16="http://schemas.microsoft.com/office/drawing/2014/main" xmlns="" id="{5941647A-72D6-4138-BD44-C48D31273AB1}"/>
                 </a:ext>
               </a:extLst>
             </p:cNvPr>
@@ -7904,7 +7594,7 @@
             <p:cNvPr id="9" name="CaixaDeTexto 1">
               <a:extLst>
                 <a:ext uri="{FF2B5EF4-FFF2-40B4-BE49-F238E27FC236}">
-                  <a16:creationId xmlns:a16="http://schemas.microsoft.com/office/drawing/2014/main" id="{7994EBAF-0D7D-41FB-B228-383D0E67FB6C}"/>
+                  <a16:creationId xmlns:a16="http://schemas.microsoft.com/office/drawing/2014/main" xmlns="" id="{7994EBAF-0D7D-41FB-B228-383D0E67FB6C}"/>
                 </a:ext>
               </a:extLst>
             </p:cNvPr>
@@ -8041,7 +7731,7 @@
           <p:cNvPr id="45" name="Agrupar 44">
             <a:extLst>
               <a:ext uri="{FF2B5EF4-FFF2-40B4-BE49-F238E27FC236}">
-                <a16:creationId xmlns:a16="http://schemas.microsoft.com/office/drawing/2014/main" id="{A39C0BD4-A4A9-4C34-878E-6105488207AF}"/>
+                <a16:creationId xmlns:a16="http://schemas.microsoft.com/office/drawing/2014/main" xmlns="" id="{A39C0BD4-A4A9-4C34-878E-6105488207AF}"/>
               </a:ext>
             </a:extLst>
           </p:cNvPr>
@@ -8061,7 +7751,7 @@
             <p:cNvPr id="10" name="Retângulo 9">
               <a:extLst>
                 <a:ext uri="{FF2B5EF4-FFF2-40B4-BE49-F238E27FC236}">
-                  <a16:creationId xmlns:a16="http://schemas.microsoft.com/office/drawing/2014/main" id="{971BC70D-B8E4-4A17-B17F-86055154C60C}"/>
+                  <a16:creationId xmlns:a16="http://schemas.microsoft.com/office/drawing/2014/main" xmlns="" id="{971BC70D-B8E4-4A17-B17F-86055154C60C}"/>
                 </a:ext>
               </a:extLst>
             </p:cNvPr>
@@ -8115,7 +7805,7 @@
             <p:cNvPr id="11" name="CaixaDeTexto 1">
               <a:extLst>
                 <a:ext uri="{FF2B5EF4-FFF2-40B4-BE49-F238E27FC236}">
-                  <a16:creationId xmlns:a16="http://schemas.microsoft.com/office/drawing/2014/main" id="{F77E377A-2299-45F1-BD65-AD221DB0412C}"/>
+                  <a16:creationId xmlns:a16="http://schemas.microsoft.com/office/drawing/2014/main" xmlns="" id="{F77E377A-2299-45F1-BD65-AD221DB0412C}"/>
                 </a:ext>
               </a:extLst>
             </p:cNvPr>
@@ -8252,7 +7942,7 @@
           <p:cNvPr id="42" name="Agrupar 41">
             <a:extLst>
               <a:ext uri="{FF2B5EF4-FFF2-40B4-BE49-F238E27FC236}">
-                <a16:creationId xmlns:a16="http://schemas.microsoft.com/office/drawing/2014/main" id="{15ED0C22-7BEF-404D-8355-9C9D373C2B51}"/>
+                <a16:creationId xmlns:a16="http://schemas.microsoft.com/office/drawing/2014/main" xmlns="" id="{15ED0C22-7BEF-404D-8355-9C9D373C2B51}"/>
               </a:ext>
             </a:extLst>
           </p:cNvPr>
@@ -8272,7 +7962,7 @@
             <p:cNvPr id="13" name="Imagem 6" descr="Uma imagem contendo objeto&#10;&#10;Descrição gerada com muito alta confiança">
               <a:extLst>
                 <a:ext uri="{FF2B5EF4-FFF2-40B4-BE49-F238E27FC236}">
-                  <a16:creationId xmlns:a16="http://schemas.microsoft.com/office/drawing/2014/main" id="{63824687-0B05-4413-8D3C-5E29C9702638}"/>
+                  <a16:creationId xmlns:a16="http://schemas.microsoft.com/office/drawing/2014/main" xmlns="" id="{63824687-0B05-4413-8D3C-5E29C9702638}"/>
                 </a:ext>
               </a:extLst>
             </p:cNvPr>
@@ -8302,7 +7992,7 @@
             <p:cNvPr id="16" name="CaixaDeTexto 15">
               <a:extLst>
                 <a:ext uri="{FF2B5EF4-FFF2-40B4-BE49-F238E27FC236}">
-                  <a16:creationId xmlns:a16="http://schemas.microsoft.com/office/drawing/2014/main" id="{FDA29973-2090-478C-8CFB-2DD1F5F78F5A}"/>
+                  <a16:creationId xmlns:a16="http://schemas.microsoft.com/office/drawing/2014/main" xmlns="" id="{FDA29973-2090-478C-8CFB-2DD1F5F78F5A}"/>
                 </a:ext>
               </a:extLst>
             </p:cNvPr>
@@ -8341,7 +8031,7 @@
           <p:cNvPr id="43" name="Agrupar 42">
             <a:extLst>
               <a:ext uri="{FF2B5EF4-FFF2-40B4-BE49-F238E27FC236}">
-                <a16:creationId xmlns:a16="http://schemas.microsoft.com/office/drawing/2014/main" id="{9DB1F885-85FC-4032-BAA2-BCB1EBAE1904}"/>
+                <a16:creationId xmlns:a16="http://schemas.microsoft.com/office/drawing/2014/main" xmlns="" id="{9DB1F885-85FC-4032-BAA2-BCB1EBAE1904}"/>
               </a:ext>
             </a:extLst>
           </p:cNvPr>
@@ -8361,7 +8051,7 @@
             <p:cNvPr id="14" name="Imagem 6" descr="Uma imagem contendo objeto&#10;&#10;Descrição gerada com muito alta confiança">
               <a:extLst>
                 <a:ext uri="{FF2B5EF4-FFF2-40B4-BE49-F238E27FC236}">
-                  <a16:creationId xmlns:a16="http://schemas.microsoft.com/office/drawing/2014/main" id="{DBED1A96-C999-457A-8F32-18571E67930B}"/>
+                  <a16:creationId xmlns:a16="http://schemas.microsoft.com/office/drawing/2014/main" xmlns="" id="{DBED1A96-C999-457A-8F32-18571E67930B}"/>
                 </a:ext>
               </a:extLst>
             </p:cNvPr>
@@ -8391,7 +8081,7 @@
             <p:cNvPr id="18" name="CaixaDeTexto 17">
               <a:extLst>
                 <a:ext uri="{FF2B5EF4-FFF2-40B4-BE49-F238E27FC236}">
-                  <a16:creationId xmlns:a16="http://schemas.microsoft.com/office/drawing/2014/main" id="{4A840F81-AC70-4925-A6AF-06B2ECF11F52}"/>
+                  <a16:creationId xmlns:a16="http://schemas.microsoft.com/office/drawing/2014/main" xmlns="" id="{4A840F81-AC70-4925-A6AF-06B2ECF11F52}"/>
                 </a:ext>
               </a:extLst>
             </p:cNvPr>
@@ -8435,7 +8125,7 @@
           <p:cNvPr id="19" name="Conector de Seta Reta 18">
             <a:extLst>
               <a:ext uri="{FF2B5EF4-FFF2-40B4-BE49-F238E27FC236}">
-                <a16:creationId xmlns:a16="http://schemas.microsoft.com/office/drawing/2014/main" id="{7053101E-BA41-4AFA-90EB-5F30E05D5C2A}"/>
+                <a16:creationId xmlns:a16="http://schemas.microsoft.com/office/drawing/2014/main" xmlns="" id="{7053101E-BA41-4AFA-90EB-5F30E05D5C2A}"/>
               </a:ext>
             </a:extLst>
           </p:cNvPr>
@@ -8479,7 +8169,7 @@
           <p:cNvPr id="20" name="Conector de Seta Reta 19">
             <a:extLst>
               <a:ext uri="{FF2B5EF4-FFF2-40B4-BE49-F238E27FC236}">
-                <a16:creationId xmlns:a16="http://schemas.microsoft.com/office/drawing/2014/main" id="{972CCC72-617F-4D78-B3FE-1B11C03D20E1}"/>
+                <a16:creationId xmlns:a16="http://schemas.microsoft.com/office/drawing/2014/main" xmlns="" id="{972CCC72-617F-4D78-B3FE-1B11C03D20E1}"/>
               </a:ext>
             </a:extLst>
           </p:cNvPr>
@@ -8523,7 +8213,7 @@
           <p:cNvPr id="21" name="Conector de Seta Reta 20">
             <a:extLst>
               <a:ext uri="{FF2B5EF4-FFF2-40B4-BE49-F238E27FC236}">
-                <a16:creationId xmlns:a16="http://schemas.microsoft.com/office/drawing/2014/main" id="{EA66EA41-B19F-44A8-87CD-EFADB016E3DD}"/>
+                <a16:creationId xmlns:a16="http://schemas.microsoft.com/office/drawing/2014/main" xmlns="" id="{EA66EA41-B19F-44A8-87CD-EFADB016E3DD}"/>
               </a:ext>
             </a:extLst>
           </p:cNvPr>
@@ -8567,7 +8257,7 @@
           <p:cNvPr id="22" name="Conector de Seta Reta 21">
             <a:extLst>
               <a:ext uri="{FF2B5EF4-FFF2-40B4-BE49-F238E27FC236}">
-                <a16:creationId xmlns:a16="http://schemas.microsoft.com/office/drawing/2014/main" id="{317BB5CC-C5DD-4E1C-9FC9-A8537615FAD0}"/>
+                <a16:creationId xmlns:a16="http://schemas.microsoft.com/office/drawing/2014/main" xmlns="" id="{317BB5CC-C5DD-4E1C-9FC9-A8537615FAD0}"/>
               </a:ext>
             </a:extLst>
           </p:cNvPr>
@@ -8611,7 +8301,7 @@
           <p:cNvPr id="23" name="Conector de Seta Reta 22">
             <a:extLst>
               <a:ext uri="{FF2B5EF4-FFF2-40B4-BE49-F238E27FC236}">
-                <a16:creationId xmlns:a16="http://schemas.microsoft.com/office/drawing/2014/main" id="{6F2A4F03-C5E4-40D7-AA81-EDDBC7B02437}"/>
+                <a16:creationId xmlns:a16="http://schemas.microsoft.com/office/drawing/2014/main" xmlns="" id="{6F2A4F03-C5E4-40D7-AA81-EDDBC7B02437}"/>
               </a:ext>
             </a:extLst>
           </p:cNvPr>
@@ -8652,10 +8342,10 @@
       </p:cxnSp>
       <p:cxnSp>
         <p:nvCxnSpPr>
-          <p:cNvPr id="24" name="Conector de Seta Reta 23">
-            <a:extLst>
-              <a:ext uri="{FF2B5EF4-FFF2-40B4-BE49-F238E27FC236}">
-                <a16:creationId xmlns:a16="http://schemas.microsoft.com/office/drawing/2014/main" id="{906C5ED3-A468-446B-91A1-50EACFAF704A}"/>
+          <p:cNvPr id="27" name="Conector de Seta Reta 26">
+            <a:extLst>
+              <a:ext uri="{FF2B5EF4-FFF2-40B4-BE49-F238E27FC236}">
+                <a16:creationId xmlns:a16="http://schemas.microsoft.com/office/drawing/2014/main" xmlns="" id="{569658DA-03D1-4969-9E0E-3405A27FE72E}"/>
               </a:ext>
             </a:extLst>
           </p:cNvPr>
@@ -8666,8 +8356,8 @@
         </p:nvCxnSpPr>
         <p:spPr>
           <a:xfrm>
-            <a:off x="1325591" y="3429000"/>
-            <a:ext cx="0" cy="918143"/>
+            <a:off x="9901328" y="3124085"/>
+            <a:ext cx="14735" cy="1511714"/>
           </a:xfrm>
           <a:prstGeom prst="straightConnector1">
             <a:avLst/>
@@ -8694,100 +8384,12 @@
           </a:fontRef>
         </p:style>
       </p:cxnSp>
-      <p:cxnSp>
-        <p:nvCxnSpPr>
-          <p:cNvPr id="26" name="Conector de Seta Reta 25">
-            <a:extLst>
-              <a:ext uri="{FF2B5EF4-FFF2-40B4-BE49-F238E27FC236}">
-                <a16:creationId xmlns:a16="http://schemas.microsoft.com/office/drawing/2014/main" id="{80EA2B90-3614-439A-9F6B-2F7DD190FAAF}"/>
-              </a:ext>
-            </a:extLst>
-          </p:cNvPr>
-          <p:cNvCxnSpPr>
-            <a:cxnSpLocks/>
-          </p:cNvCxnSpPr>
-          <p:nvPr/>
-        </p:nvCxnSpPr>
-        <p:spPr>
-          <a:xfrm>
-            <a:off x="3563338" y="3413336"/>
-            <a:ext cx="33515" cy="1354196"/>
-          </a:xfrm>
-          <a:prstGeom prst="straightConnector1">
-            <a:avLst/>
-          </a:prstGeom>
-          <a:ln>
-            <a:solidFill>
-              <a:schemeClr val="tx1"/>
-            </a:solidFill>
-            <a:tailEnd type="triangle"/>
-          </a:ln>
-        </p:spPr>
-        <p:style>
-          <a:lnRef idx="1">
-            <a:schemeClr val="accent1"/>
-          </a:lnRef>
-          <a:fillRef idx="0">
-            <a:schemeClr val="accent1"/>
-          </a:fillRef>
-          <a:effectRef idx="0">
-            <a:schemeClr val="accent1"/>
-          </a:effectRef>
-          <a:fontRef idx="minor">
-            <a:schemeClr val="tx1"/>
-          </a:fontRef>
-        </p:style>
-      </p:cxnSp>
-      <p:cxnSp>
-        <p:nvCxnSpPr>
-          <p:cNvPr id="27" name="Conector de Seta Reta 26">
-            <a:extLst>
-              <a:ext uri="{FF2B5EF4-FFF2-40B4-BE49-F238E27FC236}">
-                <a16:creationId xmlns:a16="http://schemas.microsoft.com/office/drawing/2014/main" id="{569658DA-03D1-4969-9E0E-3405A27FE72E}"/>
-              </a:ext>
-            </a:extLst>
-          </p:cNvPr>
-          <p:cNvCxnSpPr>
-            <a:cxnSpLocks/>
-          </p:cNvCxnSpPr>
-          <p:nvPr/>
-        </p:nvCxnSpPr>
-        <p:spPr>
-          <a:xfrm>
-            <a:off x="9901328" y="3124085"/>
-            <a:ext cx="14735" cy="1511714"/>
-          </a:xfrm>
-          <a:prstGeom prst="straightConnector1">
-            <a:avLst/>
-          </a:prstGeom>
-          <a:ln>
-            <a:solidFill>
-              <a:schemeClr val="tx1"/>
-            </a:solidFill>
-            <a:tailEnd type="triangle"/>
-          </a:ln>
-        </p:spPr>
-        <p:style>
-          <a:lnRef idx="1">
-            <a:schemeClr val="accent1"/>
-          </a:lnRef>
-          <a:fillRef idx="0">
-            <a:schemeClr val="accent1"/>
-          </a:fillRef>
-          <a:effectRef idx="0">
-            <a:schemeClr val="accent1"/>
-          </a:effectRef>
-          <a:fontRef idx="minor">
-            <a:schemeClr val="tx1"/>
-          </a:fontRef>
-        </p:style>
-      </p:cxnSp>
       <p:sp>
         <p:nvSpPr>
           <p:cNvPr id="3" name="CaixaDeTexto 2">
             <a:extLst>
               <a:ext uri="{FF2B5EF4-FFF2-40B4-BE49-F238E27FC236}">
-                <a16:creationId xmlns:a16="http://schemas.microsoft.com/office/drawing/2014/main" id="{7FCA1908-EC09-46BB-B633-12D671CD2244}"/>
+                <a16:creationId xmlns:a16="http://schemas.microsoft.com/office/drawing/2014/main" xmlns="" id="{7FCA1908-EC09-46BB-B633-12D671CD2244}"/>
               </a:ext>
             </a:extLst>
           </p:cNvPr>
@@ -8828,7 +8430,7 @@
           <p:cNvPr id="7" name="CaixaDeTexto 6">
             <a:extLst>
               <a:ext uri="{FF2B5EF4-FFF2-40B4-BE49-F238E27FC236}">
-                <a16:creationId xmlns:a16="http://schemas.microsoft.com/office/drawing/2014/main" id="{BF0B844E-C924-4EC3-B27F-D0C0220E391A}"/>
+                <a16:creationId xmlns:a16="http://schemas.microsoft.com/office/drawing/2014/main" xmlns="" id="{BF0B844E-C924-4EC3-B27F-D0C0220E391A}"/>
               </a:ext>
             </a:extLst>
           </p:cNvPr>
@@ -8864,252 +8466,10 @@
       </p:sp>
       <p:grpSp>
         <p:nvGrpSpPr>
-          <p:cNvPr id="15" name="Agrupar 14">
-            <a:extLst>
-              <a:ext uri="{FF2B5EF4-FFF2-40B4-BE49-F238E27FC236}">
-                <a16:creationId xmlns:a16="http://schemas.microsoft.com/office/drawing/2014/main" id="{4D4BF78B-3951-4D53-871E-F3297FE9DB27}"/>
-              </a:ext>
-            </a:extLst>
-          </p:cNvPr>
-          <p:cNvGrpSpPr/>
-          <p:nvPr/>
-        </p:nvGrpSpPr>
-        <p:grpSpPr>
-          <a:xfrm>
-            <a:off x="409036" y="4494363"/>
-            <a:ext cx="2819939" cy="1072551"/>
-            <a:chOff x="218536" y="3503763"/>
-            <a:chExt cx="2819939" cy="1072551"/>
-          </a:xfrm>
-        </p:grpSpPr>
-        <p:sp>
-          <p:nvSpPr>
-            <p:cNvPr id="25" name="CaixaDeTexto 24">
-              <a:extLst>
-                <a:ext uri="{FF2B5EF4-FFF2-40B4-BE49-F238E27FC236}">
-                  <a16:creationId xmlns:a16="http://schemas.microsoft.com/office/drawing/2014/main" id="{E53E8429-486C-49E3-A88D-600F0719554F}"/>
-                </a:ext>
-              </a:extLst>
-            </p:cNvPr>
-            <p:cNvSpPr txBox="1"/>
-            <p:nvPr/>
-          </p:nvSpPr>
-          <p:spPr>
-            <a:xfrm>
-              <a:off x="309652" y="3645199"/>
-              <a:ext cx="2728823" cy="923330"/>
-            </a:xfrm>
-            <a:prstGeom prst="rect">
-              <a:avLst/>
-            </a:prstGeom>
-          </p:spPr>
-          <p:txBody>
-            <a:bodyPr rot="0" spcFirstLastPara="0" vertOverflow="overflow" horzOverflow="overflow" vert="horz" wrap="square" lIns="91440" tIns="45720" rIns="91440" bIns="45720" numCol="1" spcCol="0" rtlCol="0" fromWordArt="0" anchor="t" anchorCtr="0" forceAA="0" compatLnSpc="1">
-              <a:prstTxWarp prst="textNoShape">
-                <a:avLst/>
-              </a:prstTxWarp>
-              <a:spAutoFit/>
-            </a:bodyPr>
-            <a:lstStyle/>
-            <a:p>
-              <a:pPr marL="285750" indent="-285750">
-                <a:buFont typeface="Arial"/>
-                <a:buChar char="•"/>
-              </a:pPr>
-              <a:r>
-                <a:rPr lang="pt-BR" b="1" i="1" dirty="0"/>
-                <a:t>Cumprir regras</a:t>
-              </a:r>
-            </a:p>
-            <a:p>
-              <a:pPr marL="285750" indent="-285750">
-                <a:buFont typeface="Arial"/>
-                <a:buChar char="•"/>
-              </a:pPr>
-              <a:r>
-                <a:rPr lang="pt-BR" b="1" i="1" dirty="0">
-                  <a:cs typeface="Calibri"/>
-                </a:rPr>
-                <a:t>Fazer atividades propostas </a:t>
-              </a:r>
-            </a:p>
-          </p:txBody>
-        </p:sp>
-        <p:sp>
-          <p:nvSpPr>
-            <p:cNvPr id="12" name="Retângulo 11">
-              <a:extLst>
-                <a:ext uri="{FF2B5EF4-FFF2-40B4-BE49-F238E27FC236}">
-                  <a16:creationId xmlns:a16="http://schemas.microsoft.com/office/drawing/2014/main" id="{F1074E9B-83D2-4043-9F7D-9B5802D1A81D}"/>
-                </a:ext>
-              </a:extLst>
-            </p:cNvPr>
-            <p:cNvSpPr/>
-            <p:nvPr/>
-          </p:nvSpPr>
-          <p:spPr>
-            <a:xfrm>
-              <a:off x="218536" y="3503763"/>
-              <a:ext cx="2409645" cy="1072551"/>
-            </a:xfrm>
-            <a:prstGeom prst="rect">
-              <a:avLst/>
-            </a:prstGeom>
-            <a:noFill/>
-            <a:ln>
-              <a:solidFill>
-                <a:schemeClr val="tx1"/>
-              </a:solidFill>
-            </a:ln>
-          </p:spPr>
-          <p:style>
-            <a:lnRef idx="2">
-              <a:schemeClr val="accent1">
-                <a:shade val="50000"/>
-              </a:schemeClr>
-            </a:lnRef>
-            <a:fillRef idx="1">
-              <a:schemeClr val="accent1"/>
-            </a:fillRef>
-            <a:effectRef idx="0">
-              <a:schemeClr val="accent1"/>
-            </a:effectRef>
-            <a:fontRef idx="minor">
-              <a:schemeClr val="lt1"/>
-            </a:fontRef>
-          </p:style>
-          <p:txBody>
-            <a:bodyPr rtlCol="0" anchor="ctr"/>
-            <a:lstStyle/>
-            <a:p>
-              <a:pPr algn="ctr"/>
-              <a:endParaRPr lang="pt-BR" u="sng" dirty="0"/>
-            </a:p>
-          </p:txBody>
-        </p:sp>
-      </p:grpSp>
-      <p:grpSp>
-        <p:nvGrpSpPr>
-          <p:cNvPr id="17" name="Agrupar 16">
-            <a:extLst>
-              <a:ext uri="{FF2B5EF4-FFF2-40B4-BE49-F238E27FC236}">
-                <a16:creationId xmlns:a16="http://schemas.microsoft.com/office/drawing/2014/main" id="{A267CF55-006F-48A6-B82B-6ED2547E69CF}"/>
-              </a:ext>
-            </a:extLst>
-          </p:cNvPr>
-          <p:cNvGrpSpPr/>
-          <p:nvPr/>
-        </p:nvGrpSpPr>
-        <p:grpSpPr>
-          <a:xfrm>
-            <a:off x="3083225" y="4983192"/>
-            <a:ext cx="2733674" cy="526212"/>
-            <a:chOff x="2892725" y="3992592"/>
-            <a:chExt cx="2733674" cy="526212"/>
-          </a:xfrm>
-        </p:grpSpPr>
-        <p:sp>
-          <p:nvSpPr>
-            <p:cNvPr id="29" name="CaixaDeTexto 28">
-              <a:extLst>
-                <a:ext uri="{FF2B5EF4-FFF2-40B4-BE49-F238E27FC236}">
-                  <a16:creationId xmlns:a16="http://schemas.microsoft.com/office/drawing/2014/main" id="{C9E5DC63-D53D-44B6-BB67-180826BCDCA2}"/>
-                </a:ext>
-              </a:extLst>
-            </p:cNvPr>
-            <p:cNvSpPr txBox="1"/>
-            <p:nvPr/>
-          </p:nvSpPr>
-          <p:spPr>
-            <a:xfrm>
-              <a:off x="2897576" y="4076519"/>
-              <a:ext cx="2728823" cy="369332"/>
-            </a:xfrm>
-            <a:prstGeom prst="rect">
-              <a:avLst/>
-            </a:prstGeom>
-          </p:spPr>
-          <p:txBody>
-            <a:bodyPr rot="0" spcFirstLastPara="0" vertOverflow="overflow" horzOverflow="overflow" vert="horz" wrap="square" lIns="91440" tIns="45720" rIns="91440" bIns="45720" numCol="1" spcCol="0" rtlCol="0" fromWordArt="0" anchor="t" anchorCtr="0" forceAA="0" compatLnSpc="1">
-              <a:prstTxWarp prst="textNoShape">
-                <a:avLst/>
-              </a:prstTxWarp>
-              <a:spAutoFit/>
-            </a:bodyPr>
-            <a:lstStyle/>
-            <a:p>
-              <a:pPr marL="285750" indent="-285750">
-                <a:buFont typeface="Arial"/>
-                <a:buChar char="•"/>
-              </a:pPr>
-              <a:r>
-                <a:rPr lang="pt-BR" b="1" i="1" dirty="0">
-                  <a:cs typeface="Calibri"/>
-                </a:rPr>
-                <a:t>Autorizar aluno </a:t>
-              </a:r>
-            </a:p>
-          </p:txBody>
-        </p:sp>
-        <p:sp>
-          <p:nvSpPr>
-            <p:cNvPr id="33" name="Retângulo 32">
-              <a:extLst>
-                <a:ext uri="{FF2B5EF4-FFF2-40B4-BE49-F238E27FC236}">
-                  <a16:creationId xmlns:a16="http://schemas.microsoft.com/office/drawing/2014/main" id="{F08571B6-F350-4088-922B-F76298A54CDB}"/>
-                </a:ext>
-              </a:extLst>
-            </p:cNvPr>
-            <p:cNvSpPr/>
-            <p:nvPr/>
-          </p:nvSpPr>
-          <p:spPr>
-            <a:xfrm>
-              <a:off x="2892725" y="3992592"/>
-              <a:ext cx="2078966" cy="526212"/>
-            </a:xfrm>
-            <a:prstGeom prst="rect">
-              <a:avLst/>
-            </a:prstGeom>
-            <a:noFill/>
-            <a:ln>
-              <a:solidFill>
-                <a:schemeClr val="tx1"/>
-              </a:solidFill>
-            </a:ln>
-          </p:spPr>
-          <p:style>
-            <a:lnRef idx="2">
-              <a:schemeClr val="accent1">
-                <a:shade val="50000"/>
-              </a:schemeClr>
-            </a:lnRef>
-            <a:fillRef idx="1">
-              <a:schemeClr val="accent1"/>
-            </a:fillRef>
-            <a:effectRef idx="0">
-              <a:schemeClr val="accent1"/>
-            </a:effectRef>
-            <a:fontRef idx="minor">
-              <a:schemeClr val="lt1"/>
-            </a:fontRef>
-          </p:style>
-          <p:txBody>
-            <a:bodyPr rtlCol="0" anchor="ctr"/>
-            <a:lstStyle/>
-            <a:p>
-              <a:pPr algn="ctr"/>
-              <a:endParaRPr lang="pt-BR" dirty="0"/>
-            </a:p>
-          </p:txBody>
-        </p:sp>
-      </p:grpSp>
-      <p:grpSp>
-        <p:nvGrpSpPr>
           <p:cNvPr id="30" name="Agrupar 29">
             <a:extLst>
               <a:ext uri="{FF2B5EF4-FFF2-40B4-BE49-F238E27FC236}">
-                <a16:creationId xmlns:a16="http://schemas.microsoft.com/office/drawing/2014/main" id="{55A6F1EE-B3B9-4AD3-A189-E3913427B6B6}"/>
+                <a16:creationId xmlns:a16="http://schemas.microsoft.com/office/drawing/2014/main" xmlns="" id="{55A6F1EE-B3B9-4AD3-A189-E3913427B6B6}"/>
               </a:ext>
             </a:extLst>
           </p:cNvPr>
@@ -9129,7 +8489,7 @@
             <p:cNvPr id="28" name="CaixaDeTexto 27">
               <a:extLst>
                 <a:ext uri="{FF2B5EF4-FFF2-40B4-BE49-F238E27FC236}">
-                  <a16:creationId xmlns:a16="http://schemas.microsoft.com/office/drawing/2014/main" id="{06F24E56-56C0-48DE-B993-B1CF84033F10}"/>
+                  <a16:creationId xmlns:a16="http://schemas.microsoft.com/office/drawing/2014/main" xmlns="" id="{06F24E56-56C0-48DE-B993-B1CF84033F10}"/>
                 </a:ext>
               </a:extLst>
             </p:cNvPr>
@@ -9193,7 +8553,7 @@
             <p:cNvPr id="34" name="Retângulo 33">
               <a:extLst>
                 <a:ext uri="{FF2B5EF4-FFF2-40B4-BE49-F238E27FC236}">
-                  <a16:creationId xmlns:a16="http://schemas.microsoft.com/office/drawing/2014/main" id="{07B5FAAB-A3BD-4418-A9BF-1694D728EFC3}"/>
+                  <a16:creationId xmlns:a16="http://schemas.microsoft.com/office/drawing/2014/main" xmlns="" id="{07B5FAAB-A3BD-4418-A9BF-1694D728EFC3}"/>
                 </a:ext>
               </a:extLst>
             </p:cNvPr>
@@ -9252,7 +8612,7 @@
           <p:cNvPr id="31" name="Agrupar 30">
             <a:extLst>
               <a:ext uri="{FF2B5EF4-FFF2-40B4-BE49-F238E27FC236}">
-                <a16:creationId xmlns:a16="http://schemas.microsoft.com/office/drawing/2014/main" id="{C4062237-DD02-40B3-AC9C-B89D60A767B8}"/>
+                <a16:creationId xmlns:a16="http://schemas.microsoft.com/office/drawing/2014/main" xmlns="" id="{C4062237-DD02-40B3-AC9C-B89D60A767B8}"/>
               </a:ext>
             </a:extLst>
           </p:cNvPr>
@@ -9272,7 +8632,7 @@
             <p:cNvPr id="32" name="CaixaDeTexto 31">
               <a:extLst>
                 <a:ext uri="{FF2B5EF4-FFF2-40B4-BE49-F238E27FC236}">
-                  <a16:creationId xmlns:a16="http://schemas.microsoft.com/office/drawing/2014/main" id="{566CD485-09EF-48E1-86C5-9CA202611613}"/>
+                  <a16:creationId xmlns:a16="http://schemas.microsoft.com/office/drawing/2014/main" xmlns="" id="{566CD485-09EF-48E1-86C5-9CA202611613}"/>
                 </a:ext>
               </a:extLst>
             </p:cNvPr>
@@ -9348,7 +8708,7 @@
             <p:cNvPr id="35" name="Retângulo 34">
               <a:extLst>
                 <a:ext uri="{FF2B5EF4-FFF2-40B4-BE49-F238E27FC236}">
-                  <a16:creationId xmlns:a16="http://schemas.microsoft.com/office/drawing/2014/main" id="{BD6C4BD0-D5BB-4786-BF71-1D992016DC45}"/>
+                  <a16:creationId xmlns:a16="http://schemas.microsoft.com/office/drawing/2014/main" xmlns="" id="{BD6C4BD0-D5BB-4786-BF71-1D992016DC45}"/>
                 </a:ext>
               </a:extLst>
             </p:cNvPr>
@@ -9431,7 +8791,7 @@
           <p:cNvPr id="4" name="Retângulo 3">
             <a:extLst>
               <a:ext uri="{FF2B5EF4-FFF2-40B4-BE49-F238E27FC236}">
-                <a16:creationId xmlns:a16="http://schemas.microsoft.com/office/drawing/2014/main" id="{88C6BF1B-8B81-4A42-B266-9DF3168EF8CB}"/>
+                <a16:creationId xmlns:a16="http://schemas.microsoft.com/office/drawing/2014/main" xmlns="" id="{88C6BF1B-8B81-4A42-B266-9DF3168EF8CB}"/>
               </a:ext>
             </a:extLst>
           </p:cNvPr>
@@ -9485,7 +8845,7 @@
           <p:cNvPr id="2" name="CaixaDeTexto 1">
             <a:extLst>
               <a:ext uri="{FF2B5EF4-FFF2-40B4-BE49-F238E27FC236}">
-                <a16:creationId xmlns:a16="http://schemas.microsoft.com/office/drawing/2014/main" id="{80F5CD5A-1914-4EF1-BE32-34B089486C2F}"/>
+                <a16:creationId xmlns:a16="http://schemas.microsoft.com/office/drawing/2014/main" xmlns="" id="{80F5CD5A-1914-4EF1-BE32-34B089486C2F}"/>
               </a:ext>
             </a:extLst>
           </p:cNvPr>
@@ -9526,7 +8886,7 @@
           <p:cNvPr id="3" name="Imagem 6" descr="Uma imagem contendo objeto&#10;&#10;Descrição gerada com muito alta confiança">
             <a:extLst>
               <a:ext uri="{FF2B5EF4-FFF2-40B4-BE49-F238E27FC236}">
-                <a16:creationId xmlns:a16="http://schemas.microsoft.com/office/drawing/2014/main" id="{3A958C51-9DB6-409A-8BCE-A5C77D3B1354}"/>
+                <a16:creationId xmlns:a16="http://schemas.microsoft.com/office/drawing/2014/main" xmlns="" id="{3A958C51-9DB6-409A-8BCE-A5C77D3B1354}"/>
               </a:ext>
             </a:extLst>
           </p:cNvPr>
@@ -9556,7 +8916,7 @@
           <p:cNvPr id="7" name="Retângulo 6">
             <a:extLst>
               <a:ext uri="{FF2B5EF4-FFF2-40B4-BE49-F238E27FC236}">
-                <a16:creationId xmlns:a16="http://schemas.microsoft.com/office/drawing/2014/main" id="{89094DE6-756F-4A82-8A95-1CBED37E87E2}"/>
+                <a16:creationId xmlns:a16="http://schemas.microsoft.com/office/drawing/2014/main" xmlns="" id="{89094DE6-756F-4A82-8A95-1CBED37E87E2}"/>
               </a:ext>
             </a:extLst>
           </p:cNvPr>
@@ -9605,7 +8965,7 @@
           <p:cNvPr id="9" name="Retângulo 8">
             <a:extLst>
               <a:ext uri="{FF2B5EF4-FFF2-40B4-BE49-F238E27FC236}">
-                <a16:creationId xmlns:a16="http://schemas.microsoft.com/office/drawing/2014/main" id="{407F5294-A287-4708-8220-29D5D97DEE86}"/>
+                <a16:creationId xmlns:a16="http://schemas.microsoft.com/office/drawing/2014/main" xmlns="" id="{407F5294-A287-4708-8220-29D5D97DEE86}"/>
               </a:ext>
             </a:extLst>
           </p:cNvPr>
@@ -9654,7 +9014,7 @@
           <p:cNvPr id="11" name="Retângulo 10">
             <a:extLst>
               <a:ext uri="{FF2B5EF4-FFF2-40B4-BE49-F238E27FC236}">
-                <a16:creationId xmlns:a16="http://schemas.microsoft.com/office/drawing/2014/main" id="{8CCE9E41-DF19-4539-AEB2-C83DDB8D015A}"/>
+                <a16:creationId xmlns:a16="http://schemas.microsoft.com/office/drawing/2014/main" xmlns="" id="{8CCE9E41-DF19-4539-AEB2-C83DDB8D015A}"/>
               </a:ext>
             </a:extLst>
           </p:cNvPr>
@@ -9703,7 +9063,7 @@
           <p:cNvPr id="13" name="CaixaDeTexto 12">
             <a:extLst>
               <a:ext uri="{FF2B5EF4-FFF2-40B4-BE49-F238E27FC236}">
-                <a16:creationId xmlns:a16="http://schemas.microsoft.com/office/drawing/2014/main" id="{36A1F85B-7B7F-4EB2-A921-5BDA85D5F006}"/>
+                <a16:creationId xmlns:a16="http://schemas.microsoft.com/office/drawing/2014/main" xmlns="" id="{36A1F85B-7B7F-4EB2-A921-5BDA85D5F006}"/>
               </a:ext>
             </a:extLst>
           </p:cNvPr>
@@ -9745,7 +9105,7 @@
           <p:cNvPr id="15" name="CaixaDeTexto 14">
             <a:extLst>
               <a:ext uri="{FF2B5EF4-FFF2-40B4-BE49-F238E27FC236}">
-                <a16:creationId xmlns:a16="http://schemas.microsoft.com/office/drawing/2014/main" id="{F4835543-02C9-4F7E-942E-19AA80F41074}"/>
+                <a16:creationId xmlns:a16="http://schemas.microsoft.com/office/drawing/2014/main" xmlns="" id="{F4835543-02C9-4F7E-942E-19AA80F41074}"/>
               </a:ext>
             </a:extLst>
           </p:cNvPr>
@@ -9785,7 +9145,7 @@
           <p:cNvPr id="17" name="Conector de Seta Reta 16">
             <a:extLst>
               <a:ext uri="{FF2B5EF4-FFF2-40B4-BE49-F238E27FC236}">
-                <a16:creationId xmlns:a16="http://schemas.microsoft.com/office/drawing/2014/main" id="{411AA6B9-507C-44D4-9959-3C997B8CBC1D}"/>
+                <a16:creationId xmlns:a16="http://schemas.microsoft.com/office/drawing/2014/main" xmlns="" id="{411AA6B9-507C-44D4-9959-3C997B8CBC1D}"/>
               </a:ext>
             </a:extLst>
           </p:cNvPr>
@@ -9827,7 +9187,7 @@
           <p:cNvPr id="19" name="Conector de Seta Reta 18">
             <a:extLst>
               <a:ext uri="{FF2B5EF4-FFF2-40B4-BE49-F238E27FC236}">
-                <a16:creationId xmlns:a16="http://schemas.microsoft.com/office/drawing/2014/main" id="{93EB990D-C099-4555-BD11-426E6E8EE67F}"/>
+                <a16:creationId xmlns:a16="http://schemas.microsoft.com/office/drawing/2014/main" xmlns="" id="{93EB990D-C099-4555-BD11-426E6E8EE67F}"/>
               </a:ext>
             </a:extLst>
           </p:cNvPr>
@@ -9871,7 +9231,7 @@
           <p:cNvPr id="21" name="CaixaDeTexto 20">
             <a:extLst>
               <a:ext uri="{FF2B5EF4-FFF2-40B4-BE49-F238E27FC236}">
-                <a16:creationId xmlns:a16="http://schemas.microsoft.com/office/drawing/2014/main" id="{DDB3C006-F399-4DA0-84A7-14D02AA99AD9}"/>
+                <a16:creationId xmlns:a16="http://schemas.microsoft.com/office/drawing/2014/main" xmlns="" id="{DDB3C006-F399-4DA0-84A7-14D02AA99AD9}"/>
               </a:ext>
             </a:extLst>
           </p:cNvPr>
@@ -9911,7 +9271,7 @@
           <p:cNvPr id="23" name="CaixaDeTexto 22">
             <a:extLst>
               <a:ext uri="{FF2B5EF4-FFF2-40B4-BE49-F238E27FC236}">
-                <a16:creationId xmlns:a16="http://schemas.microsoft.com/office/drawing/2014/main" id="{EDDF8BE8-BC1F-46BC-9872-A1A48F87BFAC}"/>
+                <a16:creationId xmlns:a16="http://schemas.microsoft.com/office/drawing/2014/main" xmlns="" id="{EDDF8BE8-BC1F-46BC-9872-A1A48F87BFAC}"/>
               </a:ext>
             </a:extLst>
           </p:cNvPr>
@@ -9979,7 +9339,7 @@
           <p:cNvPr id="4" name="Retângulo 3">
             <a:extLst>
               <a:ext uri="{FF2B5EF4-FFF2-40B4-BE49-F238E27FC236}">
-                <a16:creationId xmlns:a16="http://schemas.microsoft.com/office/drawing/2014/main" id="{88C6BF1B-8B81-4A42-B266-9DF3168EF8CB}"/>
+                <a16:creationId xmlns:a16="http://schemas.microsoft.com/office/drawing/2014/main" xmlns="" id="{88C6BF1B-8B81-4A42-B266-9DF3168EF8CB}"/>
               </a:ext>
             </a:extLst>
           </p:cNvPr>
@@ -10033,7 +9393,7 @@
           <p:cNvPr id="2" name="CaixaDeTexto 1">
             <a:extLst>
               <a:ext uri="{FF2B5EF4-FFF2-40B4-BE49-F238E27FC236}">
-                <a16:creationId xmlns:a16="http://schemas.microsoft.com/office/drawing/2014/main" id="{80F5CD5A-1914-4EF1-BE32-34B089486C2F}"/>
+                <a16:creationId xmlns:a16="http://schemas.microsoft.com/office/drawing/2014/main" xmlns="" id="{80F5CD5A-1914-4EF1-BE32-34B089486C2F}"/>
               </a:ext>
             </a:extLst>
           </p:cNvPr>
@@ -10074,7 +9434,7 @@
           <p:cNvPr id="5" name="Conector de Seta Reta 4">
             <a:extLst>
               <a:ext uri="{FF2B5EF4-FFF2-40B4-BE49-F238E27FC236}">
-                <a16:creationId xmlns:a16="http://schemas.microsoft.com/office/drawing/2014/main" id="{85E6B2C7-D043-4C92-898F-4F2DEE8A2690}"/>
+                <a16:creationId xmlns:a16="http://schemas.microsoft.com/office/drawing/2014/main" xmlns="" id="{85E6B2C7-D043-4C92-898F-4F2DEE8A2690}"/>
               </a:ext>
             </a:extLst>
           </p:cNvPr>
@@ -10115,7 +9475,7 @@
           <p:cNvPr id="6" name="Conector de Seta Reta 5">
             <a:extLst>
               <a:ext uri="{FF2B5EF4-FFF2-40B4-BE49-F238E27FC236}">
-                <a16:creationId xmlns:a16="http://schemas.microsoft.com/office/drawing/2014/main" id="{9BACC1B6-2F2A-4248-B083-17CB87D6E5BE}"/>
+                <a16:creationId xmlns:a16="http://schemas.microsoft.com/office/drawing/2014/main" xmlns="" id="{9BACC1B6-2F2A-4248-B083-17CB87D6E5BE}"/>
               </a:ext>
             </a:extLst>
           </p:cNvPr>
@@ -10158,7 +9518,7 @@
           <p:cNvPr id="43" name="Agrupar 42">
             <a:extLst>
               <a:ext uri="{FF2B5EF4-FFF2-40B4-BE49-F238E27FC236}">
-                <a16:creationId xmlns:a16="http://schemas.microsoft.com/office/drawing/2014/main" id="{BF28B680-1403-498E-B98E-3F47E1CD4F15}"/>
+                <a16:creationId xmlns:a16="http://schemas.microsoft.com/office/drawing/2014/main" xmlns="" id="{BF28B680-1403-498E-B98E-3F47E1CD4F15}"/>
               </a:ext>
             </a:extLst>
           </p:cNvPr>
@@ -10178,7 +9538,7 @@
             <p:cNvPr id="8" name="Retângulo 7">
               <a:extLst>
                 <a:ext uri="{FF2B5EF4-FFF2-40B4-BE49-F238E27FC236}">
-                  <a16:creationId xmlns:a16="http://schemas.microsoft.com/office/drawing/2014/main" id="{5941647A-72D6-4138-BD44-C48D31273AB1}"/>
+                  <a16:creationId xmlns:a16="http://schemas.microsoft.com/office/drawing/2014/main" xmlns="" id="{5941647A-72D6-4138-BD44-C48D31273AB1}"/>
                 </a:ext>
               </a:extLst>
             </p:cNvPr>
@@ -10232,7 +9592,7 @@
             <p:cNvPr id="9" name="CaixaDeTexto 1">
               <a:extLst>
                 <a:ext uri="{FF2B5EF4-FFF2-40B4-BE49-F238E27FC236}">
-                  <a16:creationId xmlns:a16="http://schemas.microsoft.com/office/drawing/2014/main" id="{7994EBAF-0D7D-41FB-B228-383D0E67FB6C}"/>
+                  <a16:creationId xmlns:a16="http://schemas.microsoft.com/office/drawing/2014/main" xmlns="" id="{7994EBAF-0D7D-41FB-B228-383D0E67FB6C}"/>
                 </a:ext>
               </a:extLst>
             </p:cNvPr>
@@ -10366,7 +9726,7 @@
           <p:cNvPr id="44" name="Agrupar 43">
             <a:extLst>
               <a:ext uri="{FF2B5EF4-FFF2-40B4-BE49-F238E27FC236}">
-                <a16:creationId xmlns:a16="http://schemas.microsoft.com/office/drawing/2014/main" id="{F059599A-8CDA-4EDF-AD30-5BE744CDF545}"/>
+                <a16:creationId xmlns:a16="http://schemas.microsoft.com/office/drawing/2014/main" xmlns="" id="{F059599A-8CDA-4EDF-AD30-5BE744CDF545}"/>
               </a:ext>
             </a:extLst>
           </p:cNvPr>
@@ -10386,7 +9746,7 @@
             <p:cNvPr id="10" name="Retângulo 9">
               <a:extLst>
                 <a:ext uri="{FF2B5EF4-FFF2-40B4-BE49-F238E27FC236}">
-                  <a16:creationId xmlns:a16="http://schemas.microsoft.com/office/drawing/2014/main" id="{971BC70D-B8E4-4A17-B17F-86055154C60C}"/>
+                  <a16:creationId xmlns:a16="http://schemas.microsoft.com/office/drawing/2014/main" xmlns="" id="{971BC70D-B8E4-4A17-B17F-86055154C60C}"/>
                 </a:ext>
               </a:extLst>
             </p:cNvPr>
@@ -10440,7 +9800,7 @@
             <p:cNvPr id="11" name="CaixaDeTexto 1">
               <a:extLst>
                 <a:ext uri="{FF2B5EF4-FFF2-40B4-BE49-F238E27FC236}">
-                  <a16:creationId xmlns:a16="http://schemas.microsoft.com/office/drawing/2014/main" id="{F77E377A-2299-45F1-BD65-AD221DB0412C}"/>
+                  <a16:creationId xmlns:a16="http://schemas.microsoft.com/office/drawing/2014/main" xmlns="" id="{F77E377A-2299-45F1-BD65-AD221DB0412C}"/>
                 </a:ext>
               </a:extLst>
             </p:cNvPr>
@@ -10577,7 +9937,7 @@
           <p:cNvPr id="41" name="Agrupar 40">
             <a:extLst>
               <a:ext uri="{FF2B5EF4-FFF2-40B4-BE49-F238E27FC236}">
-                <a16:creationId xmlns:a16="http://schemas.microsoft.com/office/drawing/2014/main" id="{8B089574-4BAD-41C0-AB24-A3288FD76E68}"/>
+                <a16:creationId xmlns:a16="http://schemas.microsoft.com/office/drawing/2014/main" xmlns="" id="{8B089574-4BAD-41C0-AB24-A3288FD76E68}"/>
               </a:ext>
             </a:extLst>
           </p:cNvPr>
@@ -10597,7 +9957,7 @@
             <p:cNvPr id="13" name="Imagem 6" descr="Uma imagem contendo objeto&#10;&#10;Descrição gerada com muito alta confiança">
               <a:extLst>
                 <a:ext uri="{FF2B5EF4-FFF2-40B4-BE49-F238E27FC236}">
-                  <a16:creationId xmlns:a16="http://schemas.microsoft.com/office/drawing/2014/main" id="{63824687-0B05-4413-8D3C-5E29C9702638}"/>
+                  <a16:creationId xmlns:a16="http://schemas.microsoft.com/office/drawing/2014/main" xmlns="" id="{63824687-0B05-4413-8D3C-5E29C9702638}"/>
                 </a:ext>
               </a:extLst>
             </p:cNvPr>
@@ -10627,7 +9987,7 @@
             <p:cNvPr id="16" name="CaixaDeTexto 15">
               <a:extLst>
                 <a:ext uri="{FF2B5EF4-FFF2-40B4-BE49-F238E27FC236}">
-                  <a16:creationId xmlns:a16="http://schemas.microsoft.com/office/drawing/2014/main" id="{FDA29973-2090-478C-8CFB-2DD1F5F78F5A}"/>
+                  <a16:creationId xmlns:a16="http://schemas.microsoft.com/office/drawing/2014/main" xmlns="" id="{FDA29973-2090-478C-8CFB-2DD1F5F78F5A}"/>
                 </a:ext>
               </a:extLst>
             </p:cNvPr>
@@ -10665,7 +10025,7 @@
           <p:cNvPr id="42" name="Agrupar 41">
             <a:extLst>
               <a:ext uri="{FF2B5EF4-FFF2-40B4-BE49-F238E27FC236}">
-                <a16:creationId xmlns:a16="http://schemas.microsoft.com/office/drawing/2014/main" id="{3B35F1CD-5913-439D-8C83-786B18E01404}"/>
+                <a16:creationId xmlns:a16="http://schemas.microsoft.com/office/drawing/2014/main" xmlns="" id="{3B35F1CD-5913-439D-8C83-786B18E01404}"/>
               </a:ext>
             </a:extLst>
           </p:cNvPr>
@@ -10685,7 +10045,7 @@
             <p:cNvPr id="14" name="Imagem 6" descr="Uma imagem contendo objeto&#10;&#10;Descrição gerada com muito alta confiança">
               <a:extLst>
                 <a:ext uri="{FF2B5EF4-FFF2-40B4-BE49-F238E27FC236}">
-                  <a16:creationId xmlns:a16="http://schemas.microsoft.com/office/drawing/2014/main" id="{DBED1A96-C999-457A-8F32-18571E67930B}"/>
+                  <a16:creationId xmlns:a16="http://schemas.microsoft.com/office/drawing/2014/main" xmlns="" id="{DBED1A96-C999-457A-8F32-18571E67930B}"/>
                 </a:ext>
               </a:extLst>
             </p:cNvPr>
@@ -10715,7 +10075,7 @@
             <p:cNvPr id="18" name="CaixaDeTexto 17">
               <a:extLst>
                 <a:ext uri="{FF2B5EF4-FFF2-40B4-BE49-F238E27FC236}">
-                  <a16:creationId xmlns:a16="http://schemas.microsoft.com/office/drawing/2014/main" id="{4A840F81-AC70-4925-A6AF-06B2ECF11F52}"/>
+                  <a16:creationId xmlns:a16="http://schemas.microsoft.com/office/drawing/2014/main" xmlns="" id="{4A840F81-AC70-4925-A6AF-06B2ECF11F52}"/>
                 </a:ext>
               </a:extLst>
             </p:cNvPr>
@@ -10754,7 +10114,7 @@
           <p:cNvPr id="19" name="Conector de Seta Reta 18">
             <a:extLst>
               <a:ext uri="{FF2B5EF4-FFF2-40B4-BE49-F238E27FC236}">
-                <a16:creationId xmlns:a16="http://schemas.microsoft.com/office/drawing/2014/main" id="{7053101E-BA41-4AFA-90EB-5F30E05D5C2A}"/>
+                <a16:creationId xmlns:a16="http://schemas.microsoft.com/office/drawing/2014/main" xmlns="" id="{7053101E-BA41-4AFA-90EB-5F30E05D5C2A}"/>
               </a:ext>
             </a:extLst>
           </p:cNvPr>
@@ -10798,7 +10158,7 @@
           <p:cNvPr id="20" name="Conector de Seta Reta 19">
             <a:extLst>
               <a:ext uri="{FF2B5EF4-FFF2-40B4-BE49-F238E27FC236}">
-                <a16:creationId xmlns:a16="http://schemas.microsoft.com/office/drawing/2014/main" id="{972CCC72-617F-4D78-B3FE-1B11C03D20E1}"/>
+                <a16:creationId xmlns:a16="http://schemas.microsoft.com/office/drawing/2014/main" xmlns="" id="{972CCC72-617F-4D78-B3FE-1B11C03D20E1}"/>
               </a:ext>
             </a:extLst>
           </p:cNvPr>
@@ -10842,7 +10202,7 @@
           <p:cNvPr id="21" name="Conector de Seta Reta 20">
             <a:extLst>
               <a:ext uri="{FF2B5EF4-FFF2-40B4-BE49-F238E27FC236}">
-                <a16:creationId xmlns:a16="http://schemas.microsoft.com/office/drawing/2014/main" id="{EA66EA41-B19F-44A8-87CD-EFADB016E3DD}"/>
+                <a16:creationId xmlns:a16="http://schemas.microsoft.com/office/drawing/2014/main" xmlns="" id="{EA66EA41-B19F-44A8-87CD-EFADB016E3DD}"/>
               </a:ext>
             </a:extLst>
           </p:cNvPr>
@@ -10886,7 +10246,7 @@
           <p:cNvPr id="22" name="Conector de Seta Reta 21">
             <a:extLst>
               <a:ext uri="{FF2B5EF4-FFF2-40B4-BE49-F238E27FC236}">
-                <a16:creationId xmlns:a16="http://schemas.microsoft.com/office/drawing/2014/main" id="{317BB5CC-C5DD-4E1C-9FC9-A8537615FAD0}"/>
+                <a16:creationId xmlns:a16="http://schemas.microsoft.com/office/drawing/2014/main" xmlns="" id="{317BB5CC-C5DD-4E1C-9FC9-A8537615FAD0}"/>
               </a:ext>
             </a:extLst>
           </p:cNvPr>
@@ -10930,7 +10290,7 @@
           <p:cNvPr id="23" name="Conector de Seta Reta 22">
             <a:extLst>
               <a:ext uri="{FF2B5EF4-FFF2-40B4-BE49-F238E27FC236}">
-                <a16:creationId xmlns:a16="http://schemas.microsoft.com/office/drawing/2014/main" id="{6F2A4F03-C5E4-40D7-AA81-EDDBC7B02437}"/>
+                <a16:creationId xmlns:a16="http://schemas.microsoft.com/office/drawing/2014/main" xmlns="" id="{6F2A4F03-C5E4-40D7-AA81-EDDBC7B02437}"/>
               </a:ext>
             </a:extLst>
           </p:cNvPr>
@@ -10971,10 +10331,10 @@
       </p:cxnSp>
       <p:cxnSp>
         <p:nvCxnSpPr>
-          <p:cNvPr id="24" name="Conector de Seta Reta 23">
-            <a:extLst>
-              <a:ext uri="{FF2B5EF4-FFF2-40B4-BE49-F238E27FC236}">
-                <a16:creationId xmlns:a16="http://schemas.microsoft.com/office/drawing/2014/main" id="{906C5ED3-A468-446B-91A1-50EACFAF704A}"/>
+          <p:cNvPr id="27" name="Conector de Seta Reta 26">
+            <a:extLst>
+              <a:ext uri="{FF2B5EF4-FFF2-40B4-BE49-F238E27FC236}">
+                <a16:creationId xmlns:a16="http://schemas.microsoft.com/office/drawing/2014/main" xmlns="" id="{569658DA-03D1-4969-9E0E-3405A27FE72E}"/>
               </a:ext>
             </a:extLst>
           </p:cNvPr>
@@ -10985,8 +10345,8 @@
         </p:nvCxnSpPr>
         <p:spPr>
           <a:xfrm>
-            <a:off x="1325591" y="3175000"/>
-            <a:ext cx="0" cy="1104900"/>
+            <a:off x="9865743" y="2951789"/>
+            <a:ext cx="0" cy="1451337"/>
           </a:xfrm>
           <a:prstGeom prst="straightConnector1">
             <a:avLst/>
@@ -11013,100 +10373,12 @@
           </a:fontRef>
         </p:style>
       </p:cxnSp>
-      <p:cxnSp>
-        <p:nvCxnSpPr>
-          <p:cNvPr id="26" name="Conector de Seta Reta 25">
-            <a:extLst>
-              <a:ext uri="{FF2B5EF4-FFF2-40B4-BE49-F238E27FC236}">
-                <a16:creationId xmlns:a16="http://schemas.microsoft.com/office/drawing/2014/main" id="{80EA2B90-3614-439A-9F6B-2F7DD190FAAF}"/>
-              </a:ext>
-            </a:extLst>
-          </p:cNvPr>
-          <p:cNvCxnSpPr>
-            <a:cxnSpLocks/>
-          </p:cNvCxnSpPr>
-          <p:nvPr/>
-        </p:nvCxnSpPr>
-        <p:spPr>
-          <a:xfrm>
-            <a:off x="3756416" y="3175000"/>
-            <a:ext cx="0" cy="1449116"/>
-          </a:xfrm>
-          <a:prstGeom prst="straightConnector1">
-            <a:avLst/>
-          </a:prstGeom>
-          <a:ln>
-            <a:solidFill>
-              <a:schemeClr val="tx1"/>
-            </a:solidFill>
-            <a:tailEnd type="triangle"/>
-          </a:ln>
-        </p:spPr>
-        <p:style>
-          <a:lnRef idx="1">
-            <a:schemeClr val="accent1"/>
-          </a:lnRef>
-          <a:fillRef idx="0">
-            <a:schemeClr val="accent1"/>
-          </a:fillRef>
-          <a:effectRef idx="0">
-            <a:schemeClr val="accent1"/>
-          </a:effectRef>
-          <a:fontRef idx="minor">
-            <a:schemeClr val="tx1"/>
-          </a:fontRef>
-        </p:style>
-      </p:cxnSp>
-      <p:cxnSp>
-        <p:nvCxnSpPr>
-          <p:cNvPr id="27" name="Conector de Seta Reta 26">
-            <a:extLst>
-              <a:ext uri="{FF2B5EF4-FFF2-40B4-BE49-F238E27FC236}">
-                <a16:creationId xmlns:a16="http://schemas.microsoft.com/office/drawing/2014/main" id="{569658DA-03D1-4969-9E0E-3405A27FE72E}"/>
-              </a:ext>
-            </a:extLst>
-          </p:cNvPr>
-          <p:cNvCxnSpPr>
-            <a:cxnSpLocks/>
-          </p:cNvCxnSpPr>
-          <p:nvPr/>
-        </p:nvCxnSpPr>
-        <p:spPr>
-          <a:xfrm>
-            <a:off x="9865743" y="2951789"/>
-            <a:ext cx="0" cy="1451337"/>
-          </a:xfrm>
-          <a:prstGeom prst="straightConnector1">
-            <a:avLst/>
-          </a:prstGeom>
-          <a:ln>
-            <a:solidFill>
-              <a:schemeClr val="tx1"/>
-            </a:solidFill>
-            <a:tailEnd type="triangle"/>
-          </a:ln>
-        </p:spPr>
-        <p:style>
-          <a:lnRef idx="1">
-            <a:schemeClr val="accent1"/>
-          </a:lnRef>
-          <a:fillRef idx="0">
-            <a:schemeClr val="accent1"/>
-          </a:fillRef>
-          <a:effectRef idx="0">
-            <a:schemeClr val="accent1"/>
-          </a:effectRef>
-          <a:fontRef idx="minor">
-            <a:schemeClr val="tx1"/>
-          </a:fontRef>
-        </p:style>
-      </p:cxnSp>
       <p:sp>
         <p:nvSpPr>
           <p:cNvPr id="3" name="CaixaDeTexto 2">
             <a:extLst>
               <a:ext uri="{FF2B5EF4-FFF2-40B4-BE49-F238E27FC236}">
-                <a16:creationId xmlns:a16="http://schemas.microsoft.com/office/drawing/2014/main" id="{7FCA1908-EC09-46BB-B633-12D671CD2244}"/>
+                <a16:creationId xmlns:a16="http://schemas.microsoft.com/office/drawing/2014/main" xmlns="" id="{7FCA1908-EC09-46BB-B633-12D671CD2244}"/>
               </a:ext>
             </a:extLst>
           </p:cNvPr>
@@ -11147,7 +10419,7 @@
           <p:cNvPr id="7" name="CaixaDeTexto 6">
             <a:extLst>
               <a:ext uri="{FF2B5EF4-FFF2-40B4-BE49-F238E27FC236}">
-                <a16:creationId xmlns:a16="http://schemas.microsoft.com/office/drawing/2014/main" id="{BF0B844E-C924-4EC3-B27F-D0C0220E391A}"/>
+                <a16:creationId xmlns:a16="http://schemas.microsoft.com/office/drawing/2014/main" xmlns="" id="{BF0B844E-C924-4EC3-B27F-D0C0220E391A}"/>
               </a:ext>
             </a:extLst>
           </p:cNvPr>
@@ -11183,150 +10455,10 @@
       </p:sp>
       <p:grpSp>
         <p:nvGrpSpPr>
-          <p:cNvPr id="17" name="Agrupar 16">
-            <a:extLst>
-              <a:ext uri="{FF2B5EF4-FFF2-40B4-BE49-F238E27FC236}">
-                <a16:creationId xmlns:a16="http://schemas.microsoft.com/office/drawing/2014/main" id="{5F6A7615-8293-4C3E-920B-5F0868699260}"/>
-              </a:ext>
-            </a:extLst>
-          </p:cNvPr>
-          <p:cNvGrpSpPr/>
-          <p:nvPr/>
-        </p:nvGrpSpPr>
-        <p:grpSpPr>
-          <a:xfrm>
-            <a:off x="392801" y="4403126"/>
-            <a:ext cx="2728823" cy="1333680"/>
-            <a:chOff x="151501" y="3501426"/>
-            <a:chExt cx="2728823" cy="1333680"/>
-          </a:xfrm>
-        </p:grpSpPr>
-        <p:sp>
-          <p:nvSpPr>
-            <p:cNvPr id="25" name="CaixaDeTexto 24">
-              <a:extLst>
-                <a:ext uri="{FF2B5EF4-FFF2-40B4-BE49-F238E27FC236}">
-                  <a16:creationId xmlns:a16="http://schemas.microsoft.com/office/drawing/2014/main" id="{E53E8429-486C-49E3-A88D-600F0719554F}"/>
-                </a:ext>
-              </a:extLst>
-            </p:cNvPr>
-            <p:cNvSpPr txBox="1"/>
-            <p:nvPr/>
-          </p:nvSpPr>
-          <p:spPr>
-            <a:xfrm>
-              <a:off x="151501" y="3501426"/>
-              <a:ext cx="2728823" cy="1200329"/>
-            </a:xfrm>
-            <a:prstGeom prst="rect">
-              <a:avLst/>
-            </a:prstGeom>
-          </p:spPr>
-          <p:txBody>
-            <a:bodyPr rot="0" spcFirstLastPara="0" vertOverflow="overflow" horzOverflow="overflow" vert="horz" wrap="square" lIns="91440" tIns="45720" rIns="91440" bIns="45720" numCol="1" spcCol="0" rtlCol="0" fromWordArt="0" anchor="t" anchorCtr="0" forceAA="0" compatLnSpc="1">
-              <a:prstTxWarp prst="textNoShape">
-                <a:avLst/>
-              </a:prstTxWarp>
-              <a:spAutoFit/>
-            </a:bodyPr>
-            <a:lstStyle/>
-            <a:p>
-              <a:pPr marL="285750" indent="-285750">
-                <a:buFont typeface="Arial"/>
-                <a:buChar char="•"/>
-              </a:pPr>
-              <a:r>
-                <a:rPr lang="pt-BR" b="1" i="1" dirty="0">
-                  <a:cs typeface="Calibri"/>
-                </a:rPr>
-                <a:t>Preencher cadastro</a:t>
-              </a:r>
-            </a:p>
-            <a:p>
-              <a:pPr marL="285750" indent="-285750">
-                <a:buFont typeface="Arial"/>
-                <a:buChar char="•"/>
-              </a:pPr>
-              <a:r>
-                <a:rPr lang="pt-BR" b="1" i="1" dirty="0">
-                  <a:cs typeface="Calibri"/>
-                </a:rPr>
-                <a:t>Entregar documentos solicitados</a:t>
-              </a:r>
-            </a:p>
-            <a:p>
-              <a:pPr marL="285750" indent="-285750">
-                <a:buFont typeface="Arial"/>
-                <a:buChar char="•"/>
-              </a:pPr>
-              <a:r>
-                <a:rPr lang="pt-BR" b="1" i="1" dirty="0">
-                  <a:cs typeface="Calibri"/>
-                </a:rPr>
-                <a:t>Pagar matricula </a:t>
-              </a:r>
-            </a:p>
-          </p:txBody>
-        </p:sp>
-        <p:sp>
-          <p:nvSpPr>
-            <p:cNvPr id="12" name="Retângulo 11">
-              <a:extLst>
-                <a:ext uri="{FF2B5EF4-FFF2-40B4-BE49-F238E27FC236}">
-                  <a16:creationId xmlns:a16="http://schemas.microsoft.com/office/drawing/2014/main" id="{E9117F55-F054-4FBD-92C8-EA6D071EE605}"/>
-                </a:ext>
-              </a:extLst>
-            </p:cNvPr>
-            <p:cNvSpPr/>
-            <p:nvPr/>
-          </p:nvSpPr>
-          <p:spPr>
-            <a:xfrm>
-              <a:off x="218536" y="3503763"/>
-              <a:ext cx="2495909" cy="1331343"/>
-            </a:xfrm>
-            <a:prstGeom prst="rect">
-              <a:avLst/>
-            </a:prstGeom>
-            <a:noFill/>
-            <a:ln>
-              <a:solidFill>
-                <a:schemeClr val="tx1"/>
-              </a:solidFill>
-            </a:ln>
-          </p:spPr>
-          <p:style>
-            <a:lnRef idx="2">
-              <a:schemeClr val="accent1">
-                <a:shade val="50000"/>
-              </a:schemeClr>
-            </a:lnRef>
-            <a:fillRef idx="1">
-              <a:schemeClr val="accent1"/>
-            </a:fillRef>
-            <a:effectRef idx="0">
-              <a:schemeClr val="accent1"/>
-            </a:effectRef>
-            <a:fontRef idx="minor">
-              <a:schemeClr val="lt1"/>
-            </a:fontRef>
-          </p:style>
-          <p:txBody>
-            <a:bodyPr rtlCol="0" anchor="ctr"/>
-            <a:lstStyle/>
-            <a:p>
-              <a:pPr algn="ctr"/>
-              <a:endParaRPr lang="pt-BR" dirty="0"/>
-            </a:p>
-          </p:txBody>
-        </p:sp>
-      </p:grpSp>
-      <p:grpSp>
-        <p:nvGrpSpPr>
           <p:cNvPr id="36" name="Agrupar 35">
             <a:extLst>
               <a:ext uri="{FF2B5EF4-FFF2-40B4-BE49-F238E27FC236}">
-                <a16:creationId xmlns:a16="http://schemas.microsoft.com/office/drawing/2014/main" id="{ADEBDF2A-18F2-40BF-947C-8CDFA518A908}"/>
+                <a16:creationId xmlns:a16="http://schemas.microsoft.com/office/drawing/2014/main" xmlns="" id="{ADEBDF2A-18F2-40BF-947C-8CDFA518A908}"/>
               </a:ext>
             </a:extLst>
           </p:cNvPr>
@@ -11346,7 +10478,7 @@
             <p:cNvPr id="32" name="CaixaDeTexto 31">
               <a:extLst>
                 <a:ext uri="{FF2B5EF4-FFF2-40B4-BE49-F238E27FC236}">
-                  <a16:creationId xmlns:a16="http://schemas.microsoft.com/office/drawing/2014/main" id="{566CD485-09EF-48E1-86C5-9CA202611613}"/>
+                  <a16:creationId xmlns:a16="http://schemas.microsoft.com/office/drawing/2014/main" xmlns="" id="{566CD485-09EF-48E1-86C5-9CA202611613}"/>
                 </a:ext>
               </a:extLst>
             </p:cNvPr>
@@ -11422,7 +10554,7 @@
             <p:cNvPr id="30" name="Retângulo 29">
               <a:extLst>
                 <a:ext uri="{FF2B5EF4-FFF2-40B4-BE49-F238E27FC236}">
-                  <a16:creationId xmlns:a16="http://schemas.microsoft.com/office/drawing/2014/main" id="{D7B5B938-3ED4-4381-81EC-D26D6C4BA4A2}"/>
+                  <a16:creationId xmlns:a16="http://schemas.microsoft.com/office/drawing/2014/main" xmlns="" id="{D7B5B938-3ED4-4381-81EC-D26D6C4BA4A2}"/>
                 </a:ext>
               </a:extLst>
             </p:cNvPr>
@@ -11472,10 +10604,10 @@
       </p:grpSp>
       <p:grpSp>
         <p:nvGrpSpPr>
-          <p:cNvPr id="34" name="Agrupar 33">
-            <a:extLst>
-              <a:ext uri="{FF2B5EF4-FFF2-40B4-BE49-F238E27FC236}">
-                <a16:creationId xmlns:a16="http://schemas.microsoft.com/office/drawing/2014/main" id="{ABB50412-1896-4D14-A871-573755747791}"/>
+          <p:cNvPr id="35" name="Agrupar 34">
+            <a:extLst>
+              <a:ext uri="{FF2B5EF4-FFF2-40B4-BE49-F238E27FC236}">
+                <a16:creationId xmlns:a16="http://schemas.microsoft.com/office/drawing/2014/main" xmlns="" id="{E876AD11-81BD-4580-9B33-4F7D24F45B10}"/>
               </a:ext>
             </a:extLst>
           </p:cNvPr>
@@ -11484,167 +10616,10 @@
         </p:nvGrpSpPr>
         <p:grpSpPr>
           <a:xfrm>
-            <a:off x="3101255" y="4874651"/>
-            <a:ext cx="2738108" cy="1510240"/>
-            <a:chOff x="2859955" y="3972951"/>
-            <a:chExt cx="2738108" cy="1510240"/>
-          </a:xfrm>
-        </p:grpSpPr>
-        <p:sp>
-          <p:nvSpPr>
-            <p:cNvPr id="29" name="CaixaDeTexto 28">
-              <a:extLst>
-                <a:ext uri="{FF2B5EF4-FFF2-40B4-BE49-F238E27FC236}">
-                  <a16:creationId xmlns:a16="http://schemas.microsoft.com/office/drawing/2014/main" id="{C9E5DC63-D53D-44B6-BB67-180826BCDCA2}"/>
-                </a:ext>
-              </a:extLst>
-            </p:cNvPr>
-            <p:cNvSpPr txBox="1"/>
-            <p:nvPr/>
-          </p:nvSpPr>
-          <p:spPr>
-            <a:xfrm>
-              <a:off x="2859955" y="4005863"/>
-              <a:ext cx="2728823" cy="1477328"/>
-            </a:xfrm>
-            <a:prstGeom prst="rect">
-              <a:avLst/>
-            </a:prstGeom>
-          </p:spPr>
-          <p:txBody>
-            <a:bodyPr rot="0" spcFirstLastPara="0" vertOverflow="overflow" horzOverflow="overflow" vert="horz" wrap="square" lIns="91440" tIns="45720" rIns="91440" bIns="45720" numCol="1" spcCol="0" rtlCol="0" fromWordArt="0" anchor="t" anchorCtr="0" forceAA="0" compatLnSpc="1">
-              <a:prstTxWarp prst="textNoShape">
-                <a:avLst/>
-              </a:prstTxWarp>
-              <a:spAutoFit/>
-            </a:bodyPr>
-            <a:lstStyle/>
-            <a:p>
-              <a:pPr marL="285750" indent="-285750">
-                <a:buFont typeface="Arial"/>
-                <a:buChar char="•"/>
-              </a:pPr>
-              <a:r>
-                <a:rPr lang="pt-BR" b="1" i="1" dirty="0">
-                  <a:cs typeface="Calibri"/>
-                </a:rPr>
-                <a:t>Pagar matricular </a:t>
-              </a:r>
-            </a:p>
-            <a:p>
-              <a:pPr marL="285750" indent="-285750">
-                <a:buFont typeface="Arial"/>
-                <a:buChar char="•"/>
-              </a:pPr>
-              <a:r>
-                <a:rPr lang="pt-BR" b="1" i="1" dirty="0">
-                  <a:cs typeface="Calibri"/>
-                </a:rPr>
-                <a:t>Autorizar dependente </a:t>
-              </a:r>
-            </a:p>
-            <a:p>
-              <a:pPr marL="285750" indent="-285750">
-                <a:buFont typeface="Arial"/>
-                <a:buChar char="•"/>
-              </a:pPr>
-              <a:r>
-                <a:rPr lang="pt-BR" b="1" i="1" dirty="0">
-                  <a:cs typeface="Calibri"/>
-                </a:rPr>
-                <a:t>Preencher cadastro </a:t>
-              </a:r>
-            </a:p>
-            <a:p>
-              <a:pPr marL="285750" indent="-285750">
-                <a:buFont typeface="Arial"/>
-                <a:buChar char="•"/>
-              </a:pPr>
-              <a:r>
-                <a:rPr lang="pt-BR" b="1" i="1" dirty="0">
-                  <a:cs typeface="Calibri"/>
-                </a:rPr>
-                <a:t>Entregar documentos </a:t>
-              </a:r>
-            </a:p>
-            <a:p>
-              <a:endParaRPr lang="pt-BR" b="1" i="1" u="sng" dirty="0">
-                <a:cs typeface="Calibri"/>
-              </a:endParaRPr>
-            </a:p>
-          </p:txBody>
-        </p:sp>
-        <p:sp>
-          <p:nvSpPr>
-            <p:cNvPr id="31" name="Retângulo 30">
-              <a:extLst>
-                <a:ext uri="{FF2B5EF4-FFF2-40B4-BE49-F238E27FC236}">
-                  <a16:creationId xmlns:a16="http://schemas.microsoft.com/office/drawing/2014/main" id="{2C8A8C53-733F-44F9-98EE-F32AD20E2C47}"/>
-                </a:ext>
-              </a:extLst>
-            </p:cNvPr>
-            <p:cNvSpPr/>
-            <p:nvPr/>
-          </p:nvSpPr>
-          <p:spPr>
-            <a:xfrm>
-              <a:off x="2886494" y="3972951"/>
-              <a:ext cx="2711569" cy="1345720"/>
-            </a:xfrm>
-            <a:prstGeom prst="rect">
-              <a:avLst/>
-            </a:prstGeom>
-            <a:noFill/>
-            <a:ln>
-              <a:solidFill>
-                <a:schemeClr val="tx1"/>
-              </a:solidFill>
-            </a:ln>
-          </p:spPr>
-          <p:style>
-            <a:lnRef idx="2">
-              <a:schemeClr val="accent1">
-                <a:shade val="50000"/>
-              </a:schemeClr>
-            </a:lnRef>
-            <a:fillRef idx="1">
-              <a:schemeClr val="accent1"/>
-            </a:fillRef>
-            <a:effectRef idx="0">
-              <a:schemeClr val="accent1"/>
-            </a:effectRef>
-            <a:fontRef idx="minor">
-              <a:schemeClr val="lt1"/>
-            </a:fontRef>
-          </p:style>
-          <p:txBody>
-            <a:bodyPr rtlCol="0" anchor="ctr"/>
-            <a:lstStyle/>
-            <a:p>
-              <a:pPr algn="ctr"/>
-              <a:endParaRPr lang="pt-BR"/>
-            </a:p>
-          </p:txBody>
-        </p:sp>
-      </p:grpSp>
-      <p:grpSp>
-        <p:nvGrpSpPr>
-          <p:cNvPr id="35" name="Agrupar 34">
-            <a:extLst>
-              <a:ext uri="{FF2B5EF4-FFF2-40B4-BE49-F238E27FC236}">
-                <a16:creationId xmlns:a16="http://schemas.microsoft.com/office/drawing/2014/main" id="{E876AD11-81BD-4580-9B33-4F7D24F45B10}"/>
-              </a:ext>
-            </a:extLst>
-          </p:cNvPr>
-          <p:cNvGrpSpPr/>
-          <p:nvPr/>
-        </p:nvGrpSpPr>
-        <p:grpSpPr>
-          <a:xfrm>
             <a:off x="6138892" y="4762558"/>
-            <a:ext cx="2791185" cy="2031325"/>
+            <a:ext cx="2791185" cy="1765001"/>
             <a:chOff x="5897592" y="3860858"/>
-            <a:chExt cx="2791185" cy="2031325"/>
+            <a:chExt cx="2791185" cy="1765001"/>
           </a:xfrm>
         </p:grpSpPr>
         <p:sp>
@@ -11652,7 +10627,7 @@
             <p:cNvPr id="28" name="CaixaDeTexto 27">
               <a:extLst>
                 <a:ext uri="{FF2B5EF4-FFF2-40B4-BE49-F238E27FC236}">
-                  <a16:creationId xmlns:a16="http://schemas.microsoft.com/office/drawing/2014/main" id="{06F24E56-56C0-48DE-B993-B1CF84033F10}"/>
+                  <a16:creationId xmlns:a16="http://schemas.microsoft.com/office/drawing/2014/main" xmlns="" id="{06F24E56-56C0-48DE-B993-B1CF84033F10}"/>
                 </a:ext>
               </a:extLst>
             </p:cNvPr>
@@ -11662,7 +10637,7 @@
           <p:spPr>
             <a:xfrm>
               <a:off x="5959954" y="3860858"/>
-              <a:ext cx="2728823" cy="2031325"/>
+              <a:ext cx="2728823" cy="1754326"/>
             </a:xfrm>
             <a:prstGeom prst="rect">
               <a:avLst/>
@@ -11687,6 +10662,9 @@
                 </a:rPr>
                 <a:t>Apresentar regras para matricula </a:t>
               </a:r>
+              <a:endParaRPr lang="pt-BR" b="1" i="1" dirty="0" smtClean="0">
+                <a:cs typeface="Calibri"/>
+              </a:endParaRPr>
             </a:p>
             <a:p>
               <a:pPr marL="285750" indent="-285750">
@@ -11694,11 +10672,14 @@
                 <a:buChar char="•"/>
               </a:pPr>
               <a:r>
-                <a:rPr lang="pt-BR" b="1" i="1" dirty="0">
+                <a:rPr lang="pt-BR" b="1" i="1" dirty="0" smtClean="0">
                   <a:cs typeface="Calibri"/>
                 </a:rPr>
-                <a:t>Cadastrar aluno/responsável</a:t>
+                <a:t>Realizar matricula</a:t>
               </a:r>
+              <a:endParaRPr lang="pt-BR" b="1" i="1" dirty="0">
+                <a:cs typeface="Calibri"/>
+              </a:endParaRPr>
             </a:p>
             <a:p>
               <a:pPr marL="285750" indent="-285750">
@@ -11706,10 +10687,16 @@
                 <a:buChar char="•"/>
               </a:pPr>
               <a:r>
+                <a:rPr lang="pt-BR" b="1" i="1" dirty="0" smtClean="0">
+                  <a:cs typeface="Calibri"/>
+                </a:rPr>
+                <a:t>Receber </a:t>
+              </a:r>
+              <a:r>
                 <a:rPr lang="pt-BR" b="1" i="1" dirty="0">
                   <a:cs typeface="Calibri"/>
                 </a:rPr>
-                <a:t>Receber pagamento </a:t>
+                <a:t>pagamento </a:t>
               </a:r>
             </a:p>
             <a:p>
@@ -11740,7 +10727,7 @@
             <p:cNvPr id="33" name="Retângulo 32">
               <a:extLst>
                 <a:ext uri="{FF2B5EF4-FFF2-40B4-BE49-F238E27FC236}">
-                  <a16:creationId xmlns:a16="http://schemas.microsoft.com/office/drawing/2014/main" id="{F00C5CCF-AC25-4099-8DD3-8B36FCAF56E7}"/>
+                  <a16:creationId xmlns:a16="http://schemas.microsoft.com/office/drawing/2014/main" xmlns="" id="{F00C5CCF-AC25-4099-8DD3-8B36FCAF56E7}"/>
                 </a:ext>
               </a:extLst>
             </p:cNvPr>
@@ -11823,7 +10810,7 @@
           <p:cNvPr id="4" name="Retângulo 3">
             <a:extLst>
               <a:ext uri="{FF2B5EF4-FFF2-40B4-BE49-F238E27FC236}">
-                <a16:creationId xmlns:a16="http://schemas.microsoft.com/office/drawing/2014/main" id="{88C6BF1B-8B81-4A42-B266-9DF3168EF8CB}"/>
+                <a16:creationId xmlns:a16="http://schemas.microsoft.com/office/drawing/2014/main" xmlns="" id="{88C6BF1B-8B81-4A42-B266-9DF3168EF8CB}"/>
               </a:ext>
             </a:extLst>
           </p:cNvPr>
@@ -11877,7 +10864,7 @@
           <p:cNvPr id="2" name="CaixaDeTexto 1">
             <a:extLst>
               <a:ext uri="{FF2B5EF4-FFF2-40B4-BE49-F238E27FC236}">
-                <a16:creationId xmlns:a16="http://schemas.microsoft.com/office/drawing/2014/main" id="{80F5CD5A-1914-4EF1-BE32-34B089486C2F}"/>
+                <a16:creationId xmlns:a16="http://schemas.microsoft.com/office/drawing/2014/main" xmlns="" id="{80F5CD5A-1914-4EF1-BE32-34B089486C2F}"/>
               </a:ext>
             </a:extLst>
           </p:cNvPr>
@@ -11918,7 +10905,7 @@
           <p:cNvPr id="3" name="Imagem 6" descr="Uma imagem contendo objeto&#10;&#10;Descrição gerada com muito alta confiança">
             <a:extLst>
               <a:ext uri="{FF2B5EF4-FFF2-40B4-BE49-F238E27FC236}">
-                <a16:creationId xmlns:a16="http://schemas.microsoft.com/office/drawing/2014/main" id="{3A958C51-9DB6-409A-8BCE-A5C77D3B1354}"/>
+                <a16:creationId xmlns:a16="http://schemas.microsoft.com/office/drawing/2014/main" xmlns="" id="{3A958C51-9DB6-409A-8BCE-A5C77D3B1354}"/>
               </a:ext>
             </a:extLst>
           </p:cNvPr>
@@ -11948,7 +10935,7 @@
           <p:cNvPr id="7" name="Retângulo 6">
             <a:extLst>
               <a:ext uri="{FF2B5EF4-FFF2-40B4-BE49-F238E27FC236}">
-                <a16:creationId xmlns:a16="http://schemas.microsoft.com/office/drawing/2014/main" id="{89094DE6-756F-4A82-8A95-1CBED37E87E2}"/>
+                <a16:creationId xmlns:a16="http://schemas.microsoft.com/office/drawing/2014/main" xmlns="" id="{89094DE6-756F-4A82-8A95-1CBED37E87E2}"/>
               </a:ext>
             </a:extLst>
           </p:cNvPr>
@@ -11997,7 +10984,7 @@
           <p:cNvPr id="9" name="Retângulo 8">
             <a:extLst>
               <a:ext uri="{FF2B5EF4-FFF2-40B4-BE49-F238E27FC236}">
-                <a16:creationId xmlns:a16="http://schemas.microsoft.com/office/drawing/2014/main" id="{407F5294-A287-4708-8220-29D5D97DEE86}"/>
+                <a16:creationId xmlns:a16="http://schemas.microsoft.com/office/drawing/2014/main" xmlns="" id="{407F5294-A287-4708-8220-29D5D97DEE86}"/>
               </a:ext>
             </a:extLst>
           </p:cNvPr>
@@ -12046,7 +11033,7 @@
           <p:cNvPr id="11" name="Retângulo 10">
             <a:extLst>
               <a:ext uri="{FF2B5EF4-FFF2-40B4-BE49-F238E27FC236}">
-                <a16:creationId xmlns:a16="http://schemas.microsoft.com/office/drawing/2014/main" id="{8CCE9E41-DF19-4539-AEB2-C83DDB8D015A}"/>
+                <a16:creationId xmlns:a16="http://schemas.microsoft.com/office/drawing/2014/main" xmlns="" id="{8CCE9E41-DF19-4539-AEB2-C83DDB8D015A}"/>
               </a:ext>
             </a:extLst>
           </p:cNvPr>
@@ -12095,7 +11082,7 @@
           <p:cNvPr id="13" name="CaixaDeTexto 12">
             <a:extLst>
               <a:ext uri="{FF2B5EF4-FFF2-40B4-BE49-F238E27FC236}">
-                <a16:creationId xmlns:a16="http://schemas.microsoft.com/office/drawing/2014/main" id="{36A1F85B-7B7F-4EB2-A921-5BDA85D5F006}"/>
+                <a16:creationId xmlns:a16="http://schemas.microsoft.com/office/drawing/2014/main" xmlns="" id="{36A1F85B-7B7F-4EB2-A921-5BDA85D5F006}"/>
               </a:ext>
             </a:extLst>
           </p:cNvPr>
@@ -12137,7 +11124,7 @@
           <p:cNvPr id="15" name="CaixaDeTexto 14">
             <a:extLst>
               <a:ext uri="{FF2B5EF4-FFF2-40B4-BE49-F238E27FC236}">
-                <a16:creationId xmlns:a16="http://schemas.microsoft.com/office/drawing/2014/main" id="{F4835543-02C9-4F7E-942E-19AA80F41074}"/>
+                <a16:creationId xmlns:a16="http://schemas.microsoft.com/office/drawing/2014/main" xmlns="" id="{F4835543-02C9-4F7E-942E-19AA80F41074}"/>
               </a:ext>
             </a:extLst>
           </p:cNvPr>
@@ -12179,7 +11166,7 @@
           <p:cNvPr id="17" name="Conector de Seta Reta 16">
             <a:extLst>
               <a:ext uri="{FF2B5EF4-FFF2-40B4-BE49-F238E27FC236}">
-                <a16:creationId xmlns:a16="http://schemas.microsoft.com/office/drawing/2014/main" id="{411AA6B9-507C-44D4-9959-3C997B8CBC1D}"/>
+                <a16:creationId xmlns:a16="http://schemas.microsoft.com/office/drawing/2014/main" xmlns="" id="{411AA6B9-507C-44D4-9959-3C997B8CBC1D}"/>
               </a:ext>
             </a:extLst>
           </p:cNvPr>
@@ -12223,7 +11210,7 @@
           <p:cNvPr id="19" name="Conector de Seta Reta 18">
             <a:extLst>
               <a:ext uri="{FF2B5EF4-FFF2-40B4-BE49-F238E27FC236}">
-                <a16:creationId xmlns:a16="http://schemas.microsoft.com/office/drawing/2014/main" id="{93EB990D-C099-4555-BD11-426E6E8EE67F}"/>
+                <a16:creationId xmlns:a16="http://schemas.microsoft.com/office/drawing/2014/main" xmlns="" id="{93EB990D-C099-4555-BD11-426E6E8EE67F}"/>
               </a:ext>
             </a:extLst>
           </p:cNvPr>
@@ -12267,7 +11254,7 @@
           <p:cNvPr id="21" name="CaixaDeTexto 20">
             <a:extLst>
               <a:ext uri="{FF2B5EF4-FFF2-40B4-BE49-F238E27FC236}">
-                <a16:creationId xmlns:a16="http://schemas.microsoft.com/office/drawing/2014/main" id="{DDB3C006-F399-4DA0-84A7-14D02AA99AD9}"/>
+                <a16:creationId xmlns:a16="http://schemas.microsoft.com/office/drawing/2014/main" xmlns="" id="{DDB3C006-F399-4DA0-84A7-14D02AA99AD9}"/>
               </a:ext>
             </a:extLst>
           </p:cNvPr>
@@ -12307,7 +11294,7 @@
           <p:cNvPr id="14" name="Imagem 6" descr="Uma imagem contendo objeto&#10;&#10;Descrição gerada com muito alta confiança">
             <a:extLst>
               <a:ext uri="{FF2B5EF4-FFF2-40B4-BE49-F238E27FC236}">
-                <a16:creationId xmlns:a16="http://schemas.microsoft.com/office/drawing/2014/main" id="{679141C5-05BA-4E9B-9DE4-33CA40E689E3}"/>
+                <a16:creationId xmlns:a16="http://schemas.microsoft.com/office/drawing/2014/main" xmlns="" id="{679141C5-05BA-4E9B-9DE4-33CA40E689E3}"/>
               </a:ext>
             </a:extLst>
           </p:cNvPr>
@@ -12337,7 +11324,7 @@
           <p:cNvPr id="5" name="CaixaDeTexto 4">
             <a:extLst>
               <a:ext uri="{FF2B5EF4-FFF2-40B4-BE49-F238E27FC236}">
-                <a16:creationId xmlns:a16="http://schemas.microsoft.com/office/drawing/2014/main" id="{B16219F2-C8D5-4962-B139-35FAB8DA186B}"/>
+                <a16:creationId xmlns:a16="http://schemas.microsoft.com/office/drawing/2014/main" xmlns="" id="{B16219F2-C8D5-4962-B139-35FAB8DA186B}"/>
               </a:ext>
             </a:extLst>
           </p:cNvPr>
@@ -12374,7 +11361,7 @@
           <p:cNvPr id="6" name="CaixaDeTexto 5">
             <a:extLst>
               <a:ext uri="{FF2B5EF4-FFF2-40B4-BE49-F238E27FC236}">
-                <a16:creationId xmlns:a16="http://schemas.microsoft.com/office/drawing/2014/main" id="{E30895BE-0869-4DCC-8DF3-4E9AA8EB5C8C}"/>
+                <a16:creationId xmlns:a16="http://schemas.microsoft.com/office/drawing/2014/main" xmlns="" id="{E30895BE-0869-4DCC-8DF3-4E9AA8EB5C8C}"/>
               </a:ext>
             </a:extLst>
           </p:cNvPr>
@@ -12416,7 +11403,7 @@
           <p:cNvPr id="20" name="Conector de Seta Reta 19">
             <a:extLst>
               <a:ext uri="{FF2B5EF4-FFF2-40B4-BE49-F238E27FC236}">
-                <a16:creationId xmlns:a16="http://schemas.microsoft.com/office/drawing/2014/main" id="{14BFD4BF-B15E-4CD7-866F-99EB8A96BAA7}"/>
+                <a16:creationId xmlns:a16="http://schemas.microsoft.com/office/drawing/2014/main" xmlns="" id="{14BFD4BF-B15E-4CD7-866F-99EB8A96BAA7}"/>
               </a:ext>
             </a:extLst>
           </p:cNvPr>
@@ -12490,7 +11477,7 @@
           <p:cNvPr id="4" name="Retângulo 3">
             <a:extLst>
               <a:ext uri="{FF2B5EF4-FFF2-40B4-BE49-F238E27FC236}">
-                <a16:creationId xmlns:a16="http://schemas.microsoft.com/office/drawing/2014/main" id="{88C6BF1B-8B81-4A42-B266-9DF3168EF8CB}"/>
+                <a16:creationId xmlns:a16="http://schemas.microsoft.com/office/drawing/2014/main" xmlns="" id="{88C6BF1B-8B81-4A42-B266-9DF3168EF8CB}"/>
               </a:ext>
             </a:extLst>
           </p:cNvPr>
@@ -12544,7 +11531,7 @@
           <p:cNvPr id="2" name="CaixaDeTexto 1">
             <a:extLst>
               <a:ext uri="{FF2B5EF4-FFF2-40B4-BE49-F238E27FC236}">
-                <a16:creationId xmlns:a16="http://schemas.microsoft.com/office/drawing/2014/main" id="{80F5CD5A-1914-4EF1-BE32-34B089486C2F}"/>
+                <a16:creationId xmlns:a16="http://schemas.microsoft.com/office/drawing/2014/main" xmlns="" id="{80F5CD5A-1914-4EF1-BE32-34B089486C2F}"/>
               </a:ext>
             </a:extLst>
           </p:cNvPr>
@@ -12585,7 +11572,7 @@
           <p:cNvPr id="5" name="Conector de Seta Reta 4">
             <a:extLst>
               <a:ext uri="{FF2B5EF4-FFF2-40B4-BE49-F238E27FC236}">
-                <a16:creationId xmlns:a16="http://schemas.microsoft.com/office/drawing/2014/main" id="{85E6B2C7-D043-4C92-898F-4F2DEE8A2690}"/>
+                <a16:creationId xmlns:a16="http://schemas.microsoft.com/office/drawing/2014/main" xmlns="" id="{85E6B2C7-D043-4C92-898F-4F2DEE8A2690}"/>
               </a:ext>
             </a:extLst>
           </p:cNvPr>
@@ -12628,7 +11615,7 @@
           <p:cNvPr id="6" name="Conector de Seta Reta 5">
             <a:extLst>
               <a:ext uri="{FF2B5EF4-FFF2-40B4-BE49-F238E27FC236}">
-                <a16:creationId xmlns:a16="http://schemas.microsoft.com/office/drawing/2014/main" id="{9BACC1B6-2F2A-4248-B083-17CB87D6E5BE}"/>
+                <a16:creationId xmlns:a16="http://schemas.microsoft.com/office/drawing/2014/main" xmlns="" id="{9BACC1B6-2F2A-4248-B083-17CB87D6E5BE}"/>
               </a:ext>
             </a:extLst>
           </p:cNvPr>
@@ -12671,7 +11658,7 @@
           <p:cNvPr id="50" name="Agrupar 49">
             <a:extLst>
               <a:ext uri="{FF2B5EF4-FFF2-40B4-BE49-F238E27FC236}">
-                <a16:creationId xmlns:a16="http://schemas.microsoft.com/office/drawing/2014/main" id="{59A99669-CC2E-471C-9533-EE65C05F42DC}"/>
+                <a16:creationId xmlns:a16="http://schemas.microsoft.com/office/drawing/2014/main" xmlns="" id="{59A99669-CC2E-471C-9533-EE65C05F42DC}"/>
               </a:ext>
             </a:extLst>
           </p:cNvPr>
@@ -12691,7 +11678,7 @@
             <p:cNvPr id="8" name="Retângulo 7">
               <a:extLst>
                 <a:ext uri="{FF2B5EF4-FFF2-40B4-BE49-F238E27FC236}">
-                  <a16:creationId xmlns:a16="http://schemas.microsoft.com/office/drawing/2014/main" id="{5941647A-72D6-4138-BD44-C48D31273AB1}"/>
+                  <a16:creationId xmlns:a16="http://schemas.microsoft.com/office/drawing/2014/main" xmlns="" id="{5941647A-72D6-4138-BD44-C48D31273AB1}"/>
                 </a:ext>
               </a:extLst>
             </p:cNvPr>
@@ -12745,7 +11732,7 @@
             <p:cNvPr id="9" name="CaixaDeTexto 1">
               <a:extLst>
                 <a:ext uri="{FF2B5EF4-FFF2-40B4-BE49-F238E27FC236}">
-                  <a16:creationId xmlns:a16="http://schemas.microsoft.com/office/drawing/2014/main" id="{7994EBAF-0D7D-41FB-B228-383D0E67FB6C}"/>
+                  <a16:creationId xmlns:a16="http://schemas.microsoft.com/office/drawing/2014/main" xmlns="" id="{7994EBAF-0D7D-41FB-B228-383D0E67FB6C}"/>
                 </a:ext>
               </a:extLst>
             </p:cNvPr>
@@ -12882,7 +11869,7 @@
           <p:cNvPr id="49" name="Agrupar 48">
             <a:extLst>
               <a:ext uri="{FF2B5EF4-FFF2-40B4-BE49-F238E27FC236}">
-                <a16:creationId xmlns:a16="http://schemas.microsoft.com/office/drawing/2014/main" id="{23F3B3EC-DB9B-48C6-B968-A50048FE2EB4}"/>
+                <a16:creationId xmlns:a16="http://schemas.microsoft.com/office/drawing/2014/main" xmlns="" id="{23F3B3EC-DB9B-48C6-B968-A50048FE2EB4}"/>
               </a:ext>
             </a:extLst>
           </p:cNvPr>
@@ -12902,7 +11889,7 @@
             <p:cNvPr id="10" name="Retângulo 9">
               <a:extLst>
                 <a:ext uri="{FF2B5EF4-FFF2-40B4-BE49-F238E27FC236}">
-                  <a16:creationId xmlns:a16="http://schemas.microsoft.com/office/drawing/2014/main" id="{971BC70D-B8E4-4A17-B17F-86055154C60C}"/>
+                  <a16:creationId xmlns:a16="http://schemas.microsoft.com/office/drawing/2014/main" xmlns="" id="{971BC70D-B8E4-4A17-B17F-86055154C60C}"/>
                 </a:ext>
               </a:extLst>
             </p:cNvPr>
@@ -12956,7 +11943,7 @@
             <p:cNvPr id="11" name="CaixaDeTexto 1">
               <a:extLst>
                 <a:ext uri="{FF2B5EF4-FFF2-40B4-BE49-F238E27FC236}">
-                  <a16:creationId xmlns:a16="http://schemas.microsoft.com/office/drawing/2014/main" id="{F77E377A-2299-45F1-BD65-AD221DB0412C}"/>
+                  <a16:creationId xmlns:a16="http://schemas.microsoft.com/office/drawing/2014/main" xmlns="" id="{F77E377A-2299-45F1-BD65-AD221DB0412C}"/>
                 </a:ext>
               </a:extLst>
             </p:cNvPr>
@@ -13093,7 +12080,7 @@
           <p:cNvPr id="53" name="Agrupar 52">
             <a:extLst>
               <a:ext uri="{FF2B5EF4-FFF2-40B4-BE49-F238E27FC236}">
-                <a16:creationId xmlns:a16="http://schemas.microsoft.com/office/drawing/2014/main" id="{9102A23B-7600-4BE1-A0EA-04D802778857}"/>
+                <a16:creationId xmlns:a16="http://schemas.microsoft.com/office/drawing/2014/main" xmlns="" id="{9102A23B-7600-4BE1-A0EA-04D802778857}"/>
               </a:ext>
             </a:extLst>
           </p:cNvPr>
@@ -13113,7 +12100,7 @@
             <p:cNvPr id="13" name="Imagem 6" descr="Uma imagem contendo objeto&#10;&#10;Descrição gerada com muito alta confiança">
               <a:extLst>
                 <a:ext uri="{FF2B5EF4-FFF2-40B4-BE49-F238E27FC236}">
-                  <a16:creationId xmlns:a16="http://schemas.microsoft.com/office/drawing/2014/main" id="{63824687-0B05-4413-8D3C-5E29C9702638}"/>
+                  <a16:creationId xmlns:a16="http://schemas.microsoft.com/office/drawing/2014/main" xmlns="" id="{63824687-0B05-4413-8D3C-5E29C9702638}"/>
                 </a:ext>
               </a:extLst>
             </p:cNvPr>
@@ -13143,7 +12130,7 @@
             <p:cNvPr id="16" name="CaixaDeTexto 15">
               <a:extLst>
                 <a:ext uri="{FF2B5EF4-FFF2-40B4-BE49-F238E27FC236}">
-                  <a16:creationId xmlns:a16="http://schemas.microsoft.com/office/drawing/2014/main" id="{FDA29973-2090-478C-8CFB-2DD1F5F78F5A}"/>
+                  <a16:creationId xmlns:a16="http://schemas.microsoft.com/office/drawing/2014/main" xmlns="" id="{FDA29973-2090-478C-8CFB-2DD1F5F78F5A}"/>
                 </a:ext>
               </a:extLst>
             </p:cNvPr>
@@ -13181,7 +12168,7 @@
           <p:cNvPr id="52" name="Agrupar 51">
             <a:extLst>
               <a:ext uri="{FF2B5EF4-FFF2-40B4-BE49-F238E27FC236}">
-                <a16:creationId xmlns:a16="http://schemas.microsoft.com/office/drawing/2014/main" id="{117C8AE4-4833-4058-9612-B813911B00FD}"/>
+                <a16:creationId xmlns:a16="http://schemas.microsoft.com/office/drawing/2014/main" xmlns="" id="{117C8AE4-4833-4058-9612-B813911B00FD}"/>
               </a:ext>
             </a:extLst>
           </p:cNvPr>
@@ -13201,7 +12188,7 @@
             <p:cNvPr id="14" name="Imagem 6" descr="Uma imagem contendo objeto&#10;&#10;Descrição gerada com muito alta confiança">
               <a:extLst>
                 <a:ext uri="{FF2B5EF4-FFF2-40B4-BE49-F238E27FC236}">
-                  <a16:creationId xmlns:a16="http://schemas.microsoft.com/office/drawing/2014/main" id="{DBED1A96-C999-457A-8F32-18571E67930B}"/>
+                  <a16:creationId xmlns:a16="http://schemas.microsoft.com/office/drawing/2014/main" xmlns="" id="{DBED1A96-C999-457A-8F32-18571E67930B}"/>
                 </a:ext>
               </a:extLst>
             </p:cNvPr>
@@ -13231,7 +12218,7 @@
             <p:cNvPr id="18" name="CaixaDeTexto 17">
               <a:extLst>
                 <a:ext uri="{FF2B5EF4-FFF2-40B4-BE49-F238E27FC236}">
-                  <a16:creationId xmlns:a16="http://schemas.microsoft.com/office/drawing/2014/main" id="{4A840F81-AC70-4925-A6AF-06B2ECF11F52}"/>
+                  <a16:creationId xmlns:a16="http://schemas.microsoft.com/office/drawing/2014/main" xmlns="" id="{4A840F81-AC70-4925-A6AF-06B2ECF11F52}"/>
                 </a:ext>
               </a:extLst>
             </p:cNvPr>
@@ -13269,7 +12256,7 @@
           <p:cNvPr id="19" name="Conector de Seta Reta 18">
             <a:extLst>
               <a:ext uri="{FF2B5EF4-FFF2-40B4-BE49-F238E27FC236}">
-                <a16:creationId xmlns:a16="http://schemas.microsoft.com/office/drawing/2014/main" id="{7053101E-BA41-4AFA-90EB-5F30E05D5C2A}"/>
+                <a16:creationId xmlns:a16="http://schemas.microsoft.com/office/drawing/2014/main" xmlns="" id="{7053101E-BA41-4AFA-90EB-5F30E05D5C2A}"/>
               </a:ext>
             </a:extLst>
           </p:cNvPr>
@@ -13313,7 +12300,7 @@
           <p:cNvPr id="20" name="Conector de Seta Reta 19">
             <a:extLst>
               <a:ext uri="{FF2B5EF4-FFF2-40B4-BE49-F238E27FC236}">
-                <a16:creationId xmlns:a16="http://schemas.microsoft.com/office/drawing/2014/main" id="{972CCC72-617F-4D78-B3FE-1B11C03D20E1}"/>
+                <a16:creationId xmlns:a16="http://schemas.microsoft.com/office/drawing/2014/main" xmlns="" id="{972CCC72-617F-4D78-B3FE-1B11C03D20E1}"/>
               </a:ext>
             </a:extLst>
           </p:cNvPr>
@@ -13357,7 +12344,7 @@
           <p:cNvPr id="21" name="Conector de Seta Reta 20">
             <a:extLst>
               <a:ext uri="{FF2B5EF4-FFF2-40B4-BE49-F238E27FC236}">
-                <a16:creationId xmlns:a16="http://schemas.microsoft.com/office/drawing/2014/main" id="{EA66EA41-B19F-44A8-87CD-EFADB016E3DD}"/>
+                <a16:creationId xmlns:a16="http://schemas.microsoft.com/office/drawing/2014/main" xmlns="" id="{EA66EA41-B19F-44A8-87CD-EFADB016E3DD}"/>
               </a:ext>
             </a:extLst>
           </p:cNvPr>
@@ -13401,7 +12388,7 @@
           <p:cNvPr id="23" name="Conector de Seta Reta 22">
             <a:extLst>
               <a:ext uri="{FF2B5EF4-FFF2-40B4-BE49-F238E27FC236}">
-                <a16:creationId xmlns:a16="http://schemas.microsoft.com/office/drawing/2014/main" id="{6F2A4F03-C5E4-40D7-AA81-EDDBC7B02437}"/>
+                <a16:creationId xmlns:a16="http://schemas.microsoft.com/office/drawing/2014/main" xmlns="" id="{6F2A4F03-C5E4-40D7-AA81-EDDBC7B02437}"/>
               </a:ext>
             </a:extLst>
           </p:cNvPr>
@@ -13442,10 +12429,10 @@
       </p:cxnSp>
       <p:cxnSp>
         <p:nvCxnSpPr>
-          <p:cNvPr id="24" name="Conector de Seta Reta 23">
-            <a:extLst>
-              <a:ext uri="{FF2B5EF4-FFF2-40B4-BE49-F238E27FC236}">
-                <a16:creationId xmlns:a16="http://schemas.microsoft.com/office/drawing/2014/main" id="{906C5ED3-A468-446B-91A1-50EACFAF704A}"/>
+          <p:cNvPr id="27" name="Conector de Seta Reta 26">
+            <a:extLst>
+              <a:ext uri="{FF2B5EF4-FFF2-40B4-BE49-F238E27FC236}">
+                <a16:creationId xmlns:a16="http://schemas.microsoft.com/office/drawing/2014/main" xmlns="" id="{569658DA-03D1-4969-9E0E-3405A27FE72E}"/>
               </a:ext>
             </a:extLst>
           </p:cNvPr>
@@ -13456,8 +12443,8 @@
         </p:nvCxnSpPr>
         <p:spPr>
           <a:xfrm flipH="1">
-            <a:off x="825500" y="2871158"/>
-            <a:ext cx="500091" cy="1000664"/>
+            <a:off x="10981427" y="2583612"/>
+            <a:ext cx="5750" cy="1058173"/>
           </a:xfrm>
           <a:prstGeom prst="straightConnector1">
             <a:avLst/>
@@ -13484,100 +12471,12 @@
           </a:fontRef>
         </p:style>
       </p:cxnSp>
-      <p:cxnSp>
-        <p:nvCxnSpPr>
-          <p:cNvPr id="26" name="Conector de Seta Reta 25">
-            <a:extLst>
-              <a:ext uri="{FF2B5EF4-FFF2-40B4-BE49-F238E27FC236}">
-                <a16:creationId xmlns:a16="http://schemas.microsoft.com/office/drawing/2014/main" id="{80EA2B90-3614-439A-9F6B-2F7DD190FAAF}"/>
-              </a:ext>
-            </a:extLst>
-          </p:cNvPr>
-          <p:cNvCxnSpPr>
-            <a:cxnSpLocks/>
-          </p:cNvCxnSpPr>
-          <p:nvPr/>
-        </p:nvCxnSpPr>
-        <p:spPr>
-          <a:xfrm>
-            <a:off x="3237424" y="2918036"/>
-            <a:ext cx="20844" cy="1333887"/>
-          </a:xfrm>
-          <a:prstGeom prst="straightConnector1">
-            <a:avLst/>
-          </a:prstGeom>
-          <a:ln>
-            <a:solidFill>
-              <a:schemeClr val="tx1"/>
-            </a:solidFill>
-            <a:tailEnd type="triangle"/>
-          </a:ln>
-        </p:spPr>
-        <p:style>
-          <a:lnRef idx="1">
-            <a:schemeClr val="accent1"/>
-          </a:lnRef>
-          <a:fillRef idx="0">
-            <a:schemeClr val="accent1"/>
-          </a:fillRef>
-          <a:effectRef idx="0">
-            <a:schemeClr val="accent1"/>
-          </a:effectRef>
-          <a:fontRef idx="minor">
-            <a:schemeClr val="tx1"/>
-          </a:fontRef>
-        </p:style>
-      </p:cxnSp>
-      <p:cxnSp>
-        <p:nvCxnSpPr>
-          <p:cNvPr id="27" name="Conector de Seta Reta 26">
-            <a:extLst>
-              <a:ext uri="{FF2B5EF4-FFF2-40B4-BE49-F238E27FC236}">
-                <a16:creationId xmlns:a16="http://schemas.microsoft.com/office/drawing/2014/main" id="{569658DA-03D1-4969-9E0E-3405A27FE72E}"/>
-              </a:ext>
-            </a:extLst>
-          </p:cNvPr>
-          <p:cNvCxnSpPr>
-            <a:cxnSpLocks/>
-          </p:cNvCxnSpPr>
-          <p:nvPr/>
-        </p:nvCxnSpPr>
-        <p:spPr>
-          <a:xfrm flipH="1">
-            <a:off x="10981427" y="2583612"/>
-            <a:ext cx="5750" cy="1058173"/>
-          </a:xfrm>
-          <a:prstGeom prst="straightConnector1">
-            <a:avLst/>
-          </a:prstGeom>
-          <a:ln>
-            <a:solidFill>
-              <a:schemeClr val="tx1"/>
-            </a:solidFill>
-            <a:tailEnd type="triangle"/>
-          </a:ln>
-        </p:spPr>
-        <p:style>
-          <a:lnRef idx="1">
-            <a:schemeClr val="accent1"/>
-          </a:lnRef>
-          <a:fillRef idx="0">
-            <a:schemeClr val="accent1"/>
-          </a:fillRef>
-          <a:effectRef idx="0">
-            <a:schemeClr val="accent1"/>
-          </a:effectRef>
-          <a:fontRef idx="minor">
-            <a:schemeClr val="tx1"/>
-          </a:fontRef>
-        </p:style>
-      </p:cxnSp>
       <p:sp>
         <p:nvSpPr>
           <p:cNvPr id="3" name="CaixaDeTexto 2">
             <a:extLst>
               <a:ext uri="{FF2B5EF4-FFF2-40B4-BE49-F238E27FC236}">
-                <a16:creationId xmlns:a16="http://schemas.microsoft.com/office/drawing/2014/main" id="{7FCA1908-EC09-46BB-B633-12D671CD2244}"/>
+                <a16:creationId xmlns:a16="http://schemas.microsoft.com/office/drawing/2014/main" xmlns="" id="{7FCA1908-EC09-46BB-B633-12D671CD2244}"/>
               </a:ext>
             </a:extLst>
           </p:cNvPr>
@@ -13618,7 +12517,7 @@
           <p:cNvPr id="7" name="CaixaDeTexto 6">
             <a:extLst>
               <a:ext uri="{FF2B5EF4-FFF2-40B4-BE49-F238E27FC236}">
-                <a16:creationId xmlns:a16="http://schemas.microsoft.com/office/drawing/2014/main" id="{BF0B844E-C924-4EC3-B27F-D0C0220E391A}"/>
+                <a16:creationId xmlns:a16="http://schemas.microsoft.com/office/drawing/2014/main" xmlns="" id="{BF0B844E-C924-4EC3-B27F-D0C0220E391A}"/>
               </a:ext>
             </a:extLst>
           </p:cNvPr>
@@ -13654,141 +12553,10 @@
       </p:sp>
       <p:grpSp>
         <p:nvGrpSpPr>
-          <p:cNvPr id="15" name="Agrupar 14">
-            <a:extLst>
-              <a:ext uri="{FF2B5EF4-FFF2-40B4-BE49-F238E27FC236}">
-                <a16:creationId xmlns:a16="http://schemas.microsoft.com/office/drawing/2014/main" id="{47E1B779-6432-49B7-86ED-33E60A952FA9}"/>
-              </a:ext>
-            </a:extLst>
-          </p:cNvPr>
-          <p:cNvGrpSpPr/>
-          <p:nvPr/>
-        </p:nvGrpSpPr>
-        <p:grpSpPr>
-          <a:xfrm>
-            <a:off x="189601" y="4034826"/>
-            <a:ext cx="2585050" cy="1333680"/>
-            <a:chOff x="151501" y="3501426"/>
-            <a:chExt cx="2585050" cy="1333680"/>
-          </a:xfrm>
-        </p:grpSpPr>
-        <p:sp>
-          <p:nvSpPr>
-            <p:cNvPr id="25" name="CaixaDeTexto 24">
-              <a:extLst>
-                <a:ext uri="{FF2B5EF4-FFF2-40B4-BE49-F238E27FC236}">
-                  <a16:creationId xmlns:a16="http://schemas.microsoft.com/office/drawing/2014/main" id="{E53E8429-486C-49E3-A88D-600F0719554F}"/>
-                </a:ext>
-              </a:extLst>
-            </p:cNvPr>
-            <p:cNvSpPr txBox="1"/>
-            <p:nvPr/>
-          </p:nvSpPr>
-          <p:spPr>
-            <a:xfrm>
-              <a:off x="151501" y="3501426"/>
-              <a:ext cx="2585050" cy="1200329"/>
-            </a:xfrm>
-            <a:prstGeom prst="rect">
-              <a:avLst/>
-            </a:prstGeom>
-          </p:spPr>
-          <p:txBody>
-            <a:bodyPr rot="0" spcFirstLastPara="0" vertOverflow="overflow" horzOverflow="overflow" vert="horz" wrap="square" lIns="91440" tIns="45720" rIns="91440" bIns="45720" numCol="1" spcCol="0" rtlCol="0" fromWordArt="0" anchor="t" anchorCtr="0" forceAA="0" compatLnSpc="1">
-              <a:prstTxWarp prst="textNoShape">
-                <a:avLst/>
-              </a:prstTxWarp>
-              <a:spAutoFit/>
-            </a:bodyPr>
-            <a:lstStyle/>
-            <a:p>
-              <a:pPr marL="285750" indent="-285750">
-                <a:buFont typeface="Arial"/>
-                <a:buChar char="•"/>
-              </a:pPr>
-              <a:r>
-                <a:rPr lang="pt-BR" b="1" i="1" dirty="0">
-                  <a:cs typeface="Calibri"/>
-                </a:rPr>
-                <a:t>Cumprir regras da aula</a:t>
-              </a:r>
-              <a:endParaRPr lang="pt-BR" dirty="0">
-                <a:cs typeface="Calibri"/>
-              </a:endParaRPr>
-            </a:p>
-            <a:p>
-              <a:pPr marL="285750" indent="-285750">
-                <a:buFont typeface="Arial"/>
-                <a:buChar char="•"/>
-              </a:pPr>
-              <a:r>
-                <a:rPr lang="pt-BR" b="1" i="1" dirty="0">
-                  <a:cs typeface="Calibri"/>
-                </a:rPr>
-                <a:t>Fazer atividades propostas</a:t>
-              </a:r>
-            </a:p>
-          </p:txBody>
-        </p:sp>
-        <p:sp>
-          <p:nvSpPr>
-            <p:cNvPr id="12" name="Retângulo 11">
-              <a:extLst>
-                <a:ext uri="{FF2B5EF4-FFF2-40B4-BE49-F238E27FC236}">
-                  <a16:creationId xmlns:a16="http://schemas.microsoft.com/office/drawing/2014/main" id="{E9117F55-F054-4FBD-92C8-EA6D071EE605}"/>
-                </a:ext>
-              </a:extLst>
-            </p:cNvPr>
-            <p:cNvSpPr/>
-            <p:nvPr/>
-          </p:nvSpPr>
-          <p:spPr>
-            <a:xfrm>
-              <a:off x="218536" y="3503763"/>
-              <a:ext cx="2107721" cy="1331343"/>
-            </a:xfrm>
-            <a:prstGeom prst="rect">
-              <a:avLst/>
-            </a:prstGeom>
-            <a:noFill/>
-            <a:ln>
-              <a:solidFill>
-                <a:schemeClr val="tx1"/>
-              </a:solidFill>
-            </a:ln>
-          </p:spPr>
-          <p:style>
-            <a:lnRef idx="2">
-              <a:schemeClr val="accent1">
-                <a:shade val="50000"/>
-              </a:schemeClr>
-            </a:lnRef>
-            <a:fillRef idx="1">
-              <a:schemeClr val="accent1"/>
-            </a:fillRef>
-            <a:effectRef idx="0">
-              <a:schemeClr val="accent1"/>
-            </a:effectRef>
-            <a:fontRef idx="minor">
-              <a:schemeClr val="lt1"/>
-            </a:fontRef>
-          </p:style>
-          <p:txBody>
-            <a:bodyPr rtlCol="0" anchor="ctr"/>
-            <a:lstStyle/>
-            <a:p>
-              <a:pPr algn="ctr"/>
-              <a:endParaRPr lang="pt-BR" u="sng" dirty="0"/>
-            </a:p>
-          </p:txBody>
-        </p:sp>
-      </p:grpSp>
-      <p:grpSp>
-        <p:nvGrpSpPr>
           <p:cNvPr id="42" name="Agrupar 41">
             <a:extLst>
               <a:ext uri="{FF2B5EF4-FFF2-40B4-BE49-F238E27FC236}">
-                <a16:creationId xmlns:a16="http://schemas.microsoft.com/office/drawing/2014/main" id="{21F91D42-F2B6-4275-A3D0-4C3BAED84193}"/>
+                <a16:creationId xmlns:a16="http://schemas.microsoft.com/office/drawing/2014/main" xmlns="" id="{21F91D42-F2B6-4275-A3D0-4C3BAED84193}"/>
               </a:ext>
             </a:extLst>
           </p:cNvPr>
@@ -13808,7 +12576,7 @@
             <p:cNvPr id="32" name="CaixaDeTexto 31">
               <a:extLst>
                 <a:ext uri="{FF2B5EF4-FFF2-40B4-BE49-F238E27FC236}">
-                  <a16:creationId xmlns:a16="http://schemas.microsoft.com/office/drawing/2014/main" id="{566CD485-09EF-48E1-86C5-9CA202611613}"/>
+                  <a16:creationId xmlns:a16="http://schemas.microsoft.com/office/drawing/2014/main" xmlns="" id="{566CD485-09EF-48E1-86C5-9CA202611613}"/>
                 </a:ext>
               </a:extLst>
             </p:cNvPr>
@@ -13887,7 +12655,7 @@
             <p:cNvPr id="30" name="Retângulo 29">
               <a:extLst>
                 <a:ext uri="{FF2B5EF4-FFF2-40B4-BE49-F238E27FC236}">
-                  <a16:creationId xmlns:a16="http://schemas.microsoft.com/office/drawing/2014/main" id="{D7B5B938-3ED4-4381-81EC-D26D6C4BA4A2}"/>
+                  <a16:creationId xmlns:a16="http://schemas.microsoft.com/office/drawing/2014/main" xmlns="" id="{D7B5B938-3ED4-4381-81EC-D26D6C4BA4A2}"/>
                 </a:ext>
               </a:extLst>
             </p:cNvPr>
@@ -13937,10 +12705,10 @@
       </p:grpSp>
       <p:grpSp>
         <p:nvGrpSpPr>
-          <p:cNvPr id="17" name="Agrupar 16">
-            <a:extLst>
-              <a:ext uri="{FF2B5EF4-FFF2-40B4-BE49-F238E27FC236}">
-                <a16:creationId xmlns:a16="http://schemas.microsoft.com/office/drawing/2014/main" id="{EADF30C8-EACE-4375-9138-57A49B3FCE14}"/>
+          <p:cNvPr id="41" name="Agrupar 40">
+            <a:extLst>
+              <a:ext uri="{FF2B5EF4-FFF2-40B4-BE49-F238E27FC236}">
+                <a16:creationId xmlns:a16="http://schemas.microsoft.com/office/drawing/2014/main" xmlns="" id="{CE589A6F-0BF7-4F13-8115-B627981BEA60}"/>
               </a:ext>
             </a:extLst>
           </p:cNvPr>
@@ -13949,18 +12717,18 @@
         </p:nvGrpSpPr>
         <p:grpSpPr>
           <a:xfrm>
-            <a:off x="2501959" y="4358497"/>
-            <a:ext cx="2728823" cy="1518121"/>
-            <a:chOff x="2336859" y="3863197"/>
-            <a:chExt cx="2728823" cy="1518121"/>
+            <a:off x="6774611" y="4190281"/>
+            <a:ext cx="2819940" cy="1762663"/>
+            <a:chOff x="6774611" y="3618781"/>
+            <a:chExt cx="2819940" cy="1762663"/>
           </a:xfrm>
         </p:grpSpPr>
         <p:sp>
           <p:nvSpPr>
-            <p:cNvPr id="29" name="CaixaDeTexto 28">
+            <p:cNvPr id="28" name="CaixaDeTexto 27">
               <a:extLst>
                 <a:ext uri="{FF2B5EF4-FFF2-40B4-BE49-F238E27FC236}">
-                  <a16:creationId xmlns:a16="http://schemas.microsoft.com/office/drawing/2014/main" id="{C9E5DC63-D53D-44B6-BB67-180826BCDCA2}"/>
+                  <a16:creationId xmlns:a16="http://schemas.microsoft.com/office/drawing/2014/main" xmlns="" id="{06F24E56-56C0-48DE-B993-B1CF84033F10}"/>
                 </a:ext>
               </a:extLst>
             </p:cNvPr>
@@ -13969,7 +12737,7 @@
           </p:nvSpPr>
           <p:spPr>
             <a:xfrm>
-              <a:off x="2336859" y="3903990"/>
+              <a:off x="6865728" y="3688330"/>
               <a:ext cx="2728823" cy="1477328"/>
             </a:xfrm>
             <a:prstGeom prst="rect">
@@ -13990,23 +12758,12 @@
                 <a:buChar char="•"/>
               </a:pPr>
               <a:r>
-                <a:rPr lang="pt-BR" b="1" i="1" dirty="0">
+                <a:rPr lang="pt-BR" b="1" i="1" dirty="0" smtClean="0">
                   <a:cs typeface="Calibri"/>
                 </a:rPr>
-                <a:t>Receber</a:t>
+                <a:t>Verificar inadimplência</a:t>
               </a:r>
-              <a:r>
-                <a:rPr lang="pt-BR" b="1" i="1" u="sng" dirty="0">
-                  <a:cs typeface="Calibri"/>
-                </a:rPr>
-                <a:t> </a:t>
-              </a:r>
-              <a:r>
-                <a:rPr lang="pt-BR" b="1" i="1" dirty="0">
-                  <a:cs typeface="Calibri"/>
-                </a:rPr>
-                <a:t>notificações</a:t>
-              </a:r>
+              <a:endParaRPr lang="pt-BR" dirty="0" smtClean="0"/>
             </a:p>
             <a:p>
               <a:pPr marL="285750" indent="-285750">
@@ -14014,153 +12771,7 @@
                 <a:buChar char="•"/>
               </a:pPr>
               <a:r>
-                <a:rPr lang="pt-BR" b="1" i="1" dirty="0">
-                  <a:cs typeface="Calibri"/>
-                </a:rPr>
-                <a:t>Comparecer a unidade em eventualidades</a:t>
-              </a:r>
-            </a:p>
-            <a:p>
-              <a:pPr marL="285750" indent="-285750">
-                <a:buFont typeface="Arial"/>
-                <a:buChar char="•"/>
-              </a:pPr>
-              <a:r>
-                <a:rPr lang="pt-BR" b="1" i="1" dirty="0">
-                  <a:cs typeface="Calibri"/>
-                </a:rPr>
-                <a:t>Efetuar pagamentos</a:t>
-              </a:r>
-            </a:p>
-            <a:p>
-              <a:endParaRPr lang="pt-BR" b="1" i="1" u="sng" dirty="0">
-                <a:cs typeface="Calibri"/>
-              </a:endParaRPr>
-            </a:p>
-          </p:txBody>
-        </p:sp>
-        <p:sp>
-          <p:nvSpPr>
-            <p:cNvPr id="31" name="Retângulo 30">
-              <a:extLst>
-                <a:ext uri="{FF2B5EF4-FFF2-40B4-BE49-F238E27FC236}">
-                  <a16:creationId xmlns:a16="http://schemas.microsoft.com/office/drawing/2014/main" id="{2C8A8C53-733F-44F9-98EE-F32AD20E2C47}"/>
-                </a:ext>
-              </a:extLst>
-            </p:cNvPr>
-            <p:cNvSpPr/>
-            <p:nvPr/>
-          </p:nvSpPr>
-          <p:spPr>
-            <a:xfrm>
-              <a:off x="2346385" y="3863197"/>
-              <a:ext cx="2711569" cy="1345720"/>
-            </a:xfrm>
-            <a:prstGeom prst="rect">
-              <a:avLst/>
-            </a:prstGeom>
-            <a:noFill/>
-            <a:ln>
-              <a:solidFill>
-                <a:schemeClr val="tx1"/>
-              </a:solidFill>
-            </a:ln>
-          </p:spPr>
-          <p:style>
-            <a:lnRef idx="2">
-              <a:schemeClr val="accent1">
-                <a:shade val="50000"/>
-              </a:schemeClr>
-            </a:lnRef>
-            <a:fillRef idx="1">
-              <a:schemeClr val="accent1"/>
-            </a:fillRef>
-            <a:effectRef idx="0">
-              <a:schemeClr val="accent1"/>
-            </a:effectRef>
-            <a:fontRef idx="minor">
-              <a:schemeClr val="lt1"/>
-            </a:fontRef>
-          </p:style>
-          <p:txBody>
-            <a:bodyPr rtlCol="0" anchor="ctr"/>
-            <a:lstStyle/>
-            <a:p>
-              <a:pPr algn="ctr"/>
-              <a:endParaRPr lang="pt-BR"/>
-            </a:p>
-          </p:txBody>
-        </p:sp>
-      </p:grpSp>
-      <p:grpSp>
-        <p:nvGrpSpPr>
-          <p:cNvPr id="41" name="Agrupar 40">
-            <a:extLst>
-              <a:ext uri="{FF2B5EF4-FFF2-40B4-BE49-F238E27FC236}">
-                <a16:creationId xmlns:a16="http://schemas.microsoft.com/office/drawing/2014/main" id="{CE589A6F-0BF7-4F13-8115-B627981BEA60}"/>
-              </a:ext>
-            </a:extLst>
-          </p:cNvPr>
-          <p:cNvGrpSpPr/>
-          <p:nvPr/>
-        </p:nvGrpSpPr>
-        <p:grpSpPr>
-          <a:xfrm>
-            <a:off x="6774611" y="4190281"/>
-            <a:ext cx="2819940" cy="2100874"/>
-            <a:chOff x="6774611" y="3618781"/>
-            <a:chExt cx="2819940" cy="2100874"/>
-          </a:xfrm>
-        </p:grpSpPr>
-        <p:sp>
-          <p:nvSpPr>
-            <p:cNvPr id="28" name="CaixaDeTexto 27">
-              <a:extLst>
-                <a:ext uri="{FF2B5EF4-FFF2-40B4-BE49-F238E27FC236}">
-                  <a16:creationId xmlns:a16="http://schemas.microsoft.com/office/drawing/2014/main" id="{06F24E56-56C0-48DE-B993-B1CF84033F10}"/>
-                </a:ext>
-              </a:extLst>
-            </p:cNvPr>
-            <p:cNvSpPr txBox="1"/>
-            <p:nvPr/>
-          </p:nvSpPr>
-          <p:spPr>
-            <a:xfrm>
-              <a:off x="6865728" y="3688330"/>
-              <a:ext cx="2728823" cy="2031325"/>
-            </a:xfrm>
-            <a:prstGeom prst="rect">
-              <a:avLst/>
-            </a:prstGeom>
-          </p:spPr>
-          <p:txBody>
-            <a:bodyPr rot="0" spcFirstLastPara="0" vertOverflow="overflow" horzOverflow="overflow" vert="horz" wrap="square" lIns="91440" tIns="45720" rIns="91440" bIns="45720" numCol="1" spcCol="0" rtlCol="0" fromWordArt="0" anchor="t" anchorCtr="0" forceAA="0" compatLnSpc="1">
-              <a:prstTxWarp prst="textNoShape">
-                <a:avLst/>
-              </a:prstTxWarp>
-              <a:spAutoFit/>
-            </a:bodyPr>
-            <a:lstStyle/>
-            <a:p>
-              <a:pPr marL="285750" indent="-285750">
-                <a:buFont typeface="Arial"/>
-                <a:buChar char="•"/>
-              </a:pPr>
-              <a:r>
-                <a:rPr lang="pt-BR" b="1" i="1" dirty="0">
-                  <a:cs typeface="Calibri"/>
-                </a:rPr>
-                <a:t>Verificar se pagamentos estão em dias</a:t>
-              </a:r>
-              <a:endParaRPr lang="pt-BR" dirty="0"/>
-            </a:p>
-            <a:p>
-              <a:pPr marL="285750" indent="-285750">
-                <a:buFont typeface="Arial"/>
-                <a:buChar char="•"/>
-              </a:pPr>
-              <a:r>
-                <a:rPr lang="pt-BR" b="1" i="1" dirty="0">
+                <a:rPr lang="pt-BR" b="1" i="1" dirty="0" smtClean="0">
                   <a:cs typeface="Calibri"/>
                 </a:rPr>
                 <a:t>Notificar eventualidades para aluno ou responsável</a:t>
@@ -14182,7 +12793,7 @@
             <p:cNvPr id="33" name="Retângulo 32">
               <a:extLst>
                 <a:ext uri="{FF2B5EF4-FFF2-40B4-BE49-F238E27FC236}">
-                  <a16:creationId xmlns:a16="http://schemas.microsoft.com/office/drawing/2014/main" id="{F00C5CCF-AC25-4099-8DD3-8B36FCAF56E7}"/>
+                  <a16:creationId xmlns:a16="http://schemas.microsoft.com/office/drawing/2014/main" xmlns="" id="{F00C5CCF-AC25-4099-8DD3-8B36FCAF56E7}"/>
                 </a:ext>
               </a:extLst>
             </p:cNvPr>
@@ -14235,7 +12846,7 @@
           <p:cNvPr id="51" name="Agrupar 50">
             <a:extLst>
               <a:ext uri="{FF2B5EF4-FFF2-40B4-BE49-F238E27FC236}">
-                <a16:creationId xmlns:a16="http://schemas.microsoft.com/office/drawing/2014/main" id="{283F123E-DE00-45B4-8DF4-7F224AED295D}"/>
+                <a16:creationId xmlns:a16="http://schemas.microsoft.com/office/drawing/2014/main" xmlns="" id="{283F123E-DE00-45B4-8DF4-7F224AED295D}"/>
               </a:ext>
             </a:extLst>
           </p:cNvPr>
@@ -14255,7 +12866,7 @@
             <p:cNvPr id="34" name="CaixaDeTexto 33">
               <a:extLst>
                 <a:ext uri="{FF2B5EF4-FFF2-40B4-BE49-F238E27FC236}">
-                  <a16:creationId xmlns:a16="http://schemas.microsoft.com/office/drawing/2014/main" id="{5D39F44F-4BB8-42ED-B09A-9657764491D5}"/>
+                  <a16:creationId xmlns:a16="http://schemas.microsoft.com/office/drawing/2014/main" xmlns="" id="{5D39F44F-4BB8-42ED-B09A-9657764491D5}"/>
                 </a:ext>
               </a:extLst>
             </p:cNvPr>
@@ -14297,7 +12908,7 @@
             <p:cNvPr id="35" name="Imagem 6" descr="Uma imagem contendo objeto&#10;&#10;Descrição gerada com muito alta confiança">
               <a:extLst>
                 <a:ext uri="{FF2B5EF4-FFF2-40B4-BE49-F238E27FC236}">
-                  <a16:creationId xmlns:a16="http://schemas.microsoft.com/office/drawing/2014/main" id="{E44324F1-C6C9-4A4B-9667-7D21BF66D74C}"/>
+                  <a16:creationId xmlns:a16="http://schemas.microsoft.com/office/drawing/2014/main" xmlns="" id="{E44324F1-C6C9-4A4B-9667-7D21BF66D74C}"/>
                 </a:ext>
               </a:extLst>
             </p:cNvPr>
@@ -14328,7 +12939,7 @@
           <p:cNvPr id="37" name="Conector de Seta Reta 36">
             <a:extLst>
               <a:ext uri="{FF2B5EF4-FFF2-40B4-BE49-F238E27FC236}">
-                <a16:creationId xmlns:a16="http://schemas.microsoft.com/office/drawing/2014/main" id="{99C24CD1-FABB-4DD9-A9FD-41AD181EE8C7}"/>
+                <a16:creationId xmlns:a16="http://schemas.microsoft.com/office/drawing/2014/main" xmlns="" id="{99C24CD1-FABB-4DD9-A9FD-41AD181EE8C7}"/>
               </a:ext>
             </a:extLst>
           </p:cNvPr>
@@ -14372,7 +12983,7 @@
           <p:cNvPr id="39" name="Agrupar 38">
             <a:extLst>
               <a:ext uri="{FF2B5EF4-FFF2-40B4-BE49-F238E27FC236}">
-                <a16:creationId xmlns:a16="http://schemas.microsoft.com/office/drawing/2014/main" id="{A3441A96-A4E4-4F25-BD39-743E94E79917}"/>
+                <a16:creationId xmlns:a16="http://schemas.microsoft.com/office/drawing/2014/main" xmlns="" id="{A3441A96-A4E4-4F25-BD39-743E94E79917}"/>
               </a:ext>
             </a:extLst>
           </p:cNvPr>
@@ -14392,7 +13003,7 @@
             <p:cNvPr id="38" name="Retângulo 37">
               <a:extLst>
                 <a:ext uri="{FF2B5EF4-FFF2-40B4-BE49-F238E27FC236}">
-                  <a16:creationId xmlns:a16="http://schemas.microsoft.com/office/drawing/2014/main" id="{ADEABFF6-5823-4443-A6BF-973E9448ED9B}"/>
+                  <a16:creationId xmlns:a16="http://schemas.microsoft.com/office/drawing/2014/main" xmlns="" id="{ADEABFF6-5823-4443-A6BF-973E9448ED9B}"/>
                 </a:ext>
               </a:extLst>
             </p:cNvPr>
@@ -14444,7 +13055,7 @@
             <p:cNvPr id="40" name="CaixaDeTexto 39">
               <a:extLst>
                 <a:ext uri="{FF2B5EF4-FFF2-40B4-BE49-F238E27FC236}">
-                  <a16:creationId xmlns:a16="http://schemas.microsoft.com/office/drawing/2014/main" id="{850C7818-A02E-4E81-8BD6-424EFA441C21}"/>
+                  <a16:creationId xmlns:a16="http://schemas.microsoft.com/office/drawing/2014/main" xmlns="" id="{850C7818-A02E-4E81-8BD6-424EFA441C21}"/>
                 </a:ext>
               </a:extLst>
             </p:cNvPr>
@@ -14491,7 +13102,7 @@
           <p:cNvPr id="60" name="Conector de Seta Reta 59">
             <a:extLst>
               <a:ext uri="{FF2B5EF4-FFF2-40B4-BE49-F238E27FC236}">
-                <a16:creationId xmlns:a16="http://schemas.microsoft.com/office/drawing/2014/main" id="{A0A811B6-4F10-4ACC-BAFD-38F039227B28}"/>
+                <a16:creationId xmlns:a16="http://schemas.microsoft.com/office/drawing/2014/main" xmlns="" id="{A0A811B6-4F10-4ACC-BAFD-38F039227B28}"/>
               </a:ext>
             </a:extLst>
           </p:cNvPr>
@@ -14535,7 +13146,7 @@
           <p:cNvPr id="61" name="Conector de Seta Reta 60">
             <a:extLst>
               <a:ext uri="{FF2B5EF4-FFF2-40B4-BE49-F238E27FC236}">
-                <a16:creationId xmlns:a16="http://schemas.microsoft.com/office/drawing/2014/main" id="{42ABDC8F-7BC1-4EBD-806F-E95C8F0FA29D}"/>
+                <a16:creationId xmlns:a16="http://schemas.microsoft.com/office/drawing/2014/main" xmlns="" id="{42ABDC8F-7BC1-4EBD-806F-E95C8F0FA29D}"/>
               </a:ext>
             </a:extLst>
           </p:cNvPr>
@@ -14609,7 +13220,7 @@
           <p:cNvPr id="4" name="Retângulo 3">
             <a:extLst>
               <a:ext uri="{FF2B5EF4-FFF2-40B4-BE49-F238E27FC236}">
-                <a16:creationId xmlns:a16="http://schemas.microsoft.com/office/drawing/2014/main" id="{88C6BF1B-8B81-4A42-B266-9DF3168EF8CB}"/>
+                <a16:creationId xmlns:a16="http://schemas.microsoft.com/office/drawing/2014/main" xmlns="" id="{88C6BF1B-8B81-4A42-B266-9DF3168EF8CB}"/>
               </a:ext>
             </a:extLst>
           </p:cNvPr>
@@ -14663,7 +13274,7 @@
           <p:cNvPr id="6" name="CaixaDeTexto 5">
             <a:extLst>
               <a:ext uri="{FF2B5EF4-FFF2-40B4-BE49-F238E27FC236}">
-                <a16:creationId xmlns:a16="http://schemas.microsoft.com/office/drawing/2014/main" id="{1270056D-C445-482D-9C8C-EC4698A09D63}"/>
+                <a16:creationId xmlns:a16="http://schemas.microsoft.com/office/drawing/2014/main" xmlns="" id="{1270056D-C445-482D-9C8C-EC4698A09D63}"/>
               </a:ext>
             </a:extLst>
           </p:cNvPr>
@@ -14693,7 +13304,13 @@
               <a:rPr lang="pt-BR" sz="3200" b="1" i="1" u="sng" dirty="0">
                 <a:cs typeface="Calibri"/>
               </a:rPr>
-              <a:t>Cenário : Tornar-se professor</a:t>
+              <a:t>Cenário : </a:t>
+            </a:r>
+            <a:r>
+              <a:rPr lang="pt-BR" sz="3200" b="1" i="1" u="sng" dirty="0" smtClean="0">
+                <a:cs typeface="Calibri"/>
+              </a:rPr>
+              <a:t>Tornar-se Colaborador</a:t>
             </a:r>
             <a:endParaRPr lang="pt-BR" dirty="0"/>
           </a:p>
@@ -14704,7 +13321,7 @@
           <p:cNvPr id="2" name="Retângulo 1">
             <a:extLst>
               <a:ext uri="{FF2B5EF4-FFF2-40B4-BE49-F238E27FC236}">
-                <a16:creationId xmlns:a16="http://schemas.microsoft.com/office/drawing/2014/main" id="{12043949-80F2-4BA4-ACCA-8E1E73200266}"/>
+                <a16:creationId xmlns:a16="http://schemas.microsoft.com/office/drawing/2014/main" xmlns="" id="{12043949-80F2-4BA4-ACCA-8E1E73200266}"/>
               </a:ext>
             </a:extLst>
           </p:cNvPr>
@@ -14753,7 +13370,7 @@
           <p:cNvPr id="9" name="Conector de Seta Reta 8">
             <a:extLst>
               <a:ext uri="{FF2B5EF4-FFF2-40B4-BE49-F238E27FC236}">
-                <a16:creationId xmlns:a16="http://schemas.microsoft.com/office/drawing/2014/main" id="{BA601A5E-E9FD-4E49-A21A-E1D9795909C3}"/>
+                <a16:creationId xmlns:a16="http://schemas.microsoft.com/office/drawing/2014/main" xmlns="" id="{BA601A5E-E9FD-4E49-A21A-E1D9795909C3}"/>
               </a:ext>
             </a:extLst>
           </p:cNvPr>
@@ -14795,7 +13412,7 @@
           <p:cNvPr id="5" name="Agrupar 4">
             <a:extLst>
               <a:ext uri="{FF2B5EF4-FFF2-40B4-BE49-F238E27FC236}">
-                <a16:creationId xmlns:a16="http://schemas.microsoft.com/office/drawing/2014/main" id="{E6673161-0C4F-48B5-8E89-7B48BFDA7916}"/>
+                <a16:creationId xmlns:a16="http://schemas.microsoft.com/office/drawing/2014/main" xmlns="" id="{E6673161-0C4F-48B5-8E89-7B48BFDA7916}"/>
               </a:ext>
             </a:extLst>
           </p:cNvPr>
@@ -14815,7 +13432,7 @@
             <p:cNvPr id="3" name="Imagem 6" descr="Uma imagem contendo objeto&#10;&#10;Descrição gerada com muito alta confiança">
               <a:extLst>
                 <a:ext uri="{FF2B5EF4-FFF2-40B4-BE49-F238E27FC236}">
-                  <a16:creationId xmlns:a16="http://schemas.microsoft.com/office/drawing/2014/main" id="{BBEA9159-6E91-4172-99DF-56517BBFE5AC}"/>
+                  <a16:creationId xmlns:a16="http://schemas.microsoft.com/office/drawing/2014/main" xmlns="" id="{BBEA9159-6E91-4172-99DF-56517BBFE5AC}"/>
                 </a:ext>
               </a:extLst>
             </p:cNvPr>
@@ -14845,7 +13462,7 @@
             <p:cNvPr id="11" name="CaixaDeTexto 10">
               <a:extLst>
                 <a:ext uri="{FF2B5EF4-FFF2-40B4-BE49-F238E27FC236}">
-                  <a16:creationId xmlns:a16="http://schemas.microsoft.com/office/drawing/2014/main" id="{2B365FA8-96A9-46EF-82C1-1F0ACEB6382C}"/>
+                  <a16:creationId xmlns:a16="http://schemas.microsoft.com/office/drawing/2014/main" xmlns="" id="{2B365FA8-96A9-46EF-82C1-1F0ACEB6382C}"/>
                 </a:ext>
               </a:extLst>
             </p:cNvPr>
@@ -14871,9 +13488,10 @@
             <a:lstStyle/>
             <a:p>
               <a:r>
-                <a:rPr lang="pt-BR" sz="2400" b="1" i="1" dirty="0"/>
-                <a:t>colaborador </a:t>
+                <a:rPr lang="pt-BR" sz="2400" b="1" i="1" dirty="0" smtClean="0"/>
+                <a:t>Voluntario</a:t>
               </a:r>
+              <a:endParaRPr lang="pt-BR" sz="2400" b="1" i="1" dirty="0"/>
             </a:p>
           </p:txBody>
         </p:sp>
@@ -14883,7 +13501,7 @@
           <p:cNvPr id="15" name="CaixaDeTexto 14">
             <a:extLst>
               <a:ext uri="{FF2B5EF4-FFF2-40B4-BE49-F238E27FC236}">
-                <a16:creationId xmlns:a16="http://schemas.microsoft.com/office/drawing/2014/main" id="{589ED39B-DB76-4792-9198-978C3E9B327E}"/>
+                <a16:creationId xmlns:a16="http://schemas.microsoft.com/office/drawing/2014/main" xmlns="" id="{589ED39B-DB76-4792-9198-978C3E9B327E}"/>
               </a:ext>
             </a:extLst>
           </p:cNvPr>
@@ -14923,7 +13541,7 @@
           <p:cNvPr id="17" name="Retângulo 16">
             <a:extLst>
               <a:ext uri="{FF2B5EF4-FFF2-40B4-BE49-F238E27FC236}">
-                <a16:creationId xmlns:a16="http://schemas.microsoft.com/office/drawing/2014/main" id="{AAE3C69C-201D-4C86-AAF7-B3DC70259B1F}"/>
+                <a16:creationId xmlns:a16="http://schemas.microsoft.com/office/drawing/2014/main" xmlns="" id="{AAE3C69C-201D-4C86-AAF7-B3DC70259B1F}"/>
               </a:ext>
             </a:extLst>
           </p:cNvPr>
@@ -14972,7 +13590,7 @@
           <p:cNvPr id="20" name="CaixaDeTexto 19">
             <a:extLst>
               <a:ext uri="{FF2B5EF4-FFF2-40B4-BE49-F238E27FC236}">
-                <a16:creationId xmlns:a16="http://schemas.microsoft.com/office/drawing/2014/main" id="{9EF114C1-C8CF-409C-847E-943F96FE0F0F}"/>
+                <a16:creationId xmlns:a16="http://schemas.microsoft.com/office/drawing/2014/main" xmlns="" id="{9EF114C1-C8CF-409C-847E-943F96FE0F0F}"/>
               </a:ext>
             </a:extLst>
           </p:cNvPr>
@@ -14981,8 +13599,8 @@
         </p:nvSpPr>
         <p:spPr>
           <a:xfrm>
-            <a:off x="4735183" y="2607334"/>
-            <a:ext cx="1650521" cy="461665"/>
+            <a:off x="4383361" y="2574728"/>
+            <a:ext cx="2234600" cy="461665"/>
           </a:xfrm>
           <a:prstGeom prst="rect">
             <a:avLst/>
@@ -14998,10 +13616,16 @@
           <a:lstStyle/>
           <a:p>
             <a:r>
+              <a:rPr lang="pt-BR" sz="2400" b="1" i="1" dirty="0" smtClean="0">
+                <a:cs typeface="Calibri"/>
+              </a:rPr>
+              <a:t>Administração</a:t>
+            </a:r>
+            <a:r>
               <a:rPr lang="pt-BR" sz="2400" b="1" i="1" dirty="0">
                 <a:cs typeface="Calibri"/>
               </a:rPr>
-              <a:t>Função </a:t>
+              <a:t> </a:t>
             </a:r>
           </a:p>
         </p:txBody>
@@ -15011,7 +13635,7 @@
           <p:cNvPr id="22" name="Conector de Seta Reta 21">
             <a:extLst>
               <a:ext uri="{FF2B5EF4-FFF2-40B4-BE49-F238E27FC236}">
-                <a16:creationId xmlns:a16="http://schemas.microsoft.com/office/drawing/2014/main" id="{6005A5E0-EFE8-4E81-9A9B-EC939F301038}"/>
+                <a16:creationId xmlns:a16="http://schemas.microsoft.com/office/drawing/2014/main" xmlns="" id="{6005A5E0-EFE8-4E81-9A9B-EC939F301038}"/>
               </a:ext>
             </a:extLst>
           </p:cNvPr>
@@ -15085,7 +13709,7 @@
           <p:cNvPr id="7" name="CaixaDeTexto 6">
             <a:extLst>
               <a:ext uri="{FF2B5EF4-FFF2-40B4-BE49-F238E27FC236}">
-                <a16:creationId xmlns:a16="http://schemas.microsoft.com/office/drawing/2014/main" id="{BF0B844E-C924-4EC3-B27F-D0C0220E391A}"/>
+                <a16:creationId xmlns:a16="http://schemas.microsoft.com/office/drawing/2014/main" xmlns="" id="{BF0B844E-C924-4EC3-B27F-D0C0220E391A}"/>
               </a:ext>
             </a:extLst>
           </p:cNvPr>
@@ -15124,7 +13748,7 @@
           <p:cNvPr id="22" name="Agrupar 21">
             <a:extLst>
               <a:ext uri="{FF2B5EF4-FFF2-40B4-BE49-F238E27FC236}">
-                <a16:creationId xmlns:a16="http://schemas.microsoft.com/office/drawing/2014/main" id="{6DCBA173-E66C-403F-8F53-8A3DF7EFD734}"/>
+                <a16:creationId xmlns:a16="http://schemas.microsoft.com/office/drawing/2014/main" xmlns="" id="{6DCBA173-E66C-403F-8F53-8A3DF7EFD734}"/>
               </a:ext>
             </a:extLst>
           </p:cNvPr>
@@ -15133,9 +13757,9 @@
         </p:nvGrpSpPr>
         <p:grpSpPr>
           <a:xfrm>
-            <a:off x="97769" y="143774"/>
+            <a:off x="105463" y="149386"/>
             <a:ext cx="11969686" cy="6570451"/>
-            <a:chOff x="97769" y="143774"/>
+            <a:chOff x="97769" y="62889"/>
             <a:chExt cx="11969686" cy="6570451"/>
           </a:xfrm>
         </p:grpSpPr>
@@ -15144,7 +13768,7 @@
             <p:cNvPr id="4" name="Retângulo 3">
               <a:extLst>
                 <a:ext uri="{FF2B5EF4-FFF2-40B4-BE49-F238E27FC236}">
-                  <a16:creationId xmlns:a16="http://schemas.microsoft.com/office/drawing/2014/main" id="{88C6BF1B-8B81-4A42-B266-9DF3168EF8CB}"/>
+                  <a16:creationId xmlns:a16="http://schemas.microsoft.com/office/drawing/2014/main" xmlns="" id="{88C6BF1B-8B81-4A42-B266-9DF3168EF8CB}"/>
                 </a:ext>
               </a:extLst>
             </p:cNvPr>
@@ -15153,7 +13777,7 @@
           </p:nvSpPr>
           <p:spPr>
             <a:xfrm>
-              <a:off x="97769" y="143774"/>
+              <a:off x="97769" y="62889"/>
               <a:ext cx="11904450" cy="6570451"/>
             </a:xfrm>
             <a:prstGeom prst="rect">
@@ -15198,7 +13822,7 @@
             <p:cNvPr id="2" name="CaixaDeTexto 1">
               <a:extLst>
                 <a:ext uri="{FF2B5EF4-FFF2-40B4-BE49-F238E27FC236}">
-                  <a16:creationId xmlns:a16="http://schemas.microsoft.com/office/drawing/2014/main" id="{80F5CD5A-1914-4EF1-BE32-34B089486C2F}"/>
+                  <a16:creationId xmlns:a16="http://schemas.microsoft.com/office/drawing/2014/main" xmlns="" id="{80F5CD5A-1914-4EF1-BE32-34B089486C2F}"/>
                 </a:ext>
               </a:extLst>
             </p:cNvPr>
@@ -15228,7 +13852,19 @@
                 <a:rPr lang="pt-BR" sz="3200" b="1" i="1" u="sng" dirty="0">
                   <a:cs typeface="Calibri"/>
                 </a:rPr>
-                <a:t>Cenário : Tornar-se professor </a:t>
+                <a:t>Cenário : Tornar-se </a:t>
+              </a:r>
+              <a:r>
+                <a:rPr lang="pt-BR" sz="3200" b="1" i="1" u="sng" dirty="0" smtClean="0">
+                  <a:cs typeface="Calibri"/>
+                </a:rPr>
+                <a:t>Colaborador</a:t>
+              </a:r>
+              <a:r>
+                <a:rPr lang="pt-BR" sz="3200" b="1" i="1" u="sng" dirty="0">
+                  <a:cs typeface="Calibri"/>
+                </a:rPr>
+                <a:t> </a:t>
               </a:r>
               <a:endParaRPr lang="pt-BR" dirty="0"/>
             </a:p>
@@ -15239,7 +13875,7 @@
             <p:cNvPr id="5" name="Conector de Seta Reta 4">
               <a:extLst>
                 <a:ext uri="{FF2B5EF4-FFF2-40B4-BE49-F238E27FC236}">
-                  <a16:creationId xmlns:a16="http://schemas.microsoft.com/office/drawing/2014/main" id="{85E6B2C7-D043-4C92-898F-4F2DEE8A2690}"/>
+                  <a16:creationId xmlns:a16="http://schemas.microsoft.com/office/drawing/2014/main" xmlns="" id="{85E6B2C7-D043-4C92-898F-4F2DEE8A2690}"/>
                 </a:ext>
               </a:extLst>
             </p:cNvPr>
@@ -15282,7 +13918,7 @@
             <p:cNvPr id="6" name="Conector de Seta Reta 5">
               <a:extLst>
                 <a:ext uri="{FF2B5EF4-FFF2-40B4-BE49-F238E27FC236}">
-                  <a16:creationId xmlns:a16="http://schemas.microsoft.com/office/drawing/2014/main" id="{9BACC1B6-2F2A-4248-B083-17CB87D6E5BE}"/>
+                  <a16:creationId xmlns:a16="http://schemas.microsoft.com/office/drawing/2014/main" xmlns="" id="{9BACC1B6-2F2A-4248-B083-17CB87D6E5BE}"/>
                 </a:ext>
               </a:extLst>
             </p:cNvPr>
@@ -15325,7 +13961,7 @@
             <p:cNvPr id="8" name="Retângulo 7">
               <a:extLst>
                 <a:ext uri="{FF2B5EF4-FFF2-40B4-BE49-F238E27FC236}">
-                  <a16:creationId xmlns:a16="http://schemas.microsoft.com/office/drawing/2014/main" id="{5941647A-72D6-4138-BD44-C48D31273AB1}"/>
+                  <a16:creationId xmlns:a16="http://schemas.microsoft.com/office/drawing/2014/main" xmlns="" id="{5941647A-72D6-4138-BD44-C48D31273AB1}"/>
                 </a:ext>
               </a:extLst>
             </p:cNvPr>
@@ -15334,8 +13970,8 @@
           </p:nvSpPr>
           <p:spPr>
             <a:xfrm>
-              <a:off x="7506059" y="1474757"/>
-              <a:ext cx="2041583" cy="1207696"/>
+              <a:off x="7348715" y="1474757"/>
+              <a:ext cx="2511365" cy="1029934"/>
             </a:xfrm>
             <a:prstGeom prst="rect">
               <a:avLst/>
@@ -15379,7 +14015,7 @@
             <p:cNvPr id="9" name="CaixaDeTexto 1">
               <a:extLst>
                 <a:ext uri="{FF2B5EF4-FFF2-40B4-BE49-F238E27FC236}">
-                  <a16:creationId xmlns:a16="http://schemas.microsoft.com/office/drawing/2014/main" id="{7994EBAF-0D7D-41FB-B228-383D0E67FB6C}"/>
+                  <a16:creationId xmlns:a16="http://schemas.microsoft.com/office/drawing/2014/main" xmlns="" id="{7994EBAF-0D7D-41FB-B228-383D0E67FB6C}"/>
                 </a:ext>
               </a:extLst>
             </p:cNvPr>
@@ -15388,8 +14024,8 @@
           </p:nvSpPr>
           <p:spPr>
             <a:xfrm>
-              <a:off x="7915274" y="1792367"/>
-              <a:ext cx="1664899" cy="523220"/>
+              <a:off x="7413951" y="1762310"/>
+              <a:ext cx="2446129" cy="523220"/>
             </a:xfrm>
             <a:prstGeom prst="rect">
               <a:avLst/>
@@ -15499,10 +14135,16 @@
             </a:lstStyle>
             <a:p>
               <a:r>
+                <a:rPr lang="pt-BR" sz="2800" b="1" i="1" dirty="0" smtClean="0">
+                  <a:cs typeface="Calibri"/>
+                </a:rPr>
+                <a:t>Administração</a:t>
+              </a:r>
+              <a:r>
                 <a:rPr lang="pt-BR" sz="2800" b="1" i="1" dirty="0">
                   <a:cs typeface="Calibri"/>
                 </a:rPr>
-                <a:t>Função </a:t>
+                <a:t> </a:t>
               </a:r>
             </a:p>
           </p:txBody>
@@ -15512,7 +14154,7 @@
             <p:cNvPr id="10" name="Agrupar 9">
               <a:extLst>
                 <a:ext uri="{FF2B5EF4-FFF2-40B4-BE49-F238E27FC236}">
-                  <a16:creationId xmlns:a16="http://schemas.microsoft.com/office/drawing/2014/main" id="{824586A1-E2A3-4B25-8F44-2AB0D73E8B07}"/>
+                  <a16:creationId xmlns:a16="http://schemas.microsoft.com/office/drawing/2014/main" xmlns="" id="{824586A1-E2A3-4B25-8F44-2AB0D73E8B07}"/>
                 </a:ext>
               </a:extLst>
             </p:cNvPr>
@@ -15532,7 +14174,7 @@
               <p:cNvPr id="13" name="Imagem 6" descr="Uma imagem contendo objeto&#10;&#10;Descrição gerada com muito alta confiança">
                 <a:extLst>
                   <a:ext uri="{FF2B5EF4-FFF2-40B4-BE49-F238E27FC236}">
-                    <a16:creationId xmlns:a16="http://schemas.microsoft.com/office/drawing/2014/main" id="{63824687-0B05-4413-8D3C-5E29C9702638}"/>
+                    <a16:creationId xmlns:a16="http://schemas.microsoft.com/office/drawing/2014/main" xmlns="" id="{63824687-0B05-4413-8D3C-5E29C9702638}"/>
                   </a:ext>
                 </a:extLst>
               </p:cNvPr>
@@ -15562,7 +14204,7 @@
               <p:cNvPr id="16" name="CaixaDeTexto 15">
                 <a:extLst>
                   <a:ext uri="{FF2B5EF4-FFF2-40B4-BE49-F238E27FC236}">
-                    <a16:creationId xmlns:a16="http://schemas.microsoft.com/office/drawing/2014/main" id="{FDA29973-2090-478C-8CFB-2DD1F5F78F5A}"/>
+                    <a16:creationId xmlns:a16="http://schemas.microsoft.com/office/drawing/2014/main" xmlns="" id="{FDA29973-2090-478C-8CFB-2DD1F5F78F5A}"/>
                   </a:ext>
                 </a:extLst>
               </p:cNvPr>
@@ -15588,10 +14230,16 @@
               <a:lstStyle/>
               <a:p>
                 <a:r>
+                  <a:rPr lang="pt-BR" sz="2400" b="1" i="1" dirty="0" smtClean="0">
+                    <a:cs typeface="Calibri"/>
+                  </a:rPr>
+                  <a:t>Voluntario</a:t>
+                </a:r>
+                <a:r>
                   <a:rPr lang="pt-BR" sz="2400" b="1" i="1" dirty="0">
                     <a:cs typeface="Calibri"/>
                   </a:rPr>
-                  <a:t>Colaborador </a:t>
+                  <a:t> </a:t>
                 </a:r>
                 <a:endParaRPr lang="pt-BR" sz="2400" b="1" i="1" dirty="0"/>
               </a:p>
@@ -15603,7 +14251,7 @@
             <p:cNvPr id="19" name="Conector de Seta Reta 18">
               <a:extLst>
                 <a:ext uri="{FF2B5EF4-FFF2-40B4-BE49-F238E27FC236}">
-                  <a16:creationId xmlns:a16="http://schemas.microsoft.com/office/drawing/2014/main" id="{7053101E-BA41-4AFA-90EB-5F30E05D5C2A}"/>
+                  <a16:creationId xmlns:a16="http://schemas.microsoft.com/office/drawing/2014/main" xmlns="" id="{7053101E-BA41-4AFA-90EB-5F30E05D5C2A}"/>
                 </a:ext>
               </a:extLst>
             </p:cNvPr>
@@ -15645,7 +14293,7 @@
             <p:cNvPr id="20" name="Conector de Seta Reta 19">
               <a:extLst>
                 <a:ext uri="{FF2B5EF4-FFF2-40B4-BE49-F238E27FC236}">
-                  <a16:creationId xmlns:a16="http://schemas.microsoft.com/office/drawing/2014/main" id="{972CCC72-617F-4D78-B3FE-1B11C03D20E1}"/>
+                  <a16:creationId xmlns:a16="http://schemas.microsoft.com/office/drawing/2014/main" xmlns="" id="{972CCC72-617F-4D78-B3FE-1B11C03D20E1}"/>
                 </a:ext>
               </a:extLst>
             </p:cNvPr>
@@ -15689,7 +14337,7 @@
             <p:cNvPr id="23" name="Conector de Seta Reta 22">
               <a:extLst>
                 <a:ext uri="{FF2B5EF4-FFF2-40B4-BE49-F238E27FC236}">
-                  <a16:creationId xmlns:a16="http://schemas.microsoft.com/office/drawing/2014/main" id="{6F2A4F03-C5E4-40D7-AA81-EDDBC7B02437}"/>
+                  <a16:creationId xmlns:a16="http://schemas.microsoft.com/office/drawing/2014/main" xmlns="" id="{6F2A4F03-C5E4-40D7-AA81-EDDBC7B02437}"/>
                 </a:ext>
               </a:extLst>
             </p:cNvPr>
@@ -15728,56 +14376,12 @@
             </a:fontRef>
           </p:style>
         </p:cxnSp>
-        <p:cxnSp>
-          <p:nvCxnSpPr>
-            <p:cNvPr id="24" name="Conector de Seta Reta 23">
-              <a:extLst>
-                <a:ext uri="{FF2B5EF4-FFF2-40B4-BE49-F238E27FC236}">
-                  <a16:creationId xmlns:a16="http://schemas.microsoft.com/office/drawing/2014/main" id="{906C5ED3-A468-446B-91A1-50EACFAF704A}"/>
-                </a:ext>
-              </a:extLst>
-            </p:cNvPr>
-            <p:cNvCxnSpPr>
-              <a:cxnSpLocks/>
-            </p:cNvCxnSpPr>
-            <p:nvPr/>
-          </p:nvCxnSpPr>
-          <p:spPr>
-            <a:xfrm flipH="1">
-              <a:off x="3188898" y="3129951"/>
-              <a:ext cx="250165" cy="626852"/>
-            </a:xfrm>
-            <a:prstGeom prst="straightConnector1">
-              <a:avLst/>
-            </a:prstGeom>
-            <a:ln>
-              <a:solidFill>
-                <a:schemeClr val="tx1"/>
-              </a:solidFill>
-              <a:tailEnd type="triangle"/>
-            </a:ln>
-          </p:spPr>
-          <p:style>
-            <a:lnRef idx="1">
-              <a:schemeClr val="accent1"/>
-            </a:lnRef>
-            <a:fillRef idx="0">
-              <a:schemeClr val="accent1"/>
-            </a:fillRef>
-            <a:effectRef idx="0">
-              <a:schemeClr val="accent1"/>
-            </a:effectRef>
-            <a:fontRef idx="minor">
-              <a:schemeClr val="tx1"/>
-            </a:fontRef>
-          </p:style>
-        </p:cxnSp>
         <p:sp>
           <p:nvSpPr>
             <p:cNvPr id="3" name="CaixaDeTexto 2">
               <a:extLst>
                 <a:ext uri="{FF2B5EF4-FFF2-40B4-BE49-F238E27FC236}">
-                  <a16:creationId xmlns:a16="http://schemas.microsoft.com/office/drawing/2014/main" id="{7FCA1908-EC09-46BB-B633-12D671CD2244}"/>
+                  <a16:creationId xmlns:a16="http://schemas.microsoft.com/office/drawing/2014/main" xmlns="" id="{7FCA1908-EC09-46BB-B633-12D671CD2244}"/>
                 </a:ext>
               </a:extLst>
             </p:cNvPr>
@@ -15815,10 +14419,10 @@
         </p:sp>
         <p:grpSp>
           <p:nvGrpSpPr>
-            <p:cNvPr id="11" name="Agrupar 10">
+            <p:cNvPr id="14" name="Agrupar 13">
               <a:extLst>
                 <a:ext uri="{FF2B5EF4-FFF2-40B4-BE49-F238E27FC236}">
-                  <a16:creationId xmlns:a16="http://schemas.microsoft.com/office/drawing/2014/main" id="{3203C5F3-8D03-4FC9-88D2-41B3ED0C877D}"/>
+                  <a16:creationId xmlns:a16="http://schemas.microsoft.com/office/drawing/2014/main" xmlns="" id="{52E15621-7F03-4345-B836-9C7FBBF4EDE5}"/>
                 </a:ext>
               </a:extLst>
             </p:cNvPr>
@@ -15827,18 +14431,18 @@
           </p:nvGrpSpPr>
           <p:grpSpPr>
             <a:xfrm>
-              <a:off x="2317630" y="4035725"/>
-              <a:ext cx="2590801" cy="1273834"/>
-              <a:chOff x="2317630" y="4035725"/>
-              <a:chExt cx="2590801" cy="1273834"/>
+              <a:off x="7205932" y="3820064"/>
+              <a:ext cx="2795494" cy="2133248"/>
+              <a:chOff x="7205932" y="3820064"/>
+              <a:chExt cx="2795494" cy="2249466"/>
             </a:xfrm>
           </p:grpSpPr>
           <p:sp>
             <p:nvSpPr>
-              <p:cNvPr id="25" name="CaixaDeTexto 24">
+              <p:cNvPr id="28" name="CaixaDeTexto 27">
                 <a:extLst>
                   <a:ext uri="{FF2B5EF4-FFF2-40B4-BE49-F238E27FC236}">
-                    <a16:creationId xmlns:a16="http://schemas.microsoft.com/office/drawing/2014/main" id="{E53E8429-486C-49E3-A88D-600F0719554F}"/>
+                    <a16:creationId xmlns:a16="http://schemas.microsoft.com/office/drawing/2014/main" xmlns="" id="{06F24E56-56C0-48DE-B993-B1CF84033F10}"/>
                   </a:ext>
                 </a:extLst>
               </p:cNvPr>
@@ -15847,8 +14451,8 @@
             </p:nvSpPr>
             <p:spPr>
               <a:xfrm>
-                <a:off x="2323381" y="4247729"/>
-                <a:ext cx="2585050" cy="923330"/>
+                <a:off x="7272603" y="3927540"/>
+                <a:ext cx="2728823" cy="2141990"/>
               </a:xfrm>
               <a:prstGeom prst="rect">
                 <a:avLst/>
@@ -15868,10 +14472,10 @@
                   <a:buChar char="•"/>
                 </a:pPr>
                 <a:r>
-                  <a:rPr lang="pt-BR" b="1" i="1" dirty="0">
+                  <a:rPr lang="pt-BR" b="1" i="1" dirty="0" smtClean="0">
                     <a:cs typeface="Calibri"/>
                   </a:rPr>
-                  <a:t>Cumprir regras </a:t>
+                  <a:t>Tornar voluntario em um colaborador</a:t>
                 </a:r>
               </a:p>
               <a:p>
@@ -15880,126 +14484,10 @@
                   <a:buChar char="•"/>
                 </a:pPr>
                 <a:r>
-                  <a:rPr lang="pt-BR" b="1" i="1" dirty="0">
+                  <a:rPr lang="pt-BR" b="1" i="1" dirty="0" smtClean="0">
                     <a:cs typeface="Calibri"/>
                   </a:rPr>
-                  <a:t>Executar atividades para função </a:t>
-                </a:r>
-              </a:p>
-            </p:txBody>
-          </p:sp>
-          <p:sp>
-            <p:nvSpPr>
-              <p:cNvPr id="12" name="Retângulo 11">
-                <a:extLst>
-                  <a:ext uri="{FF2B5EF4-FFF2-40B4-BE49-F238E27FC236}">
-                    <a16:creationId xmlns:a16="http://schemas.microsoft.com/office/drawing/2014/main" id="{E9117F55-F054-4FBD-92C8-EA6D071EE605}"/>
-                  </a:ext>
-                </a:extLst>
-              </p:cNvPr>
-              <p:cNvSpPr/>
-              <p:nvPr/>
-            </p:nvSpPr>
-            <p:spPr>
-              <a:xfrm>
-                <a:off x="2317630" y="4035725"/>
-                <a:ext cx="2424022" cy="1273834"/>
-              </a:xfrm>
-              <a:prstGeom prst="rect">
-                <a:avLst/>
-              </a:prstGeom>
-              <a:noFill/>
-              <a:ln>
-                <a:solidFill>
-                  <a:schemeClr val="tx1"/>
-                </a:solidFill>
-              </a:ln>
-            </p:spPr>
-            <p:style>
-              <a:lnRef idx="2">
-                <a:schemeClr val="accent1">
-                  <a:shade val="50000"/>
-                </a:schemeClr>
-              </a:lnRef>
-              <a:fillRef idx="1">
-                <a:schemeClr val="accent1"/>
-              </a:fillRef>
-              <a:effectRef idx="0">
-                <a:schemeClr val="accent1"/>
-              </a:effectRef>
-              <a:fontRef idx="minor">
-                <a:schemeClr val="lt1"/>
-              </a:fontRef>
-            </p:style>
-            <p:txBody>
-              <a:bodyPr rtlCol="0" anchor="ctr"/>
-              <a:lstStyle/>
-              <a:p>
-                <a:pPr algn="ctr"/>
-                <a:endParaRPr lang="pt-BR" u="sng" dirty="0"/>
-              </a:p>
-            </p:txBody>
-          </p:sp>
-        </p:grpSp>
-        <p:grpSp>
-          <p:nvGrpSpPr>
-            <p:cNvPr id="14" name="Agrupar 13">
-              <a:extLst>
-                <a:ext uri="{FF2B5EF4-FFF2-40B4-BE49-F238E27FC236}">
-                  <a16:creationId xmlns:a16="http://schemas.microsoft.com/office/drawing/2014/main" id="{52E15621-7F03-4345-B836-9C7FBBF4EDE5}"/>
-                </a:ext>
-              </a:extLst>
-            </p:cNvPr>
-            <p:cNvGrpSpPr/>
-            <p:nvPr/>
-          </p:nvGrpSpPr>
-          <p:grpSpPr>
-            <a:xfrm>
-              <a:off x="7205932" y="3820065"/>
-              <a:ext cx="2795496" cy="1671596"/>
-              <a:chOff x="7205932" y="3820064"/>
-              <a:chExt cx="2795496" cy="1762663"/>
-            </a:xfrm>
-          </p:grpSpPr>
-          <p:sp>
-            <p:nvSpPr>
-              <p:cNvPr id="28" name="CaixaDeTexto 27">
-                <a:extLst>
-                  <a:ext uri="{FF2B5EF4-FFF2-40B4-BE49-F238E27FC236}">
-                    <a16:creationId xmlns:a16="http://schemas.microsoft.com/office/drawing/2014/main" id="{06F24E56-56C0-48DE-B993-B1CF84033F10}"/>
-                  </a:ext>
-                </a:extLst>
-              </p:cNvPr>
-              <p:cNvSpPr txBox="1"/>
-              <p:nvPr/>
-            </p:nvSpPr>
-            <p:spPr>
-              <a:xfrm>
-                <a:off x="7272605" y="4109230"/>
-                <a:ext cx="2728823" cy="1265722"/>
-              </a:xfrm>
-              <a:prstGeom prst="rect">
-                <a:avLst/>
-              </a:prstGeom>
-            </p:spPr>
-            <p:txBody>
-              <a:bodyPr rot="0" spcFirstLastPara="0" vertOverflow="overflow" horzOverflow="overflow" vert="horz" wrap="square" lIns="91440" tIns="45720" rIns="91440" bIns="45720" numCol="1" spcCol="0" rtlCol="0" fromWordArt="0" anchor="t" anchorCtr="0" forceAA="0" compatLnSpc="1">
-                <a:prstTxWarp prst="textNoShape">
-                  <a:avLst/>
-                </a:prstTxWarp>
-                <a:spAutoFit/>
-              </a:bodyPr>
-              <a:lstStyle/>
-              <a:p>
-                <a:pPr marL="285750" indent="-285750">
-                  <a:buFont typeface="Arial"/>
-                  <a:buChar char="•"/>
-                </a:pPr>
-                <a:r>
-                  <a:rPr lang="pt-BR" b="1" i="1" dirty="0">
-                    <a:cs typeface="Calibri"/>
-                  </a:rPr>
-                  <a:t>Determinar atividades da função exercida</a:t>
+                  <a:t>Cadastrar colaborador com atividade solicitada</a:t>
                 </a:r>
                 <a:endParaRPr lang="pt-BR" dirty="0">
                   <a:cs typeface="Calibri"/>
@@ -16011,10 +14499,22 @@
                   <a:buChar char="•"/>
                 </a:pPr>
                 <a:r>
+                  <a:rPr lang="pt-BR" b="1" i="1" dirty="0" smtClean="0">
+                    <a:cs typeface="Calibri"/>
+                  </a:rPr>
+                  <a:t>Passar </a:t>
+                </a:r>
+                <a:r>
+                  <a:rPr lang="pt-BR" b="1" i="1" dirty="0" smtClean="0">
+                    <a:cs typeface="Calibri"/>
+                  </a:rPr>
+                  <a:t>regras da </a:t>
+                </a:r>
+                <a:r>
                   <a:rPr lang="pt-BR" b="1" i="1" dirty="0">
                     <a:cs typeface="Calibri"/>
                   </a:rPr>
-                  <a:t>Criar regras para função </a:t>
+                  <a:t>função </a:t>
                 </a:r>
                 <a:endParaRPr lang="pt-BR" b="1" i="1" u="sng" dirty="0">
                   <a:cs typeface="Calibri"/>
@@ -16027,7 +14527,7 @@
               <p:cNvPr id="33" name="Retângulo 32">
                 <a:extLst>
                   <a:ext uri="{FF2B5EF4-FFF2-40B4-BE49-F238E27FC236}">
-                    <a16:creationId xmlns:a16="http://schemas.microsoft.com/office/drawing/2014/main" id="{F00C5CCF-AC25-4099-8DD3-8B36FCAF56E7}"/>
+                    <a16:creationId xmlns:a16="http://schemas.microsoft.com/office/drawing/2014/main" xmlns="" id="{F00C5CCF-AC25-4099-8DD3-8B36FCAF56E7}"/>
                   </a:ext>
                 </a:extLst>
               </p:cNvPr>
@@ -16037,7 +14537,7 @@
             <p:spPr>
               <a:xfrm>
                 <a:off x="7205932" y="3820064"/>
-                <a:ext cx="2769078" cy="1762663"/>
+                <a:ext cx="2769078" cy="2249466"/>
               </a:xfrm>
               <a:prstGeom prst="rect">
                 <a:avLst/>

</xml_diff>